<commit_message>
GRW2017 sunum yarısı bitti.
</commit_message>
<xml_diff>
--- a/GRW2017/sunum/GRW2017_MesutUğur.pptx
+++ b/GRW2017/sunum/GRW2017_MesutUğur.pptx
@@ -5,7 +5,7 @@
     <p:sldMasterId id="2147483804" r:id="rId1"/>
   </p:sldMasterIdLst>
   <p:notesMasterIdLst>
-    <p:notesMasterId r:id="rId11"/>
+    <p:notesMasterId r:id="rId17"/>
   </p:notesMasterIdLst>
   <p:sldIdLst>
     <p:sldId id="290" r:id="rId2"/>
@@ -14,9 +14,15 @@
     <p:sldId id="495" r:id="rId5"/>
     <p:sldId id="496" r:id="rId6"/>
     <p:sldId id="497" r:id="rId7"/>
-    <p:sldId id="498" r:id="rId8"/>
-    <p:sldId id="499" r:id="rId9"/>
-    <p:sldId id="493" r:id="rId10"/>
+    <p:sldId id="500" r:id="rId8"/>
+    <p:sldId id="498" r:id="rId9"/>
+    <p:sldId id="504" r:id="rId10"/>
+    <p:sldId id="499" r:id="rId11"/>
+    <p:sldId id="501" r:id="rId12"/>
+    <p:sldId id="505" r:id="rId13"/>
+    <p:sldId id="506" r:id="rId14"/>
+    <p:sldId id="502" r:id="rId15"/>
+    <p:sldId id="493" r:id="rId16"/>
   </p:sldIdLst>
   <p:sldSz cx="9144000" cy="6858000" type="screen4x3"/>
   <p:notesSz cx="6858000" cy="9144000"/>
@@ -216,7 +222,7 @@
           <a:p>
             <a:fld id="{D1C008C1-D970-43BD-9678-58985B84B3B0}" type="datetimeFigureOut">
               <a:rPr lang="tr-TR" smtClean="0"/>
-              <a:t>28.05.2017</a:t>
+              <a:t>29.05.2017</a:t>
             </a:fld>
             <a:endParaRPr lang="tr-TR"/>
           </a:p>
@@ -665,7 +671,7 @@
           <a:p>
             <a:fld id="{D275723C-A363-4114-BE18-3E9589C2B9C2}" type="datetime1">
               <a:rPr lang="en-US" smtClean="0"/>
-              <a:t>5/28/2017</a:t>
+              <a:t>5/29/2017</a:t>
             </a:fld>
             <a:endParaRPr lang="en-US" dirty="0"/>
           </a:p>
@@ -836,7 +842,7 @@
           <a:p>
             <a:fld id="{C5592633-93A2-4DB7-B3D8-5F6714E7EFEC}" type="datetime1">
               <a:rPr lang="en-US" smtClean="0"/>
-              <a:t>5/28/2017</a:t>
+              <a:t>5/29/2017</a:t>
             </a:fld>
             <a:endParaRPr lang="en-US" dirty="0"/>
           </a:p>
@@ -1017,7 +1023,7 @@
           <a:p>
             <a:fld id="{6F760D8D-AE05-4AF5-8666-75C48EA7B609}" type="datetime1">
               <a:rPr lang="en-US" smtClean="0"/>
-              <a:t>5/28/2017</a:t>
+              <a:t>5/29/2017</a:t>
             </a:fld>
             <a:endParaRPr lang="en-US" dirty="0"/>
           </a:p>
@@ -1188,7 +1194,7 @@
           <a:p>
             <a:fld id="{6D87B8C0-62AE-47C8-A8EF-FC863B0F06E5}" type="datetime1">
               <a:rPr lang="en-US" smtClean="0"/>
-              <a:t>5/28/2017</a:t>
+              <a:t>5/29/2017</a:t>
             </a:fld>
             <a:endParaRPr lang="en-US" dirty="0"/>
           </a:p>
@@ -1435,7 +1441,7 @@
           <a:p>
             <a:fld id="{A76C8472-C309-40FA-8240-FF6234B7F0D0}" type="datetime1">
               <a:rPr lang="en-US" smtClean="0"/>
-              <a:t>5/28/2017</a:t>
+              <a:t>5/29/2017</a:t>
             </a:fld>
             <a:endParaRPr lang="en-US" dirty="0"/>
           </a:p>
@@ -1724,7 +1730,7 @@
           <a:p>
             <a:fld id="{33196F6B-6F2E-418E-A1A6-2F06576F6EF7}" type="datetime1">
               <a:rPr lang="en-US" smtClean="0"/>
-              <a:t>5/28/2017</a:t>
+              <a:t>5/29/2017</a:t>
             </a:fld>
             <a:endParaRPr lang="en-US" dirty="0"/>
           </a:p>
@@ -2147,7 +2153,7 @@
           <a:p>
             <a:fld id="{D09CD6EC-2E00-46F1-9BD2-E1865A200410}" type="datetime1">
               <a:rPr lang="en-US" smtClean="0"/>
-              <a:t>5/28/2017</a:t>
+              <a:t>5/29/2017</a:t>
             </a:fld>
             <a:endParaRPr lang="en-US" dirty="0"/>
           </a:p>
@@ -2266,7 +2272,7 @@
           <a:p>
             <a:fld id="{C40B9E5A-6330-4749-ACDB-FB892FCFE6A5}" type="datetime1">
               <a:rPr lang="en-US" smtClean="0"/>
-              <a:t>5/28/2017</a:t>
+              <a:t>5/29/2017</a:t>
             </a:fld>
             <a:endParaRPr lang="en-US" dirty="0"/>
           </a:p>
@@ -2362,7 +2368,7 @@
           <a:p>
             <a:fld id="{1C181CB3-A768-4AD8-A97F-12E47CC1200D}" type="datetime1">
               <a:rPr lang="en-US" smtClean="0"/>
-              <a:t>5/28/2017</a:t>
+              <a:t>5/29/2017</a:t>
             </a:fld>
             <a:endParaRPr lang="en-US" dirty="0"/>
           </a:p>
@@ -2640,7 +2646,7 @@
           <a:p>
             <a:fld id="{AF3D8106-484C-46C6-8BE9-348BFA7F2DCB}" type="datetime1">
               <a:rPr lang="en-US" smtClean="0"/>
-              <a:t>5/28/2017</a:t>
+              <a:t>5/29/2017</a:t>
             </a:fld>
             <a:endParaRPr lang="en-US" dirty="0"/>
           </a:p>
@@ -2894,7 +2900,7 @@
           <a:p>
             <a:fld id="{F2A57B0D-110E-4AAD-9411-DA6CB39E8776}" type="datetime1">
               <a:rPr lang="en-US" smtClean="0"/>
-              <a:t>5/28/2017</a:t>
+              <a:t>5/29/2017</a:t>
             </a:fld>
             <a:endParaRPr lang="en-US" dirty="0"/>
           </a:p>
@@ -3129,7 +3135,7 @@
           <a:p>
             <a:fld id="{FB4B5B0E-55D6-4DAA-879D-58BBFFC7379B}" type="datetime1">
               <a:rPr lang="en-US" smtClean="0"/>
-              <a:t>5/28/2017</a:t>
+              <a:t>5/29/2017</a:t>
             </a:fld>
             <a:endParaRPr lang="en-US" dirty="0"/>
           </a:p>
@@ -3897,7 +3903,7 @@
 </p:sld>
 </file>
 
-<file path=ppt/slides/slide2.xml><?xml version="1.0" encoding="utf-8"?>
+<file path=ppt/slides/slide10.xml><?xml version="1.0" encoding="utf-8"?>
 <p:sld xmlns:a="http://schemas.openxmlformats.org/drawingml/2006/main" xmlns:r="http://schemas.openxmlformats.org/officeDocument/2006/relationships" xmlns:p="http://schemas.openxmlformats.org/presentationml/2006/main">
   <p:cSld>
     <p:spTree>
@@ -4041,21 +4047,7 @@
                 <a:latin typeface="Times New Roman" panose="02020603050405020304" pitchFamily="18" charset="0"/>
                 <a:cs typeface="Times New Roman" panose="02020603050405020304" pitchFamily="18" charset="0"/>
               </a:rPr>
-              <a:t>Research</a:t>
-            </a:r>
-            <a:r>
-              <a:rPr lang="tr-TR" sz="3000" dirty="0" smtClean="0">
-                <a:latin typeface="Times New Roman" panose="02020603050405020304" pitchFamily="18" charset="0"/>
-                <a:cs typeface="Times New Roman" panose="02020603050405020304" pitchFamily="18" charset="0"/>
-              </a:rPr>
-              <a:t> </a:t>
-            </a:r>
-            <a:r>
-              <a:rPr lang="tr-TR" sz="3000" dirty="0" err="1" smtClean="0">
-                <a:latin typeface="Times New Roman" panose="02020603050405020304" pitchFamily="18" charset="0"/>
-                <a:cs typeface="Times New Roman" panose="02020603050405020304" pitchFamily="18" charset="0"/>
-              </a:rPr>
-              <a:t>Group</a:t>
+              <a:t>Challenges</a:t>
             </a:r>
             <a:endParaRPr lang="tr-TR" sz="3000" dirty="0">
               <a:latin typeface="Times New Roman" panose="02020603050405020304" pitchFamily="18" charset="0"/>
@@ -4117,7 +4109,7 @@
             <a:fld id="{B6F15528-21DE-4FAA-801E-634DDDAF4B2B}" type="slidenum">
               <a:rPr lang="en-US" smtClean="0"/>
               <a:pPr/>
-              <a:t>2</a:t>
+              <a:t>10</a:t>
             </a:fld>
             <a:endParaRPr lang="en-US" dirty="0"/>
           </a:p>
@@ -4164,6 +4156,2887 @@
           </a:extLst>
         </p:spPr>
       </p:pic>
+      <p:sp>
+        <p:nvSpPr>
+          <p:cNvPr id="12" name="Text Box 9"/>
+          <p:cNvSpPr txBox="1">
+            <a:spLocks noChangeArrowheads="1"/>
+          </p:cNvSpPr>
+          <p:nvPr/>
+        </p:nvSpPr>
+        <p:spPr bwMode="auto">
+          <a:xfrm>
+            <a:off x="1295399" y="1084656"/>
+            <a:ext cx="7672691" cy="1631216"/>
+          </a:xfrm>
+          <a:prstGeom prst="rect">
+            <a:avLst/>
+          </a:prstGeom>
+          <a:noFill/>
+          <a:ln w="9525">
+            <a:noFill/>
+            <a:miter lim="800000"/>
+            <a:headEnd/>
+            <a:tailEnd/>
+          </a:ln>
+          <a:effectLst/>
+        </p:spPr>
+        <p:txBody>
+          <a:bodyPr wrap="square">
+            <a:spAutoFit/>
+          </a:bodyPr>
+          <a:lstStyle/>
+          <a:p>
+            <a:r>
+              <a:rPr lang="en-US" sz="2000" dirty="0">
+                <a:latin typeface="Times New Roman" panose="02020603050405020304" pitchFamily="18" charset="0"/>
+                <a:cs typeface="Times New Roman" panose="02020603050405020304" pitchFamily="18" charset="0"/>
+              </a:rPr>
+              <a:t>Power and control electronics components are subjected to </a:t>
+            </a:r>
+            <a:r>
+              <a:rPr lang="en-US" sz="2000" b="1" dirty="0">
+                <a:latin typeface="Times New Roman" panose="02020603050405020304" pitchFamily="18" charset="0"/>
+                <a:cs typeface="Times New Roman" panose="02020603050405020304" pitchFamily="18" charset="0"/>
+              </a:rPr>
+              <a:t>high temperature and vibration</a:t>
+            </a:r>
+            <a:r>
+              <a:rPr lang="tr-TR" sz="2000" dirty="0" smtClean="0">
+                <a:latin typeface="Times New Roman" panose="02020603050405020304" pitchFamily="18" charset="0"/>
+                <a:cs typeface="Times New Roman" panose="02020603050405020304" pitchFamily="18" charset="0"/>
+              </a:rPr>
+              <a:t>.</a:t>
+            </a:r>
+          </a:p>
+          <a:p>
+            <a:endParaRPr lang="tr-TR" sz="2000" dirty="0" smtClean="0">
+              <a:latin typeface="Times New Roman" panose="02020603050405020304" pitchFamily="18" charset="0"/>
+              <a:cs typeface="Times New Roman" panose="02020603050405020304" pitchFamily="18" charset="0"/>
+            </a:endParaRPr>
+          </a:p>
+          <a:p>
+            <a:endParaRPr lang="en-US" sz="2000" dirty="0">
+              <a:latin typeface="Times New Roman" panose="02020603050405020304" pitchFamily="18" charset="0"/>
+              <a:cs typeface="Times New Roman" panose="02020603050405020304" pitchFamily="18" charset="0"/>
+            </a:endParaRPr>
+          </a:p>
+          <a:p>
+            <a:r>
+              <a:rPr lang="tr-TR" sz="2000" dirty="0" err="1">
+                <a:latin typeface="Times New Roman" panose="02020603050405020304" pitchFamily="18" charset="0"/>
+                <a:cs typeface="Times New Roman" panose="02020603050405020304" pitchFamily="18" charset="0"/>
+              </a:rPr>
+              <a:t>In</a:t>
+            </a:r>
+            <a:r>
+              <a:rPr lang="tr-TR" sz="2000" dirty="0">
+                <a:latin typeface="Times New Roman" panose="02020603050405020304" pitchFamily="18" charset="0"/>
+                <a:cs typeface="Times New Roman" panose="02020603050405020304" pitchFamily="18" charset="0"/>
+              </a:rPr>
+              <a:t> </a:t>
+            </a:r>
+            <a:r>
+              <a:rPr lang="tr-TR" sz="2000" dirty="0" err="1">
+                <a:latin typeface="Times New Roman" panose="02020603050405020304" pitchFamily="18" charset="0"/>
+                <a:cs typeface="Times New Roman" panose="02020603050405020304" pitchFamily="18" charset="0"/>
+              </a:rPr>
+              <a:t>case</a:t>
+            </a:r>
+            <a:r>
+              <a:rPr lang="tr-TR" sz="2000" dirty="0">
+                <a:latin typeface="Times New Roman" panose="02020603050405020304" pitchFamily="18" charset="0"/>
+                <a:cs typeface="Times New Roman" panose="02020603050405020304" pitchFamily="18" charset="0"/>
+              </a:rPr>
+              <a:t> </a:t>
+            </a:r>
+            <a:r>
+              <a:rPr lang="tr-TR" sz="2000" dirty="0" err="1">
+                <a:latin typeface="Times New Roman" panose="02020603050405020304" pitchFamily="18" charset="0"/>
+                <a:cs typeface="Times New Roman" panose="02020603050405020304" pitchFamily="18" charset="0"/>
+              </a:rPr>
+              <a:t>one</a:t>
+            </a:r>
+            <a:r>
+              <a:rPr lang="tr-TR" sz="2000" dirty="0">
+                <a:latin typeface="Times New Roman" panose="02020603050405020304" pitchFamily="18" charset="0"/>
+                <a:cs typeface="Times New Roman" panose="02020603050405020304" pitchFamily="18" charset="0"/>
+              </a:rPr>
+              <a:t> </a:t>
+            </a:r>
+            <a:r>
+              <a:rPr lang="tr-TR" sz="2000" dirty="0" err="1" smtClean="0">
+                <a:latin typeface="Times New Roman" panose="02020603050405020304" pitchFamily="18" charset="0"/>
+                <a:cs typeface="Times New Roman" panose="02020603050405020304" pitchFamily="18" charset="0"/>
+              </a:rPr>
+              <a:t>module</a:t>
+            </a:r>
+            <a:r>
+              <a:rPr lang="tr-TR" sz="2000" dirty="0" smtClean="0">
+                <a:latin typeface="Times New Roman" panose="02020603050405020304" pitchFamily="18" charset="0"/>
+                <a:cs typeface="Times New Roman" panose="02020603050405020304" pitchFamily="18" charset="0"/>
+              </a:rPr>
+              <a:t> </a:t>
+            </a:r>
+            <a:r>
+              <a:rPr lang="tr-TR" sz="2000" dirty="0">
+                <a:latin typeface="Times New Roman" panose="02020603050405020304" pitchFamily="18" charset="0"/>
+                <a:cs typeface="Times New Roman" panose="02020603050405020304" pitchFamily="18" charset="0"/>
+              </a:rPr>
+              <a:t>is in </a:t>
+            </a:r>
+            <a:r>
+              <a:rPr lang="tr-TR" sz="2000" dirty="0" err="1">
+                <a:latin typeface="Times New Roman" panose="02020603050405020304" pitchFamily="18" charset="0"/>
+                <a:cs typeface="Times New Roman" panose="02020603050405020304" pitchFamily="18" charset="0"/>
+              </a:rPr>
+              <a:t>fault</a:t>
+            </a:r>
+            <a:r>
+              <a:rPr lang="tr-TR" sz="2000" dirty="0">
+                <a:latin typeface="Times New Roman" panose="02020603050405020304" pitchFamily="18" charset="0"/>
+                <a:cs typeface="Times New Roman" panose="02020603050405020304" pitchFamily="18" charset="0"/>
+              </a:rPr>
+              <a:t>, </a:t>
+            </a:r>
+            <a:r>
+              <a:rPr lang="tr-TR" sz="2000" b="1" dirty="0" err="1">
+                <a:latin typeface="Times New Roman" panose="02020603050405020304" pitchFamily="18" charset="0"/>
+                <a:cs typeface="Times New Roman" panose="02020603050405020304" pitchFamily="18" charset="0"/>
+              </a:rPr>
+              <a:t>torque</a:t>
+            </a:r>
+            <a:r>
+              <a:rPr lang="tr-TR" sz="2000" b="1" dirty="0">
+                <a:latin typeface="Times New Roman" panose="02020603050405020304" pitchFamily="18" charset="0"/>
+                <a:cs typeface="Times New Roman" panose="02020603050405020304" pitchFamily="18" charset="0"/>
+              </a:rPr>
+              <a:t> </a:t>
+            </a:r>
+            <a:r>
+              <a:rPr lang="tr-TR" sz="2000" b="1" dirty="0" err="1">
+                <a:latin typeface="Times New Roman" panose="02020603050405020304" pitchFamily="18" charset="0"/>
+                <a:cs typeface="Times New Roman" panose="02020603050405020304" pitchFamily="18" charset="0"/>
+              </a:rPr>
+              <a:t>balance</a:t>
+            </a:r>
+            <a:r>
+              <a:rPr lang="tr-TR" sz="2000" b="1" dirty="0">
+                <a:latin typeface="Times New Roman" panose="02020603050405020304" pitchFamily="18" charset="0"/>
+                <a:cs typeface="Times New Roman" panose="02020603050405020304" pitchFamily="18" charset="0"/>
+              </a:rPr>
+              <a:t> </a:t>
+            </a:r>
+            <a:r>
+              <a:rPr lang="tr-TR" sz="2000" dirty="0" err="1">
+                <a:latin typeface="Times New Roman" panose="02020603050405020304" pitchFamily="18" charset="0"/>
+                <a:cs typeface="Times New Roman" panose="02020603050405020304" pitchFamily="18" charset="0"/>
+              </a:rPr>
+              <a:t>should</a:t>
+            </a:r>
+            <a:r>
+              <a:rPr lang="tr-TR" sz="2000" dirty="0">
+                <a:latin typeface="Times New Roman" panose="02020603050405020304" pitchFamily="18" charset="0"/>
+                <a:cs typeface="Times New Roman" panose="02020603050405020304" pitchFamily="18" charset="0"/>
+              </a:rPr>
+              <a:t> be </a:t>
+            </a:r>
+            <a:r>
+              <a:rPr lang="tr-TR" sz="2000" dirty="0" err="1">
+                <a:latin typeface="Times New Roman" panose="02020603050405020304" pitchFamily="18" charset="0"/>
+                <a:cs typeface="Times New Roman" panose="02020603050405020304" pitchFamily="18" charset="0"/>
+              </a:rPr>
+              <a:t>ensured</a:t>
+            </a:r>
+            <a:r>
+              <a:rPr lang="tr-TR" sz="2000" dirty="0">
+                <a:latin typeface="Times New Roman" panose="02020603050405020304" pitchFamily="18" charset="0"/>
+                <a:cs typeface="Times New Roman" panose="02020603050405020304" pitchFamily="18" charset="0"/>
+              </a:rPr>
+              <a:t>.</a:t>
+            </a:r>
+          </a:p>
+        </p:txBody>
+      </p:sp>
+      <p:pic>
+        <p:nvPicPr>
+          <p:cNvPr id="4" name="Picture 3"/>
+          <p:cNvPicPr>
+            <a:picLocks noChangeAspect="1"/>
+          </p:cNvPicPr>
+          <p:nvPr/>
+        </p:nvPicPr>
+        <p:blipFill>
+          <a:blip r:embed="rId3"/>
+          <a:stretch>
+            <a:fillRect/>
+          </a:stretch>
+        </p:blipFill>
+        <p:spPr>
+          <a:xfrm>
+            <a:off x="2299242" y="3276600"/>
+            <a:ext cx="5265500" cy="1630494"/>
+          </a:xfrm>
+          <a:prstGeom prst="rect">
+            <a:avLst/>
+          </a:prstGeom>
+        </p:spPr>
+      </p:pic>
+      <p:pic>
+        <p:nvPicPr>
+          <p:cNvPr id="5" name="Picture 4"/>
+          <p:cNvPicPr>
+            <a:picLocks noChangeAspect="1"/>
+          </p:cNvPicPr>
+          <p:nvPr/>
+        </p:nvPicPr>
+        <p:blipFill>
+          <a:blip r:embed="rId4"/>
+          <a:stretch>
+            <a:fillRect/>
+          </a:stretch>
+        </p:blipFill>
+        <p:spPr>
+          <a:xfrm>
+            <a:off x="2299242" y="5105400"/>
+            <a:ext cx="5265500" cy="1495425"/>
+          </a:xfrm>
+          <a:prstGeom prst="rect">
+            <a:avLst/>
+          </a:prstGeom>
+        </p:spPr>
+      </p:pic>
+    </p:spTree>
+    <p:extLst>
+      <p:ext uri="{BB962C8B-B14F-4D97-AF65-F5344CB8AC3E}">
+        <p14:creationId xmlns:p14="http://schemas.microsoft.com/office/powerpoint/2010/main" val="822431857"/>
+      </p:ext>
+    </p:extLst>
+  </p:cSld>
+  <p:clrMapOvr>
+    <a:masterClrMapping/>
+  </p:clrMapOvr>
+  <p:timing>
+    <p:tnLst>
+      <p:par>
+        <p:cTn id="1" dur="indefinite" restart="never" nodeType="tmRoot"/>
+      </p:par>
+    </p:tnLst>
+  </p:timing>
+</p:sld>
+</file>
+
+<file path=ppt/slides/slide11.xml><?xml version="1.0" encoding="utf-8"?>
+<p:sld xmlns:a="http://schemas.openxmlformats.org/drawingml/2006/main" xmlns:r="http://schemas.openxmlformats.org/officeDocument/2006/relationships" xmlns:p="http://schemas.openxmlformats.org/presentationml/2006/main">
+  <p:cSld>
+    <p:spTree>
+      <p:nvGrpSpPr>
+        <p:cNvPr id="1" name=""/>
+        <p:cNvGrpSpPr/>
+        <p:nvPr/>
+      </p:nvGrpSpPr>
+      <p:grpSpPr>
+        <a:xfrm>
+          <a:off x="0" y="0"/>
+          <a:ext cx="0" cy="0"/>
+          <a:chOff x="0" y="0"/>
+          <a:chExt cx="0" cy="0"/>
+        </a:xfrm>
+      </p:grpSpPr>
+      <p:sp>
+        <p:nvSpPr>
+          <p:cNvPr id="10" name="Rectangle 9"/>
+          <p:cNvSpPr/>
+          <p:nvPr/>
+        </p:nvSpPr>
+        <p:spPr>
+          <a:xfrm>
+            <a:off x="0" y="12106"/>
+            <a:ext cx="1011942" cy="6854083"/>
+          </a:xfrm>
+          <a:prstGeom prst="rect">
+            <a:avLst/>
+          </a:prstGeom>
+          <a:gradFill flip="none" rotWithShape="1">
+            <a:gsLst>
+              <a:gs pos="50000">
+                <a:srgbClr val="D00000"/>
+              </a:gs>
+              <a:gs pos="0">
+                <a:srgbClr val="FF0000">
+                  <a:shade val="30000"/>
+                  <a:satMod val="115000"/>
+                </a:srgbClr>
+              </a:gs>
+              <a:gs pos="100000">
+                <a:schemeClr val="accent2">
+                  <a:lumMod val="60000"/>
+                  <a:lumOff val="40000"/>
+                </a:schemeClr>
+              </a:gs>
+            </a:gsLst>
+            <a:lin ang="5400000" scaled="1"/>
+            <a:tileRect/>
+          </a:gradFill>
+          <a:ln>
+            <a:noFill/>
+          </a:ln>
+        </p:spPr>
+        <p:style>
+          <a:lnRef idx="2">
+            <a:schemeClr val="accent1">
+              <a:shade val="50000"/>
+            </a:schemeClr>
+          </a:lnRef>
+          <a:fillRef idx="1">
+            <a:schemeClr val="accent1"/>
+          </a:fillRef>
+          <a:effectRef idx="0">
+            <a:schemeClr val="accent1"/>
+          </a:effectRef>
+          <a:fontRef idx="minor">
+            <a:schemeClr val="lt1"/>
+          </a:fontRef>
+        </p:style>
+        <p:txBody>
+          <a:bodyPr rtlCol="0" anchor="ctr"/>
+          <a:lstStyle/>
+          <a:p>
+            <a:pPr algn="ctr"/>
+            <a:endParaRPr lang="tr-TR"/>
+          </a:p>
+        </p:txBody>
+      </p:sp>
+      <p:cxnSp>
+        <p:nvCxnSpPr>
+          <p:cNvPr id="11" name="Straight Connector 10"/>
+          <p:cNvCxnSpPr/>
+          <p:nvPr/>
+        </p:nvCxnSpPr>
+        <p:spPr>
+          <a:xfrm>
+            <a:off x="1189918" y="838200"/>
+            <a:ext cx="7649282" cy="0"/>
+          </a:xfrm>
+          <a:prstGeom prst="line">
+            <a:avLst/>
+          </a:prstGeom>
+          <a:ln w="50800">
+            <a:solidFill>
+              <a:srgbClr val="F20000"/>
+            </a:solidFill>
+          </a:ln>
+        </p:spPr>
+        <p:style>
+          <a:lnRef idx="1">
+            <a:schemeClr val="accent1"/>
+          </a:lnRef>
+          <a:fillRef idx="0">
+            <a:schemeClr val="accent1"/>
+          </a:fillRef>
+          <a:effectRef idx="0">
+            <a:schemeClr val="accent1"/>
+          </a:effectRef>
+          <a:fontRef idx="minor">
+            <a:schemeClr val="tx1"/>
+          </a:fontRef>
+        </p:style>
+      </p:cxnSp>
+      <p:sp>
+        <p:nvSpPr>
+          <p:cNvPr id="13" name="TextBox 12"/>
+          <p:cNvSpPr txBox="1"/>
+          <p:nvPr/>
+        </p:nvSpPr>
+        <p:spPr>
+          <a:xfrm>
+            <a:off x="1386291" y="224135"/>
+            <a:ext cx="7315200" cy="553998"/>
+          </a:xfrm>
+          <a:prstGeom prst="rect">
+            <a:avLst/>
+          </a:prstGeom>
+          <a:noFill/>
+        </p:spPr>
+        <p:txBody>
+          <a:bodyPr wrap="square" rtlCol="0">
+            <a:spAutoFit/>
+          </a:bodyPr>
+          <a:lstStyle/>
+          <a:p>
+            <a:pPr algn="ctr"/>
+            <a:r>
+              <a:rPr lang="en-US" sz="3000" dirty="0" smtClean="0">
+                <a:latin typeface="Times New Roman" panose="02020603050405020304" pitchFamily="18" charset="0"/>
+                <a:cs typeface="Times New Roman" panose="02020603050405020304" pitchFamily="18" charset="0"/>
+              </a:rPr>
+              <a:t>Gallium Nitride (GaN) Power Semiconductors</a:t>
+            </a:r>
+            <a:endParaRPr lang="en-US" sz="3000" dirty="0">
+              <a:latin typeface="Times New Roman" panose="02020603050405020304" pitchFamily="18" charset="0"/>
+              <a:cs typeface="Times New Roman" panose="02020603050405020304" pitchFamily="18" charset="0"/>
+            </a:endParaRPr>
+          </a:p>
+        </p:txBody>
+      </p:sp>
+      <p:cxnSp>
+        <p:nvCxnSpPr>
+          <p:cNvPr id="15" name="Straight Connector 14"/>
+          <p:cNvCxnSpPr/>
+          <p:nvPr/>
+        </p:nvCxnSpPr>
+        <p:spPr>
+          <a:xfrm>
+            <a:off x="1189918" y="914400"/>
+            <a:ext cx="7649282" cy="0"/>
+          </a:xfrm>
+          <a:prstGeom prst="line">
+            <a:avLst/>
+          </a:prstGeom>
+          <a:ln w="19050">
+            <a:solidFill>
+              <a:srgbClr val="F20000"/>
+            </a:solidFill>
+          </a:ln>
+        </p:spPr>
+        <p:style>
+          <a:lnRef idx="1">
+            <a:schemeClr val="accent1"/>
+          </a:lnRef>
+          <a:fillRef idx="0">
+            <a:schemeClr val="accent1"/>
+          </a:fillRef>
+          <a:effectRef idx="0">
+            <a:schemeClr val="accent1"/>
+          </a:effectRef>
+          <a:fontRef idx="minor">
+            <a:schemeClr val="tx1"/>
+          </a:fontRef>
+        </p:style>
+      </p:cxnSp>
+      <p:sp>
+        <p:nvSpPr>
+          <p:cNvPr id="2" name="Slide Number Placeholder 1"/>
+          <p:cNvSpPr>
+            <a:spLocks noGrp="1"/>
+          </p:cNvSpPr>
+          <p:nvPr>
+            <p:ph type="sldNum" sz="quarter" idx="12"/>
+          </p:nvPr>
+        </p:nvSpPr>
+        <p:spPr/>
+        <p:txBody>
+          <a:bodyPr/>
+          <a:lstStyle/>
+          <a:p>
+            <a:fld id="{B6F15528-21DE-4FAA-801E-634DDDAF4B2B}" type="slidenum">
+              <a:rPr lang="en-US" smtClean="0"/>
+              <a:pPr/>
+              <a:t>11</a:t>
+            </a:fld>
+            <a:endParaRPr lang="en-US" dirty="0"/>
+          </a:p>
+        </p:txBody>
+      </p:sp>
+      <p:pic>
+        <p:nvPicPr>
+          <p:cNvPr id="14" name="Picture 2" descr="C:\Users\Mesut\Desktop\aselsan sunum\aselsan sunum 10 ekim\aselsan sunum\cezmi bey\ODTU.png"/>
+          <p:cNvPicPr>
+            <a:picLocks noChangeAspect="1" noChangeArrowheads="1"/>
+          </p:cNvPicPr>
+          <p:nvPr/>
+        </p:nvPicPr>
+        <p:blipFill>
+          <a:blip r:embed="rId2" cstate="print">
+            <a:extLst>
+              <a:ext uri="{28A0092B-C50C-407E-A947-70E740481C1C}">
+                <a14:useLocalDpi xmlns:a14="http://schemas.microsoft.com/office/drawing/2010/main" val="0"/>
+              </a:ext>
+            </a:extLst>
+          </a:blip>
+          <a:srcRect/>
+          <a:stretch>
+            <a:fillRect/>
+          </a:stretch>
+        </p:blipFill>
+        <p:spPr bwMode="auto">
+          <a:xfrm>
+            <a:off x="163507" y="266700"/>
+            <a:ext cx="684927" cy="571500"/>
+          </a:xfrm>
+          <a:prstGeom prst="rect">
+            <a:avLst/>
+          </a:prstGeom>
+          <a:noFill/>
+          <a:extLst>
+            <a:ext uri="{909E8E84-426E-40DD-AFC4-6F175D3DCCD1}">
+              <a14:hiddenFill xmlns:a14="http://schemas.microsoft.com/office/drawing/2010/main">
+                <a:solidFill>
+                  <a:srgbClr val="FFFFFF"/>
+                </a:solidFill>
+              </a14:hiddenFill>
+            </a:ext>
+          </a:extLst>
+        </p:spPr>
+      </p:pic>
+      <p:sp>
+        <p:nvSpPr>
+          <p:cNvPr id="16" name="Text Box 9"/>
+          <p:cNvSpPr txBox="1">
+            <a:spLocks noChangeArrowheads="1"/>
+          </p:cNvSpPr>
+          <p:nvPr/>
+        </p:nvSpPr>
+        <p:spPr bwMode="auto">
+          <a:xfrm>
+            <a:off x="1386291" y="1267818"/>
+            <a:ext cx="7035213" cy="1015663"/>
+          </a:xfrm>
+          <a:prstGeom prst="rect">
+            <a:avLst/>
+          </a:prstGeom>
+          <a:noFill/>
+          <a:ln w="9525">
+            <a:noFill/>
+            <a:miter lim="800000"/>
+            <a:headEnd/>
+            <a:tailEnd/>
+          </a:ln>
+          <a:effectLst/>
+        </p:spPr>
+        <p:txBody>
+          <a:bodyPr wrap="square">
+            <a:spAutoFit/>
+          </a:bodyPr>
+          <a:lstStyle/>
+          <a:p>
+            <a:pPr algn="just"/>
+            <a:r>
+              <a:rPr lang="tr-TR" sz="2000" b="1" dirty="0" smtClean="0">
+                <a:latin typeface="Times New Roman" panose="02020603050405020304" pitchFamily="18" charset="0"/>
+                <a:cs typeface="Times New Roman" panose="02020603050405020304" pitchFamily="18" charset="0"/>
+              </a:rPr>
+              <a:t>W</a:t>
+            </a:r>
+            <a:r>
+              <a:rPr lang="en-US" sz="2000" b="1" dirty="0" smtClean="0">
+                <a:latin typeface="Times New Roman" panose="02020603050405020304" pitchFamily="18" charset="0"/>
+                <a:cs typeface="Times New Roman" panose="02020603050405020304" pitchFamily="18" charset="0"/>
+              </a:rPr>
+              <a:t>ide </a:t>
+            </a:r>
+            <a:r>
+              <a:rPr lang="en-US" sz="2000" b="1" dirty="0" smtClean="0">
+                <a:latin typeface="Times New Roman" panose="02020603050405020304" pitchFamily="18" charset="0"/>
+                <a:cs typeface="Times New Roman" panose="02020603050405020304" pitchFamily="18" charset="0"/>
+              </a:rPr>
+              <a:t>band-gap (WBG) </a:t>
+            </a:r>
+            <a:r>
+              <a:rPr lang="en-US" sz="2000" dirty="0" smtClean="0">
+                <a:latin typeface="Times New Roman" panose="02020603050405020304" pitchFamily="18" charset="0"/>
+                <a:cs typeface="Times New Roman" panose="02020603050405020304" pitchFamily="18" charset="0"/>
+              </a:rPr>
+              <a:t>power semiconductor </a:t>
+            </a:r>
+            <a:r>
+              <a:rPr lang="en-US" sz="2000" dirty="0" smtClean="0">
+                <a:latin typeface="Times New Roman" panose="02020603050405020304" pitchFamily="18" charset="0"/>
+                <a:cs typeface="Times New Roman" panose="02020603050405020304" pitchFamily="18" charset="0"/>
+              </a:rPr>
+              <a:t>devices</a:t>
+            </a:r>
+            <a:endParaRPr lang="tr-TR" sz="2000" dirty="0" smtClean="0">
+              <a:latin typeface="Times New Roman" panose="02020603050405020304" pitchFamily="18" charset="0"/>
+              <a:cs typeface="Times New Roman" panose="02020603050405020304" pitchFamily="18" charset="0"/>
+            </a:endParaRPr>
+          </a:p>
+          <a:p>
+            <a:pPr algn="l"/>
+            <a:r>
+              <a:rPr lang="en-US" sz="2000" dirty="0" smtClean="0">
+                <a:latin typeface="Times New Roman" panose="02020603050405020304" pitchFamily="18" charset="0"/>
+                <a:cs typeface="Times New Roman" panose="02020603050405020304" pitchFamily="18" charset="0"/>
+              </a:rPr>
+              <a:t>Low </a:t>
+            </a:r>
+            <a:r>
+              <a:rPr lang="en-US" sz="2000" dirty="0" smtClean="0">
+                <a:latin typeface="Times New Roman" panose="02020603050405020304" pitchFamily="18" charset="0"/>
+                <a:cs typeface="Times New Roman" panose="02020603050405020304" pitchFamily="18" charset="0"/>
+              </a:rPr>
+              <a:t>semiconductor </a:t>
+            </a:r>
+            <a:r>
+              <a:rPr lang="en-US" sz="2000" dirty="0" smtClean="0">
+                <a:latin typeface="Times New Roman" panose="02020603050405020304" pitchFamily="18" charset="0"/>
+                <a:cs typeface="Times New Roman" panose="02020603050405020304" pitchFamily="18" charset="0"/>
+              </a:rPr>
+              <a:t>loss</a:t>
+            </a:r>
+            <a:r>
+              <a:rPr lang="en-US" sz="2000" dirty="0" smtClean="0">
+                <a:latin typeface="Times New Roman" panose="02020603050405020304" pitchFamily="18" charset="0"/>
+                <a:cs typeface="Times New Roman" panose="02020603050405020304" pitchFamily="18" charset="0"/>
+              </a:rPr>
+              <a:t>: </a:t>
+            </a:r>
+            <a:r>
+              <a:rPr lang="en-US" sz="2000" b="1" dirty="0" smtClean="0">
+                <a:latin typeface="Times New Roman" panose="02020603050405020304" pitchFamily="18" charset="0"/>
+                <a:cs typeface="Times New Roman" panose="02020603050405020304" pitchFamily="18" charset="0"/>
+              </a:rPr>
+              <a:t>heat sink </a:t>
+            </a:r>
+            <a:r>
+              <a:rPr lang="en-US" sz="2000" dirty="0" smtClean="0">
+                <a:latin typeface="Times New Roman" panose="02020603050405020304" pitchFamily="18" charset="0"/>
+                <a:cs typeface="Times New Roman" panose="02020603050405020304" pitchFamily="18" charset="0"/>
+              </a:rPr>
+              <a:t>size is </a:t>
+            </a:r>
+            <a:r>
+              <a:rPr lang="en-US" sz="2000" dirty="0" smtClean="0">
+                <a:latin typeface="Times New Roman" panose="02020603050405020304" pitchFamily="18" charset="0"/>
+                <a:cs typeface="Times New Roman" panose="02020603050405020304" pitchFamily="18" charset="0"/>
+              </a:rPr>
+              <a:t>reduced</a:t>
+            </a:r>
+            <a:endParaRPr lang="tr-TR" sz="2000" dirty="0">
+              <a:latin typeface="Times New Roman" panose="02020603050405020304" pitchFamily="18" charset="0"/>
+              <a:cs typeface="Times New Roman" panose="02020603050405020304" pitchFamily="18" charset="0"/>
+            </a:endParaRPr>
+          </a:p>
+          <a:p>
+            <a:pPr algn="l"/>
+            <a:r>
+              <a:rPr lang="en-US" sz="2000" dirty="0" smtClean="0">
+                <a:latin typeface="Times New Roman" panose="02020603050405020304" pitchFamily="18" charset="0"/>
+                <a:cs typeface="Times New Roman" panose="02020603050405020304" pitchFamily="18" charset="0"/>
+              </a:rPr>
+              <a:t>High </a:t>
+            </a:r>
+            <a:r>
+              <a:rPr lang="en-US" sz="2000" dirty="0" smtClean="0">
+                <a:latin typeface="Times New Roman" panose="02020603050405020304" pitchFamily="18" charset="0"/>
+                <a:cs typeface="Times New Roman" panose="02020603050405020304" pitchFamily="18" charset="0"/>
+              </a:rPr>
+              <a:t>operation frequency: </a:t>
+            </a:r>
+            <a:r>
+              <a:rPr lang="en-US" sz="2000" b="1" dirty="0" smtClean="0">
+                <a:latin typeface="Times New Roman" panose="02020603050405020304" pitchFamily="18" charset="0"/>
+                <a:cs typeface="Times New Roman" panose="02020603050405020304" pitchFamily="18" charset="0"/>
+              </a:rPr>
+              <a:t>passive component </a:t>
+            </a:r>
+            <a:r>
+              <a:rPr lang="en-US" sz="2000" dirty="0" smtClean="0">
+                <a:latin typeface="Times New Roman" panose="02020603050405020304" pitchFamily="18" charset="0"/>
+                <a:cs typeface="Times New Roman" panose="02020603050405020304" pitchFamily="18" charset="0"/>
+              </a:rPr>
+              <a:t>size is reduced</a:t>
+            </a:r>
+            <a:endParaRPr lang="en-US" sz="2000" dirty="0">
+              <a:latin typeface="Times New Roman" panose="02020603050405020304" pitchFamily="18" charset="0"/>
+              <a:cs typeface="Times New Roman" panose="02020603050405020304" pitchFamily="18" charset="0"/>
+            </a:endParaRPr>
+          </a:p>
+        </p:txBody>
+      </p:sp>
+      <p:sp>
+        <p:nvSpPr>
+          <p:cNvPr id="19" name="Text Box 9"/>
+          <p:cNvSpPr txBox="1">
+            <a:spLocks noChangeArrowheads="1"/>
+          </p:cNvSpPr>
+          <p:nvPr/>
+        </p:nvSpPr>
+        <p:spPr bwMode="auto">
+          <a:xfrm>
+            <a:off x="5460110" y="3191211"/>
+            <a:ext cx="3350515" cy="1631216"/>
+          </a:xfrm>
+          <a:prstGeom prst="rect">
+            <a:avLst/>
+          </a:prstGeom>
+          <a:noFill/>
+          <a:ln w="9525">
+            <a:noFill/>
+            <a:miter lim="800000"/>
+            <a:headEnd/>
+            <a:tailEnd/>
+          </a:ln>
+          <a:effectLst/>
+        </p:spPr>
+        <p:txBody>
+          <a:bodyPr wrap="square">
+            <a:spAutoFit/>
+          </a:bodyPr>
+          <a:lstStyle/>
+          <a:p>
+            <a:pPr marL="342900" indent="-342900" algn="just">
+              <a:buFont typeface="Arial" panose="020B0604020202020204" pitchFamily="34" charset="0"/>
+              <a:buChar char="•"/>
+            </a:pPr>
+            <a:r>
+              <a:rPr lang="en-US" sz="2000" dirty="0" smtClean="0">
+                <a:latin typeface="Times New Roman" panose="02020603050405020304" pitchFamily="18" charset="0"/>
+                <a:cs typeface="Times New Roman" panose="02020603050405020304" pitchFamily="18" charset="0"/>
+              </a:rPr>
+              <a:t>High speed device</a:t>
+            </a:r>
+          </a:p>
+          <a:p>
+            <a:pPr marL="342900" indent="-342900" algn="l">
+              <a:buFont typeface="Arial" panose="020B0604020202020204" pitchFamily="34" charset="0"/>
+              <a:buChar char="•"/>
+            </a:pPr>
+            <a:r>
+              <a:rPr lang="en-US" sz="2000" dirty="0" smtClean="0">
+                <a:latin typeface="Times New Roman" panose="02020603050405020304" pitchFamily="18" charset="0"/>
+                <a:cs typeface="Times New Roman" panose="02020603050405020304" pitchFamily="18" charset="0"/>
+              </a:rPr>
+              <a:t>Low </a:t>
+            </a:r>
+            <a:r>
+              <a:rPr lang="en-US" sz="2000" dirty="0" err="1" smtClean="0">
+                <a:latin typeface="Times New Roman" panose="02020603050405020304" pitchFamily="18" charset="0"/>
+                <a:cs typeface="Times New Roman" panose="02020603050405020304" pitchFamily="18" charset="0"/>
+              </a:rPr>
+              <a:t>R</a:t>
+            </a:r>
+            <a:r>
+              <a:rPr lang="en-US" sz="2000" baseline="-25000" dirty="0" err="1" smtClean="0">
+                <a:latin typeface="Times New Roman" panose="02020603050405020304" pitchFamily="18" charset="0"/>
+                <a:cs typeface="Times New Roman" panose="02020603050405020304" pitchFamily="18" charset="0"/>
+              </a:rPr>
+              <a:t>ds_on</a:t>
+            </a:r>
+            <a:endParaRPr lang="en-US" sz="2000" baseline="-25000" dirty="0" smtClean="0">
+              <a:latin typeface="Times New Roman" panose="02020603050405020304" pitchFamily="18" charset="0"/>
+              <a:cs typeface="Times New Roman" panose="02020603050405020304" pitchFamily="18" charset="0"/>
+            </a:endParaRPr>
+          </a:p>
+          <a:p>
+            <a:pPr marL="342900" indent="-342900" algn="l">
+              <a:buFont typeface="Arial" panose="020B0604020202020204" pitchFamily="34" charset="0"/>
+              <a:buChar char="•"/>
+            </a:pPr>
+            <a:r>
+              <a:rPr lang="en-US" sz="2000" dirty="0" smtClean="0">
+                <a:latin typeface="Times New Roman" panose="02020603050405020304" pitchFamily="18" charset="0"/>
+                <a:cs typeface="Times New Roman" panose="02020603050405020304" pitchFamily="18" charset="0"/>
+              </a:rPr>
+              <a:t>Low E</a:t>
+            </a:r>
+            <a:r>
+              <a:rPr lang="en-US" sz="2000" baseline="-25000" dirty="0" smtClean="0">
+                <a:latin typeface="Times New Roman" panose="02020603050405020304" pitchFamily="18" charset="0"/>
+                <a:cs typeface="Times New Roman" panose="02020603050405020304" pitchFamily="18" charset="0"/>
+              </a:rPr>
+              <a:t>on </a:t>
+            </a:r>
+            <a:r>
+              <a:rPr lang="en-US" sz="2000" dirty="0" smtClean="0">
+                <a:latin typeface="Times New Roman" panose="02020603050405020304" pitchFamily="18" charset="0"/>
+                <a:cs typeface="Times New Roman" panose="02020603050405020304" pitchFamily="18" charset="0"/>
+              </a:rPr>
+              <a:t>&amp; </a:t>
+            </a:r>
+            <a:r>
+              <a:rPr lang="en-US" sz="2000" dirty="0" err="1" smtClean="0">
+                <a:latin typeface="Times New Roman" panose="02020603050405020304" pitchFamily="18" charset="0"/>
+                <a:cs typeface="Times New Roman" panose="02020603050405020304" pitchFamily="18" charset="0"/>
+              </a:rPr>
+              <a:t>E</a:t>
+            </a:r>
+            <a:r>
+              <a:rPr lang="en-US" sz="2000" baseline="-25000" dirty="0" err="1" smtClean="0">
+                <a:latin typeface="Times New Roman" panose="02020603050405020304" pitchFamily="18" charset="0"/>
+                <a:cs typeface="Times New Roman" panose="02020603050405020304" pitchFamily="18" charset="0"/>
+              </a:rPr>
+              <a:t>off</a:t>
+            </a:r>
+            <a:endParaRPr lang="en-US" sz="2000" baseline="-25000" dirty="0" smtClean="0">
+              <a:latin typeface="Times New Roman" panose="02020603050405020304" pitchFamily="18" charset="0"/>
+              <a:cs typeface="Times New Roman" panose="02020603050405020304" pitchFamily="18" charset="0"/>
+            </a:endParaRPr>
+          </a:p>
+          <a:p>
+            <a:pPr marL="342900" indent="-342900" algn="l">
+              <a:buFont typeface="Arial" panose="020B0604020202020204" pitchFamily="34" charset="0"/>
+              <a:buChar char="•"/>
+            </a:pPr>
+            <a:r>
+              <a:rPr lang="en-US" sz="2000" dirty="0" smtClean="0">
+                <a:latin typeface="Times New Roman" panose="02020603050405020304" pitchFamily="18" charset="0"/>
+                <a:cs typeface="Times New Roman" panose="02020603050405020304" pitchFamily="18" charset="0"/>
+              </a:rPr>
+              <a:t>High junction temperature</a:t>
+            </a:r>
+            <a:endParaRPr lang="tr-TR" sz="2000" dirty="0" smtClean="0">
+              <a:latin typeface="Times New Roman" panose="02020603050405020304" pitchFamily="18" charset="0"/>
+              <a:cs typeface="Times New Roman" panose="02020603050405020304" pitchFamily="18" charset="0"/>
+            </a:endParaRPr>
+          </a:p>
+          <a:p>
+            <a:pPr marL="342900" indent="-342900" algn="l">
+              <a:buFont typeface="Arial" panose="020B0604020202020204" pitchFamily="34" charset="0"/>
+              <a:buChar char="•"/>
+            </a:pPr>
+            <a:r>
+              <a:rPr lang="tr-TR" sz="2000" dirty="0" err="1" smtClean="0">
+                <a:latin typeface="Times New Roman" panose="02020603050405020304" pitchFamily="18" charset="0"/>
+                <a:cs typeface="Times New Roman" panose="02020603050405020304" pitchFamily="18" charset="0"/>
+              </a:rPr>
+              <a:t>Low</a:t>
+            </a:r>
+            <a:r>
+              <a:rPr lang="tr-TR" sz="2000" dirty="0" smtClean="0">
+                <a:latin typeface="Times New Roman" panose="02020603050405020304" pitchFamily="18" charset="0"/>
+                <a:cs typeface="Times New Roman" panose="02020603050405020304" pitchFamily="18" charset="0"/>
+              </a:rPr>
+              <a:t> C</a:t>
+            </a:r>
+            <a:r>
+              <a:rPr lang="tr-TR" sz="2000" baseline="-25000" dirty="0" smtClean="0">
+                <a:latin typeface="Times New Roman" panose="02020603050405020304" pitchFamily="18" charset="0"/>
+                <a:cs typeface="Times New Roman" panose="02020603050405020304" pitchFamily="18" charset="0"/>
+              </a:rPr>
+              <a:t>in</a:t>
+            </a:r>
+            <a:r>
+              <a:rPr lang="tr-TR" sz="2000" dirty="0" smtClean="0">
+                <a:latin typeface="Times New Roman" panose="02020603050405020304" pitchFamily="18" charset="0"/>
+                <a:cs typeface="Times New Roman" panose="02020603050405020304" pitchFamily="18" charset="0"/>
+              </a:rPr>
+              <a:t> </a:t>
+            </a:r>
+            <a:r>
+              <a:rPr lang="tr-TR" sz="2000" dirty="0" err="1" smtClean="0">
+                <a:latin typeface="Times New Roman" panose="02020603050405020304" pitchFamily="18" charset="0"/>
+                <a:cs typeface="Times New Roman" panose="02020603050405020304" pitchFamily="18" charset="0"/>
+              </a:rPr>
+              <a:t>and</a:t>
+            </a:r>
+            <a:r>
+              <a:rPr lang="tr-TR" sz="2000" dirty="0" smtClean="0">
+                <a:latin typeface="Times New Roman" panose="02020603050405020304" pitchFamily="18" charset="0"/>
+                <a:cs typeface="Times New Roman" panose="02020603050405020304" pitchFamily="18" charset="0"/>
+              </a:rPr>
+              <a:t> </a:t>
+            </a:r>
+            <a:r>
+              <a:rPr lang="tr-TR" sz="2000" dirty="0" err="1" smtClean="0">
+                <a:latin typeface="Times New Roman" panose="02020603050405020304" pitchFamily="18" charset="0"/>
+                <a:cs typeface="Times New Roman" panose="02020603050405020304" pitchFamily="18" charset="0"/>
+              </a:rPr>
+              <a:t>C</a:t>
+            </a:r>
+            <a:r>
+              <a:rPr lang="tr-TR" sz="2000" baseline="-25000" dirty="0" err="1" smtClean="0">
+                <a:latin typeface="Times New Roman" panose="02020603050405020304" pitchFamily="18" charset="0"/>
+                <a:cs typeface="Times New Roman" panose="02020603050405020304" pitchFamily="18" charset="0"/>
+              </a:rPr>
+              <a:t>out</a:t>
+            </a:r>
+            <a:endParaRPr lang="en-US" sz="2000" baseline="-25000" dirty="0">
+              <a:latin typeface="Times New Roman" panose="02020603050405020304" pitchFamily="18" charset="0"/>
+              <a:cs typeface="Times New Roman" panose="02020603050405020304" pitchFamily="18" charset="0"/>
+            </a:endParaRPr>
+          </a:p>
+        </p:txBody>
+      </p:sp>
+      <p:pic>
+        <p:nvPicPr>
+          <p:cNvPr id="4" name="Picture 3"/>
+          <p:cNvPicPr>
+            <a:picLocks noChangeAspect="1"/>
+          </p:cNvPicPr>
+          <p:nvPr/>
+        </p:nvPicPr>
+        <p:blipFill>
+          <a:blip r:embed="rId3"/>
+          <a:stretch>
+            <a:fillRect/>
+          </a:stretch>
+        </p:blipFill>
+        <p:spPr>
+          <a:xfrm>
+            <a:off x="1524000" y="2819400"/>
+            <a:ext cx="3642051" cy="2598995"/>
+          </a:xfrm>
+          <a:prstGeom prst="rect">
+            <a:avLst/>
+          </a:prstGeom>
+        </p:spPr>
+      </p:pic>
+    </p:spTree>
+    <p:extLst>
+      <p:ext uri="{BB962C8B-B14F-4D97-AF65-F5344CB8AC3E}">
+        <p14:creationId xmlns:p14="http://schemas.microsoft.com/office/powerpoint/2010/main" val="3899661638"/>
+      </p:ext>
+    </p:extLst>
+  </p:cSld>
+  <p:clrMapOvr>
+    <a:masterClrMapping/>
+  </p:clrMapOvr>
+  <p:timing>
+    <p:tnLst>
+      <p:par>
+        <p:cTn id="1" dur="indefinite" restart="never" nodeType="tmRoot"/>
+      </p:par>
+    </p:tnLst>
+  </p:timing>
+</p:sld>
+</file>
+
+<file path=ppt/slides/slide12.xml><?xml version="1.0" encoding="utf-8"?>
+<p:sld xmlns:a="http://schemas.openxmlformats.org/drawingml/2006/main" xmlns:r="http://schemas.openxmlformats.org/officeDocument/2006/relationships" xmlns:p="http://schemas.openxmlformats.org/presentationml/2006/main">
+  <p:cSld>
+    <p:spTree>
+      <p:nvGrpSpPr>
+        <p:cNvPr id="1" name=""/>
+        <p:cNvGrpSpPr/>
+        <p:nvPr/>
+      </p:nvGrpSpPr>
+      <p:grpSpPr>
+        <a:xfrm>
+          <a:off x="0" y="0"/>
+          <a:ext cx="0" cy="0"/>
+          <a:chOff x="0" y="0"/>
+          <a:chExt cx="0" cy="0"/>
+        </a:xfrm>
+      </p:grpSpPr>
+      <p:sp>
+        <p:nvSpPr>
+          <p:cNvPr id="10" name="Rectangle 9"/>
+          <p:cNvSpPr/>
+          <p:nvPr/>
+        </p:nvSpPr>
+        <p:spPr>
+          <a:xfrm>
+            <a:off x="0" y="12106"/>
+            <a:ext cx="1011942" cy="6854083"/>
+          </a:xfrm>
+          <a:prstGeom prst="rect">
+            <a:avLst/>
+          </a:prstGeom>
+          <a:gradFill flip="none" rotWithShape="1">
+            <a:gsLst>
+              <a:gs pos="50000">
+                <a:srgbClr val="D00000"/>
+              </a:gs>
+              <a:gs pos="0">
+                <a:srgbClr val="FF0000">
+                  <a:shade val="30000"/>
+                  <a:satMod val="115000"/>
+                </a:srgbClr>
+              </a:gs>
+              <a:gs pos="100000">
+                <a:schemeClr val="accent2">
+                  <a:lumMod val="60000"/>
+                  <a:lumOff val="40000"/>
+                </a:schemeClr>
+              </a:gs>
+            </a:gsLst>
+            <a:lin ang="5400000" scaled="1"/>
+            <a:tileRect/>
+          </a:gradFill>
+          <a:ln>
+            <a:noFill/>
+          </a:ln>
+        </p:spPr>
+        <p:style>
+          <a:lnRef idx="2">
+            <a:schemeClr val="accent1">
+              <a:shade val="50000"/>
+            </a:schemeClr>
+          </a:lnRef>
+          <a:fillRef idx="1">
+            <a:schemeClr val="accent1"/>
+          </a:fillRef>
+          <a:effectRef idx="0">
+            <a:schemeClr val="accent1"/>
+          </a:effectRef>
+          <a:fontRef idx="minor">
+            <a:schemeClr val="lt1"/>
+          </a:fontRef>
+        </p:style>
+        <p:txBody>
+          <a:bodyPr rtlCol="0" anchor="ctr"/>
+          <a:lstStyle/>
+          <a:p>
+            <a:pPr algn="ctr"/>
+            <a:endParaRPr lang="tr-TR"/>
+          </a:p>
+        </p:txBody>
+      </p:sp>
+      <p:cxnSp>
+        <p:nvCxnSpPr>
+          <p:cNvPr id="11" name="Straight Connector 10"/>
+          <p:cNvCxnSpPr/>
+          <p:nvPr/>
+        </p:nvCxnSpPr>
+        <p:spPr>
+          <a:xfrm>
+            <a:off x="1189918" y="838200"/>
+            <a:ext cx="7649282" cy="0"/>
+          </a:xfrm>
+          <a:prstGeom prst="line">
+            <a:avLst/>
+          </a:prstGeom>
+          <a:ln w="50800">
+            <a:solidFill>
+              <a:srgbClr val="F20000"/>
+            </a:solidFill>
+          </a:ln>
+        </p:spPr>
+        <p:style>
+          <a:lnRef idx="1">
+            <a:schemeClr val="accent1"/>
+          </a:lnRef>
+          <a:fillRef idx="0">
+            <a:schemeClr val="accent1"/>
+          </a:fillRef>
+          <a:effectRef idx="0">
+            <a:schemeClr val="accent1"/>
+          </a:effectRef>
+          <a:fontRef idx="minor">
+            <a:schemeClr val="tx1"/>
+          </a:fontRef>
+        </p:style>
+      </p:cxnSp>
+      <p:sp>
+        <p:nvSpPr>
+          <p:cNvPr id="13" name="TextBox 12"/>
+          <p:cNvSpPr txBox="1"/>
+          <p:nvPr/>
+        </p:nvSpPr>
+        <p:spPr>
+          <a:xfrm>
+            <a:off x="1386291" y="224135"/>
+            <a:ext cx="7315200" cy="553998"/>
+          </a:xfrm>
+          <a:prstGeom prst="rect">
+            <a:avLst/>
+          </a:prstGeom>
+          <a:noFill/>
+        </p:spPr>
+        <p:txBody>
+          <a:bodyPr wrap="square" rtlCol="0">
+            <a:spAutoFit/>
+          </a:bodyPr>
+          <a:lstStyle/>
+          <a:p>
+            <a:pPr algn="ctr"/>
+            <a:r>
+              <a:rPr lang="tr-TR" sz="3000" dirty="0" err="1" smtClean="0">
+                <a:latin typeface="Times New Roman" panose="02020603050405020304" pitchFamily="18" charset="0"/>
+                <a:cs typeface="Times New Roman" panose="02020603050405020304" pitchFamily="18" charset="0"/>
+              </a:rPr>
+              <a:t>Gallium</a:t>
+            </a:r>
+            <a:r>
+              <a:rPr lang="tr-TR" sz="3000" dirty="0" smtClean="0">
+                <a:latin typeface="Times New Roman" panose="02020603050405020304" pitchFamily="18" charset="0"/>
+                <a:cs typeface="Times New Roman" panose="02020603050405020304" pitchFamily="18" charset="0"/>
+              </a:rPr>
+              <a:t> </a:t>
+            </a:r>
+            <a:r>
+              <a:rPr lang="tr-TR" sz="3000" dirty="0" err="1" smtClean="0">
+                <a:latin typeface="Times New Roman" panose="02020603050405020304" pitchFamily="18" charset="0"/>
+                <a:cs typeface="Times New Roman" panose="02020603050405020304" pitchFamily="18" charset="0"/>
+              </a:rPr>
+              <a:t>Nitride</a:t>
+            </a:r>
+            <a:r>
+              <a:rPr lang="tr-TR" sz="3000" dirty="0" smtClean="0">
+                <a:latin typeface="Times New Roman" panose="02020603050405020304" pitchFamily="18" charset="0"/>
+                <a:cs typeface="Times New Roman" panose="02020603050405020304" pitchFamily="18" charset="0"/>
+              </a:rPr>
+              <a:t> (GaN) </a:t>
+            </a:r>
+            <a:r>
+              <a:rPr lang="tr-TR" sz="3000" dirty="0" err="1" smtClean="0">
+                <a:latin typeface="Times New Roman" panose="02020603050405020304" pitchFamily="18" charset="0"/>
+                <a:cs typeface="Times New Roman" panose="02020603050405020304" pitchFamily="18" charset="0"/>
+              </a:rPr>
+              <a:t>Power</a:t>
+            </a:r>
+            <a:r>
+              <a:rPr lang="tr-TR" sz="3000" dirty="0" smtClean="0">
+                <a:latin typeface="Times New Roman" panose="02020603050405020304" pitchFamily="18" charset="0"/>
+                <a:cs typeface="Times New Roman" panose="02020603050405020304" pitchFamily="18" charset="0"/>
+              </a:rPr>
+              <a:t> </a:t>
+            </a:r>
+            <a:r>
+              <a:rPr lang="tr-TR" sz="3000" dirty="0" err="1" smtClean="0">
+                <a:latin typeface="Times New Roman" panose="02020603050405020304" pitchFamily="18" charset="0"/>
+                <a:cs typeface="Times New Roman" panose="02020603050405020304" pitchFamily="18" charset="0"/>
+              </a:rPr>
+              <a:t>Semiconductors</a:t>
+            </a:r>
+            <a:endParaRPr lang="tr-TR" sz="3000" dirty="0">
+              <a:latin typeface="Times New Roman" panose="02020603050405020304" pitchFamily="18" charset="0"/>
+              <a:cs typeface="Times New Roman" panose="02020603050405020304" pitchFamily="18" charset="0"/>
+            </a:endParaRPr>
+          </a:p>
+        </p:txBody>
+      </p:sp>
+      <p:cxnSp>
+        <p:nvCxnSpPr>
+          <p:cNvPr id="15" name="Straight Connector 14"/>
+          <p:cNvCxnSpPr/>
+          <p:nvPr/>
+        </p:nvCxnSpPr>
+        <p:spPr>
+          <a:xfrm>
+            <a:off x="1189918" y="914400"/>
+            <a:ext cx="7649282" cy="0"/>
+          </a:xfrm>
+          <a:prstGeom prst="line">
+            <a:avLst/>
+          </a:prstGeom>
+          <a:ln w="19050">
+            <a:solidFill>
+              <a:srgbClr val="F20000"/>
+            </a:solidFill>
+          </a:ln>
+        </p:spPr>
+        <p:style>
+          <a:lnRef idx="1">
+            <a:schemeClr val="accent1"/>
+          </a:lnRef>
+          <a:fillRef idx="0">
+            <a:schemeClr val="accent1"/>
+          </a:fillRef>
+          <a:effectRef idx="0">
+            <a:schemeClr val="accent1"/>
+          </a:effectRef>
+          <a:fontRef idx="minor">
+            <a:schemeClr val="tx1"/>
+          </a:fontRef>
+        </p:style>
+      </p:cxnSp>
+      <p:sp>
+        <p:nvSpPr>
+          <p:cNvPr id="2" name="Slide Number Placeholder 1"/>
+          <p:cNvSpPr>
+            <a:spLocks noGrp="1"/>
+          </p:cNvSpPr>
+          <p:nvPr>
+            <p:ph type="sldNum" sz="quarter" idx="12"/>
+          </p:nvPr>
+        </p:nvSpPr>
+        <p:spPr/>
+        <p:txBody>
+          <a:bodyPr/>
+          <a:lstStyle/>
+          <a:p>
+            <a:fld id="{B6F15528-21DE-4FAA-801E-634DDDAF4B2B}" type="slidenum">
+              <a:rPr lang="en-US" smtClean="0"/>
+              <a:pPr/>
+              <a:t>12</a:t>
+            </a:fld>
+            <a:endParaRPr lang="en-US" dirty="0"/>
+          </a:p>
+        </p:txBody>
+      </p:sp>
+      <p:pic>
+        <p:nvPicPr>
+          <p:cNvPr id="14" name="Picture 2" descr="C:\Users\Mesut\Desktop\aselsan sunum\aselsan sunum 10 ekim\aselsan sunum\cezmi bey\ODTU.png"/>
+          <p:cNvPicPr>
+            <a:picLocks noChangeAspect="1" noChangeArrowheads="1"/>
+          </p:cNvPicPr>
+          <p:nvPr/>
+        </p:nvPicPr>
+        <p:blipFill>
+          <a:blip r:embed="rId2" cstate="print">
+            <a:extLst>
+              <a:ext uri="{28A0092B-C50C-407E-A947-70E740481C1C}">
+                <a14:useLocalDpi xmlns:a14="http://schemas.microsoft.com/office/drawing/2010/main" val="0"/>
+              </a:ext>
+            </a:extLst>
+          </a:blip>
+          <a:srcRect/>
+          <a:stretch>
+            <a:fillRect/>
+          </a:stretch>
+        </p:blipFill>
+        <p:spPr bwMode="auto">
+          <a:xfrm>
+            <a:off x="163507" y="266700"/>
+            <a:ext cx="684927" cy="571500"/>
+          </a:xfrm>
+          <a:prstGeom prst="rect">
+            <a:avLst/>
+          </a:prstGeom>
+          <a:noFill/>
+          <a:extLst>
+            <a:ext uri="{909E8E84-426E-40DD-AFC4-6F175D3DCCD1}">
+              <a14:hiddenFill xmlns:a14="http://schemas.microsoft.com/office/drawing/2010/main">
+                <a:solidFill>
+                  <a:srgbClr val="FFFFFF"/>
+                </a:solidFill>
+              </a14:hiddenFill>
+            </a:ext>
+          </a:extLst>
+        </p:spPr>
+      </p:pic>
+      <p:pic>
+        <p:nvPicPr>
+          <p:cNvPr id="12" name="Picture 11"/>
+          <p:cNvPicPr>
+            <a:picLocks noChangeAspect="1"/>
+          </p:cNvPicPr>
+          <p:nvPr/>
+        </p:nvPicPr>
+        <p:blipFill>
+          <a:blip r:embed="rId3">
+            <a:extLst>
+              <a:ext uri="{28A0092B-C50C-407E-A947-70E740481C1C}">
+                <a14:useLocalDpi xmlns:a14="http://schemas.microsoft.com/office/drawing/2010/main" val="0"/>
+              </a:ext>
+            </a:extLst>
+          </a:blip>
+          <a:stretch>
+            <a:fillRect/>
+          </a:stretch>
+        </p:blipFill>
+        <p:spPr>
+          <a:xfrm>
+            <a:off x="3893545" y="3624560"/>
+            <a:ext cx="3124200" cy="2759711"/>
+          </a:xfrm>
+          <a:prstGeom prst="rect">
+            <a:avLst/>
+          </a:prstGeom>
+        </p:spPr>
+      </p:pic>
+      <p:sp>
+        <p:nvSpPr>
+          <p:cNvPr id="16" name="Text Box 9"/>
+          <p:cNvSpPr txBox="1">
+            <a:spLocks noChangeArrowheads="1"/>
+          </p:cNvSpPr>
+          <p:nvPr/>
+        </p:nvSpPr>
+        <p:spPr bwMode="auto">
+          <a:xfrm>
+            <a:off x="1386291" y="1267818"/>
+            <a:ext cx="5014509" cy="2345322"/>
+          </a:xfrm>
+          <a:prstGeom prst="rect">
+            <a:avLst/>
+          </a:prstGeom>
+          <a:noFill/>
+          <a:ln w="9525">
+            <a:noFill/>
+            <a:miter lim="800000"/>
+            <a:headEnd/>
+            <a:tailEnd/>
+          </a:ln>
+          <a:effectLst/>
+        </p:spPr>
+        <p:txBody>
+          <a:bodyPr wrap="square">
+            <a:spAutoFit/>
+          </a:bodyPr>
+          <a:lstStyle/>
+          <a:p>
+            <a:pPr marL="457200" indent="-457200">
+              <a:lnSpc>
+                <a:spcPct val="150000"/>
+              </a:lnSpc>
+              <a:buFont typeface="Arial" panose="020B0604020202020204" pitchFamily="34" charset="0"/>
+              <a:buChar char="•"/>
+            </a:pPr>
+            <a:r>
+              <a:rPr lang="en-US" sz="2000" dirty="0" smtClean="0">
+                <a:latin typeface="Times New Roman" panose="02020603050405020304" pitchFamily="18" charset="0"/>
+                <a:cs typeface="Times New Roman" panose="02020603050405020304" pitchFamily="18" charset="0"/>
+              </a:rPr>
+              <a:t>Parasitic components become significant</a:t>
+            </a:r>
+          </a:p>
+          <a:p>
+            <a:pPr marL="457200" indent="-457200">
+              <a:lnSpc>
+                <a:spcPct val="150000"/>
+              </a:lnSpc>
+              <a:buFont typeface="Arial" panose="020B0604020202020204" pitchFamily="34" charset="0"/>
+              <a:buChar char="•"/>
+            </a:pPr>
+            <a:r>
+              <a:rPr lang="en-US" sz="2000" dirty="0" smtClean="0">
+                <a:latin typeface="Times New Roman" panose="02020603050405020304" pitchFamily="18" charset="0"/>
+                <a:cs typeface="Times New Roman" panose="02020603050405020304" pitchFamily="18" charset="0"/>
+              </a:rPr>
+              <a:t>Careful layout design is required</a:t>
+            </a:r>
+          </a:p>
+          <a:p>
+            <a:pPr marL="457200" indent="-457200">
+              <a:lnSpc>
+                <a:spcPct val="150000"/>
+              </a:lnSpc>
+              <a:buFont typeface="Arial" panose="020B0604020202020204" pitchFamily="34" charset="0"/>
+              <a:buChar char="•"/>
+            </a:pPr>
+            <a:r>
+              <a:rPr lang="en-US" sz="2000" dirty="0" smtClean="0">
+                <a:latin typeface="Times New Roman" panose="02020603050405020304" pitchFamily="18" charset="0"/>
+                <a:cs typeface="Times New Roman" panose="02020603050405020304" pitchFamily="18" charset="0"/>
+              </a:rPr>
+              <a:t>Commercial availability</a:t>
+            </a:r>
+          </a:p>
+          <a:p>
+            <a:pPr marL="457200" indent="-457200">
+              <a:lnSpc>
+                <a:spcPct val="150000"/>
+              </a:lnSpc>
+              <a:buFont typeface="Arial" panose="020B0604020202020204" pitchFamily="34" charset="0"/>
+              <a:buChar char="•"/>
+            </a:pPr>
+            <a:r>
+              <a:rPr lang="en-US" sz="2000" dirty="0" smtClean="0">
+                <a:latin typeface="Times New Roman" panose="02020603050405020304" pitchFamily="18" charset="0"/>
+                <a:cs typeface="Times New Roman" panose="02020603050405020304" pitchFamily="18" charset="0"/>
+              </a:rPr>
+              <a:t>Low ratings</a:t>
+            </a:r>
+          </a:p>
+          <a:p>
+            <a:pPr marL="457200" indent="-457200">
+              <a:lnSpc>
+                <a:spcPct val="150000"/>
+              </a:lnSpc>
+              <a:buFont typeface="Arial" panose="020B0604020202020204" pitchFamily="34" charset="0"/>
+              <a:buChar char="•"/>
+            </a:pPr>
+            <a:r>
+              <a:rPr lang="en-US" sz="2000" dirty="0" smtClean="0">
+                <a:latin typeface="Times New Roman" panose="02020603050405020304" pitchFamily="18" charset="0"/>
+                <a:cs typeface="Times New Roman" panose="02020603050405020304" pitchFamily="18" charset="0"/>
+              </a:rPr>
+              <a:t>Reliability</a:t>
+            </a:r>
+            <a:endParaRPr lang="en-US" sz="2000" dirty="0">
+              <a:latin typeface="Times New Roman" panose="02020603050405020304" pitchFamily="18" charset="0"/>
+              <a:cs typeface="Times New Roman" panose="02020603050405020304" pitchFamily="18" charset="0"/>
+            </a:endParaRPr>
+          </a:p>
+        </p:txBody>
+      </p:sp>
+    </p:spTree>
+    <p:extLst>
+      <p:ext uri="{BB962C8B-B14F-4D97-AF65-F5344CB8AC3E}">
+        <p14:creationId xmlns:p14="http://schemas.microsoft.com/office/powerpoint/2010/main" val="685465704"/>
+      </p:ext>
+    </p:extLst>
+  </p:cSld>
+  <p:clrMapOvr>
+    <a:masterClrMapping/>
+  </p:clrMapOvr>
+  <p:timing>
+    <p:tnLst>
+      <p:par>
+        <p:cTn id="1" dur="indefinite" restart="never" nodeType="tmRoot"/>
+      </p:par>
+    </p:tnLst>
+  </p:timing>
+</p:sld>
+</file>
+
+<file path=ppt/slides/slide13.xml><?xml version="1.0" encoding="utf-8"?>
+<p:sld xmlns:a="http://schemas.openxmlformats.org/drawingml/2006/main" xmlns:r="http://schemas.openxmlformats.org/officeDocument/2006/relationships" xmlns:p="http://schemas.openxmlformats.org/presentationml/2006/main">
+  <p:cSld>
+    <p:spTree>
+      <p:nvGrpSpPr>
+        <p:cNvPr id="1" name=""/>
+        <p:cNvGrpSpPr/>
+        <p:nvPr/>
+      </p:nvGrpSpPr>
+      <p:grpSpPr>
+        <a:xfrm>
+          <a:off x="0" y="0"/>
+          <a:ext cx="0" cy="0"/>
+          <a:chOff x="0" y="0"/>
+          <a:chExt cx="0" cy="0"/>
+        </a:xfrm>
+      </p:grpSpPr>
+      <p:sp>
+        <p:nvSpPr>
+          <p:cNvPr id="10" name="Rectangle 9"/>
+          <p:cNvSpPr/>
+          <p:nvPr/>
+        </p:nvSpPr>
+        <p:spPr>
+          <a:xfrm>
+            <a:off x="0" y="12106"/>
+            <a:ext cx="1011942" cy="6854083"/>
+          </a:xfrm>
+          <a:prstGeom prst="rect">
+            <a:avLst/>
+          </a:prstGeom>
+          <a:gradFill flip="none" rotWithShape="1">
+            <a:gsLst>
+              <a:gs pos="50000">
+                <a:srgbClr val="D00000"/>
+              </a:gs>
+              <a:gs pos="0">
+                <a:srgbClr val="FF0000">
+                  <a:shade val="30000"/>
+                  <a:satMod val="115000"/>
+                </a:srgbClr>
+              </a:gs>
+              <a:gs pos="100000">
+                <a:schemeClr val="accent2">
+                  <a:lumMod val="60000"/>
+                  <a:lumOff val="40000"/>
+                </a:schemeClr>
+              </a:gs>
+            </a:gsLst>
+            <a:lin ang="5400000" scaled="1"/>
+            <a:tileRect/>
+          </a:gradFill>
+          <a:ln>
+            <a:noFill/>
+          </a:ln>
+        </p:spPr>
+        <p:style>
+          <a:lnRef idx="2">
+            <a:schemeClr val="accent1">
+              <a:shade val="50000"/>
+            </a:schemeClr>
+          </a:lnRef>
+          <a:fillRef idx="1">
+            <a:schemeClr val="accent1"/>
+          </a:fillRef>
+          <a:effectRef idx="0">
+            <a:schemeClr val="accent1"/>
+          </a:effectRef>
+          <a:fontRef idx="minor">
+            <a:schemeClr val="lt1"/>
+          </a:fontRef>
+        </p:style>
+        <p:txBody>
+          <a:bodyPr rtlCol="0" anchor="ctr"/>
+          <a:lstStyle/>
+          <a:p>
+            <a:pPr algn="ctr"/>
+            <a:endParaRPr lang="tr-TR"/>
+          </a:p>
+        </p:txBody>
+      </p:sp>
+      <p:cxnSp>
+        <p:nvCxnSpPr>
+          <p:cNvPr id="11" name="Straight Connector 10"/>
+          <p:cNvCxnSpPr/>
+          <p:nvPr/>
+        </p:nvCxnSpPr>
+        <p:spPr>
+          <a:xfrm>
+            <a:off x="1189918" y="838200"/>
+            <a:ext cx="7649282" cy="0"/>
+          </a:xfrm>
+          <a:prstGeom prst="line">
+            <a:avLst/>
+          </a:prstGeom>
+          <a:ln w="50800">
+            <a:solidFill>
+              <a:srgbClr val="F20000"/>
+            </a:solidFill>
+          </a:ln>
+        </p:spPr>
+        <p:style>
+          <a:lnRef idx="1">
+            <a:schemeClr val="accent1"/>
+          </a:lnRef>
+          <a:fillRef idx="0">
+            <a:schemeClr val="accent1"/>
+          </a:fillRef>
+          <a:effectRef idx="0">
+            <a:schemeClr val="accent1"/>
+          </a:effectRef>
+          <a:fontRef idx="minor">
+            <a:schemeClr val="tx1"/>
+          </a:fontRef>
+        </p:style>
+      </p:cxnSp>
+      <p:sp>
+        <p:nvSpPr>
+          <p:cNvPr id="13" name="TextBox 12"/>
+          <p:cNvSpPr txBox="1"/>
+          <p:nvPr/>
+        </p:nvSpPr>
+        <p:spPr>
+          <a:xfrm>
+            <a:off x="1386291" y="224135"/>
+            <a:ext cx="7315200" cy="553998"/>
+          </a:xfrm>
+          <a:prstGeom prst="rect">
+            <a:avLst/>
+          </a:prstGeom>
+          <a:noFill/>
+        </p:spPr>
+        <p:txBody>
+          <a:bodyPr wrap="square" rtlCol="0">
+            <a:spAutoFit/>
+          </a:bodyPr>
+          <a:lstStyle/>
+          <a:p>
+            <a:pPr algn="ctr"/>
+            <a:r>
+              <a:rPr lang="tr-TR" sz="3000" dirty="0" smtClean="0">
+                <a:latin typeface="Times New Roman" panose="02020603050405020304" pitchFamily="18" charset="0"/>
+                <a:cs typeface="Times New Roman" panose="02020603050405020304" pitchFamily="18" charset="0"/>
+              </a:rPr>
+              <a:t>DC Link </a:t>
+            </a:r>
+            <a:r>
+              <a:rPr lang="tr-TR" sz="3000" dirty="0" err="1" smtClean="0">
+                <a:latin typeface="Times New Roman" panose="02020603050405020304" pitchFamily="18" charset="0"/>
+                <a:cs typeface="Times New Roman" panose="02020603050405020304" pitchFamily="18" charset="0"/>
+              </a:rPr>
+              <a:t>Capacitors</a:t>
+            </a:r>
+            <a:endParaRPr lang="tr-TR" sz="3000" dirty="0">
+              <a:latin typeface="Times New Roman" panose="02020603050405020304" pitchFamily="18" charset="0"/>
+              <a:cs typeface="Times New Roman" panose="02020603050405020304" pitchFamily="18" charset="0"/>
+            </a:endParaRPr>
+          </a:p>
+        </p:txBody>
+      </p:sp>
+      <p:cxnSp>
+        <p:nvCxnSpPr>
+          <p:cNvPr id="15" name="Straight Connector 14"/>
+          <p:cNvCxnSpPr/>
+          <p:nvPr/>
+        </p:nvCxnSpPr>
+        <p:spPr>
+          <a:xfrm>
+            <a:off x="1189918" y="914400"/>
+            <a:ext cx="7649282" cy="0"/>
+          </a:xfrm>
+          <a:prstGeom prst="line">
+            <a:avLst/>
+          </a:prstGeom>
+          <a:ln w="19050">
+            <a:solidFill>
+              <a:srgbClr val="F20000"/>
+            </a:solidFill>
+          </a:ln>
+        </p:spPr>
+        <p:style>
+          <a:lnRef idx="1">
+            <a:schemeClr val="accent1"/>
+          </a:lnRef>
+          <a:fillRef idx="0">
+            <a:schemeClr val="accent1"/>
+          </a:fillRef>
+          <a:effectRef idx="0">
+            <a:schemeClr val="accent1"/>
+          </a:effectRef>
+          <a:fontRef idx="minor">
+            <a:schemeClr val="tx1"/>
+          </a:fontRef>
+        </p:style>
+      </p:cxnSp>
+      <p:sp>
+        <p:nvSpPr>
+          <p:cNvPr id="2" name="Slide Number Placeholder 1"/>
+          <p:cNvSpPr>
+            <a:spLocks noGrp="1"/>
+          </p:cNvSpPr>
+          <p:nvPr>
+            <p:ph type="sldNum" sz="quarter" idx="12"/>
+          </p:nvPr>
+        </p:nvSpPr>
+        <p:spPr/>
+        <p:txBody>
+          <a:bodyPr/>
+          <a:lstStyle/>
+          <a:p>
+            <a:fld id="{B6F15528-21DE-4FAA-801E-634DDDAF4B2B}" type="slidenum">
+              <a:rPr lang="en-US" smtClean="0"/>
+              <a:pPr/>
+              <a:t>13</a:t>
+            </a:fld>
+            <a:endParaRPr lang="en-US" dirty="0"/>
+          </a:p>
+        </p:txBody>
+      </p:sp>
+      <p:pic>
+        <p:nvPicPr>
+          <p:cNvPr id="14" name="Picture 2" descr="C:\Users\Mesut\Desktop\aselsan sunum\aselsan sunum 10 ekim\aselsan sunum\cezmi bey\ODTU.png"/>
+          <p:cNvPicPr>
+            <a:picLocks noChangeAspect="1" noChangeArrowheads="1"/>
+          </p:cNvPicPr>
+          <p:nvPr/>
+        </p:nvPicPr>
+        <p:blipFill>
+          <a:blip r:embed="rId2" cstate="print">
+            <a:extLst>
+              <a:ext uri="{28A0092B-C50C-407E-A947-70E740481C1C}">
+                <a14:useLocalDpi xmlns:a14="http://schemas.microsoft.com/office/drawing/2010/main" val="0"/>
+              </a:ext>
+            </a:extLst>
+          </a:blip>
+          <a:srcRect/>
+          <a:stretch>
+            <a:fillRect/>
+          </a:stretch>
+        </p:blipFill>
+        <p:spPr bwMode="auto">
+          <a:xfrm>
+            <a:off x="163507" y="266700"/>
+            <a:ext cx="684927" cy="571500"/>
+          </a:xfrm>
+          <a:prstGeom prst="rect">
+            <a:avLst/>
+          </a:prstGeom>
+          <a:noFill/>
+          <a:extLst>
+            <a:ext uri="{909E8E84-426E-40DD-AFC4-6F175D3DCCD1}">
+              <a14:hiddenFill xmlns:a14="http://schemas.microsoft.com/office/drawing/2010/main">
+                <a:solidFill>
+                  <a:srgbClr val="FFFFFF"/>
+                </a:solidFill>
+              </a14:hiddenFill>
+            </a:ext>
+          </a:extLst>
+        </p:spPr>
+      </p:pic>
+      <p:sp>
+        <p:nvSpPr>
+          <p:cNvPr id="16" name="Text Box 9"/>
+          <p:cNvSpPr txBox="1">
+            <a:spLocks noChangeArrowheads="1"/>
+          </p:cNvSpPr>
+          <p:nvPr/>
+        </p:nvSpPr>
+        <p:spPr bwMode="auto">
+          <a:xfrm>
+            <a:off x="1189918" y="1591640"/>
+            <a:ext cx="3414309" cy="1015663"/>
+          </a:xfrm>
+          <a:prstGeom prst="rect">
+            <a:avLst/>
+          </a:prstGeom>
+          <a:noFill/>
+          <a:ln w="9525">
+            <a:noFill/>
+            <a:miter lim="800000"/>
+            <a:headEnd/>
+            <a:tailEnd/>
+          </a:ln>
+          <a:effectLst/>
+        </p:spPr>
+        <p:txBody>
+          <a:bodyPr wrap="square">
+            <a:spAutoFit/>
+          </a:bodyPr>
+          <a:lstStyle/>
+          <a:p>
+            <a:r>
+              <a:rPr lang="en-US" sz="2000" dirty="0">
+                <a:latin typeface="Times New Roman" panose="02020603050405020304" pitchFamily="18" charset="0"/>
+                <a:cs typeface="Times New Roman" panose="02020603050405020304" pitchFamily="18" charset="0"/>
+              </a:rPr>
+              <a:t>DC link capacitors </a:t>
+            </a:r>
+            <a:r>
+              <a:rPr lang="en-US" sz="2000" dirty="0" smtClean="0">
+                <a:latin typeface="Times New Roman" panose="02020603050405020304" pitchFamily="18" charset="0"/>
+                <a:cs typeface="Times New Roman" panose="02020603050405020304" pitchFamily="18" charset="0"/>
+              </a:rPr>
+              <a:t>constitute</a:t>
+            </a:r>
+            <a:endParaRPr lang="tr-TR" sz="2000" dirty="0">
+              <a:latin typeface="Times New Roman" panose="02020603050405020304" pitchFamily="18" charset="0"/>
+              <a:cs typeface="Times New Roman" panose="02020603050405020304" pitchFamily="18" charset="0"/>
+            </a:endParaRPr>
+          </a:p>
+          <a:p>
+            <a:pPr marL="457200" indent="-457200">
+              <a:buFont typeface="Arial" panose="020B0604020202020204" pitchFamily="34" charset="0"/>
+              <a:buChar char="•"/>
+            </a:pPr>
+            <a:r>
+              <a:rPr lang="en-US" sz="2000" dirty="0">
+                <a:latin typeface="Times New Roman" panose="02020603050405020304" pitchFamily="18" charset="0"/>
+                <a:cs typeface="Times New Roman" panose="02020603050405020304" pitchFamily="18" charset="0"/>
+              </a:rPr>
+              <a:t>20% of </a:t>
+            </a:r>
+            <a:r>
+              <a:rPr lang="en-US" sz="2000" b="1" dirty="0">
+                <a:latin typeface="Times New Roman" panose="02020603050405020304" pitchFamily="18" charset="0"/>
+                <a:cs typeface="Times New Roman" panose="02020603050405020304" pitchFamily="18" charset="0"/>
+              </a:rPr>
+              <a:t>cost</a:t>
+            </a:r>
+            <a:r>
+              <a:rPr lang="en-US" sz="2000" dirty="0">
+                <a:latin typeface="Times New Roman" panose="02020603050405020304" pitchFamily="18" charset="0"/>
+                <a:cs typeface="Times New Roman" panose="02020603050405020304" pitchFamily="18" charset="0"/>
+              </a:rPr>
+              <a:t> and </a:t>
+            </a:r>
+            <a:r>
+              <a:rPr lang="en-US" sz="2000" b="1" dirty="0" smtClean="0">
+                <a:latin typeface="Times New Roman" panose="02020603050405020304" pitchFamily="18" charset="0"/>
+                <a:cs typeface="Times New Roman" panose="02020603050405020304" pitchFamily="18" charset="0"/>
+              </a:rPr>
+              <a:t>weight</a:t>
+            </a:r>
+            <a:endParaRPr lang="tr-TR" sz="2000" dirty="0">
+              <a:latin typeface="Times New Roman" panose="02020603050405020304" pitchFamily="18" charset="0"/>
+              <a:cs typeface="Times New Roman" panose="02020603050405020304" pitchFamily="18" charset="0"/>
+            </a:endParaRPr>
+          </a:p>
+          <a:p>
+            <a:pPr marL="457200" indent="-457200">
+              <a:buFont typeface="Arial" panose="020B0604020202020204" pitchFamily="34" charset="0"/>
+              <a:buChar char="•"/>
+            </a:pPr>
+            <a:r>
+              <a:rPr lang="en-US" sz="2000" dirty="0">
+                <a:latin typeface="Times New Roman" panose="02020603050405020304" pitchFamily="18" charset="0"/>
+                <a:cs typeface="Times New Roman" panose="02020603050405020304" pitchFamily="18" charset="0"/>
+              </a:rPr>
+              <a:t>30% of </a:t>
+            </a:r>
+            <a:r>
+              <a:rPr lang="en-US" sz="2000" b="1" dirty="0" smtClean="0">
+                <a:latin typeface="Times New Roman" panose="02020603050405020304" pitchFamily="18" charset="0"/>
+                <a:cs typeface="Times New Roman" panose="02020603050405020304" pitchFamily="18" charset="0"/>
+              </a:rPr>
+              <a:t>volume</a:t>
+            </a:r>
+            <a:endParaRPr lang="en-US" sz="2000" b="1" dirty="0">
+              <a:latin typeface="Times New Roman" panose="02020603050405020304" pitchFamily="18" charset="0"/>
+              <a:cs typeface="Times New Roman" panose="02020603050405020304" pitchFamily="18" charset="0"/>
+            </a:endParaRPr>
+          </a:p>
+        </p:txBody>
+      </p:sp>
+      <p:pic>
+        <p:nvPicPr>
+          <p:cNvPr id="17" name="Picture 16"/>
+          <p:cNvPicPr>
+            <a:picLocks noChangeAspect="1"/>
+          </p:cNvPicPr>
+          <p:nvPr/>
+        </p:nvPicPr>
+        <p:blipFill>
+          <a:blip r:embed="rId3"/>
+          <a:stretch>
+            <a:fillRect/>
+          </a:stretch>
+        </p:blipFill>
+        <p:spPr>
+          <a:xfrm>
+            <a:off x="4495800" y="1199210"/>
+            <a:ext cx="4419600" cy="1771335"/>
+          </a:xfrm>
+          <a:prstGeom prst="rect">
+            <a:avLst/>
+          </a:prstGeom>
+        </p:spPr>
+      </p:pic>
+      <p:sp>
+        <p:nvSpPr>
+          <p:cNvPr id="18" name="Text Box 9"/>
+          <p:cNvSpPr txBox="1">
+            <a:spLocks noChangeArrowheads="1"/>
+          </p:cNvSpPr>
+          <p:nvPr/>
+        </p:nvSpPr>
+        <p:spPr bwMode="auto">
+          <a:xfrm>
+            <a:off x="1218493" y="3226488"/>
+            <a:ext cx="3414309" cy="1015663"/>
+          </a:xfrm>
+          <a:prstGeom prst="rect">
+            <a:avLst/>
+          </a:prstGeom>
+          <a:noFill/>
+          <a:ln w="9525">
+            <a:noFill/>
+            <a:miter lim="800000"/>
+            <a:headEnd/>
+            <a:tailEnd/>
+          </a:ln>
+          <a:effectLst/>
+        </p:spPr>
+        <p:txBody>
+          <a:bodyPr wrap="square">
+            <a:spAutoFit/>
+          </a:bodyPr>
+          <a:lstStyle/>
+          <a:p>
+            <a:pPr marL="342900" indent="-342900">
+              <a:buFont typeface="Wingdings" panose="05000000000000000000" pitchFamily="2" charset="2"/>
+              <a:buChar char="ü"/>
+            </a:pPr>
+            <a:r>
+              <a:rPr lang="tr-TR" sz="2000" b="1" dirty="0" smtClean="0">
+                <a:latin typeface="Times New Roman" panose="02020603050405020304" pitchFamily="18" charset="0"/>
+                <a:cs typeface="Times New Roman" panose="02020603050405020304" pitchFamily="18" charset="0"/>
+              </a:rPr>
+              <a:t>DC Link </a:t>
+            </a:r>
+            <a:r>
+              <a:rPr lang="tr-TR" sz="2000" b="1" dirty="0" err="1" smtClean="0">
+                <a:latin typeface="Times New Roman" panose="02020603050405020304" pitchFamily="18" charset="0"/>
+                <a:cs typeface="Times New Roman" panose="02020603050405020304" pitchFamily="18" charset="0"/>
+              </a:rPr>
+              <a:t>capacitor</a:t>
+            </a:r>
+            <a:r>
+              <a:rPr lang="tr-TR" sz="2000" b="1" dirty="0" smtClean="0">
+                <a:latin typeface="Times New Roman" panose="02020603050405020304" pitchFamily="18" charset="0"/>
+                <a:cs typeface="Times New Roman" panose="02020603050405020304" pitchFamily="18" charset="0"/>
+              </a:rPr>
+              <a:t> </a:t>
+            </a:r>
+            <a:r>
+              <a:rPr lang="tr-TR" sz="2000" b="1" dirty="0" err="1" smtClean="0">
+                <a:latin typeface="Times New Roman" panose="02020603050405020304" pitchFamily="18" charset="0"/>
+                <a:cs typeface="Times New Roman" panose="02020603050405020304" pitchFamily="18" charset="0"/>
+              </a:rPr>
+              <a:t>duties</a:t>
+            </a:r>
+            <a:endParaRPr lang="tr-TR" sz="2000" b="1" dirty="0" smtClean="0">
+              <a:latin typeface="Times New Roman" panose="02020603050405020304" pitchFamily="18" charset="0"/>
+              <a:cs typeface="Times New Roman" panose="02020603050405020304" pitchFamily="18" charset="0"/>
+            </a:endParaRPr>
+          </a:p>
+          <a:p>
+            <a:pPr marL="342900" indent="-342900">
+              <a:buFont typeface="Wingdings" panose="05000000000000000000" pitchFamily="2" charset="2"/>
+              <a:buChar char="ü"/>
+            </a:pPr>
+            <a:r>
+              <a:rPr lang="tr-TR" sz="2000" b="1" dirty="0" smtClean="0">
+                <a:latin typeface="Times New Roman" panose="02020603050405020304" pitchFamily="18" charset="0"/>
+                <a:cs typeface="Times New Roman" panose="02020603050405020304" pitchFamily="18" charset="0"/>
+              </a:rPr>
+              <a:t>DC Link </a:t>
+            </a:r>
+            <a:r>
+              <a:rPr lang="tr-TR" sz="2000" b="1" dirty="0" err="1" smtClean="0">
+                <a:latin typeface="Times New Roman" panose="02020603050405020304" pitchFamily="18" charset="0"/>
+                <a:cs typeface="Times New Roman" panose="02020603050405020304" pitchFamily="18" charset="0"/>
+              </a:rPr>
+              <a:t>capacitor</a:t>
+            </a:r>
+            <a:r>
+              <a:rPr lang="tr-TR" sz="2000" b="1" dirty="0" smtClean="0">
+                <a:latin typeface="Times New Roman" panose="02020603050405020304" pitchFamily="18" charset="0"/>
+                <a:cs typeface="Times New Roman" panose="02020603050405020304" pitchFamily="18" charset="0"/>
+              </a:rPr>
+              <a:t> </a:t>
+            </a:r>
+            <a:r>
+              <a:rPr lang="tr-TR" sz="2000" b="1" dirty="0" err="1" smtClean="0">
+                <a:latin typeface="Times New Roman" panose="02020603050405020304" pitchFamily="18" charset="0"/>
+                <a:cs typeface="Times New Roman" panose="02020603050405020304" pitchFamily="18" charset="0"/>
+              </a:rPr>
+              <a:t>types</a:t>
+            </a:r>
+            <a:endParaRPr lang="tr-TR" sz="2000" b="1" smtClean="0">
+              <a:latin typeface="Times New Roman" panose="02020603050405020304" pitchFamily="18" charset="0"/>
+              <a:cs typeface="Times New Roman" panose="02020603050405020304" pitchFamily="18" charset="0"/>
+            </a:endParaRPr>
+          </a:p>
+          <a:p>
+            <a:pPr marL="342900" indent="-342900">
+              <a:buFont typeface="Wingdings" panose="05000000000000000000" pitchFamily="2" charset="2"/>
+              <a:buChar char="ü"/>
+            </a:pPr>
+            <a:endParaRPr lang="en-US" sz="2000" b="1" dirty="0">
+              <a:latin typeface="Times New Roman" panose="02020603050405020304" pitchFamily="18" charset="0"/>
+              <a:cs typeface="Times New Roman" panose="02020603050405020304" pitchFamily="18" charset="0"/>
+            </a:endParaRPr>
+          </a:p>
+        </p:txBody>
+      </p:sp>
+    </p:spTree>
+    <p:extLst>
+      <p:ext uri="{BB962C8B-B14F-4D97-AF65-F5344CB8AC3E}">
+        <p14:creationId xmlns:p14="http://schemas.microsoft.com/office/powerpoint/2010/main" val="2100869910"/>
+      </p:ext>
+    </p:extLst>
+  </p:cSld>
+  <p:clrMapOvr>
+    <a:masterClrMapping/>
+  </p:clrMapOvr>
+  <p:timing>
+    <p:tnLst>
+      <p:par>
+        <p:cTn id="1" dur="indefinite" restart="never" nodeType="tmRoot"/>
+      </p:par>
+    </p:tnLst>
+  </p:timing>
+</p:sld>
+</file>
+
+<file path=ppt/slides/slide14.xml><?xml version="1.0" encoding="utf-8"?>
+<p:sld xmlns:a="http://schemas.openxmlformats.org/drawingml/2006/main" xmlns:r="http://schemas.openxmlformats.org/officeDocument/2006/relationships" xmlns:p="http://schemas.openxmlformats.org/presentationml/2006/main">
+  <p:cSld>
+    <p:spTree>
+      <p:nvGrpSpPr>
+        <p:cNvPr id="1" name=""/>
+        <p:cNvGrpSpPr/>
+        <p:nvPr/>
+      </p:nvGrpSpPr>
+      <p:grpSpPr>
+        <a:xfrm>
+          <a:off x="0" y="0"/>
+          <a:ext cx="0" cy="0"/>
+          <a:chOff x="0" y="0"/>
+          <a:chExt cx="0" cy="0"/>
+        </a:xfrm>
+      </p:grpSpPr>
+      <p:sp>
+        <p:nvSpPr>
+          <p:cNvPr id="10" name="Rectangle 9"/>
+          <p:cNvSpPr/>
+          <p:nvPr/>
+        </p:nvSpPr>
+        <p:spPr>
+          <a:xfrm>
+            <a:off x="0" y="12106"/>
+            <a:ext cx="1011942" cy="6854083"/>
+          </a:xfrm>
+          <a:prstGeom prst="rect">
+            <a:avLst/>
+          </a:prstGeom>
+          <a:gradFill flip="none" rotWithShape="1">
+            <a:gsLst>
+              <a:gs pos="50000">
+                <a:srgbClr val="D00000"/>
+              </a:gs>
+              <a:gs pos="0">
+                <a:srgbClr val="FF0000">
+                  <a:shade val="30000"/>
+                  <a:satMod val="115000"/>
+                </a:srgbClr>
+              </a:gs>
+              <a:gs pos="100000">
+                <a:schemeClr val="accent2">
+                  <a:lumMod val="60000"/>
+                  <a:lumOff val="40000"/>
+                </a:schemeClr>
+              </a:gs>
+            </a:gsLst>
+            <a:lin ang="5400000" scaled="1"/>
+            <a:tileRect/>
+          </a:gradFill>
+          <a:ln>
+            <a:noFill/>
+          </a:ln>
+        </p:spPr>
+        <p:style>
+          <a:lnRef idx="2">
+            <a:schemeClr val="accent1">
+              <a:shade val="50000"/>
+            </a:schemeClr>
+          </a:lnRef>
+          <a:fillRef idx="1">
+            <a:schemeClr val="accent1"/>
+          </a:fillRef>
+          <a:effectRef idx="0">
+            <a:schemeClr val="accent1"/>
+          </a:effectRef>
+          <a:fontRef idx="minor">
+            <a:schemeClr val="lt1"/>
+          </a:fontRef>
+        </p:style>
+        <p:txBody>
+          <a:bodyPr rtlCol="0" anchor="ctr"/>
+          <a:lstStyle/>
+          <a:p>
+            <a:pPr algn="ctr"/>
+            <a:endParaRPr lang="tr-TR"/>
+          </a:p>
+        </p:txBody>
+      </p:sp>
+      <p:cxnSp>
+        <p:nvCxnSpPr>
+          <p:cNvPr id="11" name="Straight Connector 10"/>
+          <p:cNvCxnSpPr/>
+          <p:nvPr/>
+        </p:nvCxnSpPr>
+        <p:spPr>
+          <a:xfrm>
+            <a:off x="1189918" y="838200"/>
+            <a:ext cx="7649282" cy="0"/>
+          </a:xfrm>
+          <a:prstGeom prst="line">
+            <a:avLst/>
+          </a:prstGeom>
+          <a:ln w="50800">
+            <a:solidFill>
+              <a:srgbClr val="F20000"/>
+            </a:solidFill>
+          </a:ln>
+        </p:spPr>
+        <p:style>
+          <a:lnRef idx="1">
+            <a:schemeClr val="accent1"/>
+          </a:lnRef>
+          <a:fillRef idx="0">
+            <a:schemeClr val="accent1"/>
+          </a:fillRef>
+          <a:effectRef idx="0">
+            <a:schemeClr val="accent1"/>
+          </a:effectRef>
+          <a:fontRef idx="minor">
+            <a:schemeClr val="tx1"/>
+          </a:fontRef>
+        </p:style>
+      </p:cxnSp>
+      <p:sp>
+        <p:nvSpPr>
+          <p:cNvPr id="13" name="TextBox 12"/>
+          <p:cNvSpPr txBox="1"/>
+          <p:nvPr/>
+        </p:nvSpPr>
+        <p:spPr>
+          <a:xfrm>
+            <a:off x="1386291" y="224135"/>
+            <a:ext cx="7315200" cy="553998"/>
+          </a:xfrm>
+          <a:prstGeom prst="rect">
+            <a:avLst/>
+          </a:prstGeom>
+          <a:noFill/>
+        </p:spPr>
+        <p:txBody>
+          <a:bodyPr wrap="square" rtlCol="0">
+            <a:spAutoFit/>
+          </a:bodyPr>
+          <a:lstStyle/>
+          <a:p>
+            <a:pPr algn="ctr"/>
+            <a:r>
+              <a:rPr lang="tr-TR" sz="3000" dirty="0" err="1" smtClean="0">
+                <a:latin typeface="Times New Roman" panose="02020603050405020304" pitchFamily="18" charset="0"/>
+                <a:cs typeface="Times New Roman" panose="02020603050405020304" pitchFamily="18" charset="0"/>
+              </a:rPr>
+              <a:t>Challenges</a:t>
+            </a:r>
+            <a:endParaRPr lang="tr-TR" sz="3000" dirty="0">
+              <a:latin typeface="Times New Roman" panose="02020603050405020304" pitchFamily="18" charset="0"/>
+              <a:cs typeface="Times New Roman" panose="02020603050405020304" pitchFamily="18" charset="0"/>
+            </a:endParaRPr>
+          </a:p>
+        </p:txBody>
+      </p:sp>
+      <p:cxnSp>
+        <p:nvCxnSpPr>
+          <p:cNvPr id="15" name="Straight Connector 14"/>
+          <p:cNvCxnSpPr/>
+          <p:nvPr/>
+        </p:nvCxnSpPr>
+        <p:spPr>
+          <a:xfrm>
+            <a:off x="1189918" y="914400"/>
+            <a:ext cx="7649282" cy="0"/>
+          </a:xfrm>
+          <a:prstGeom prst="line">
+            <a:avLst/>
+          </a:prstGeom>
+          <a:ln w="19050">
+            <a:solidFill>
+              <a:srgbClr val="F20000"/>
+            </a:solidFill>
+          </a:ln>
+        </p:spPr>
+        <p:style>
+          <a:lnRef idx="1">
+            <a:schemeClr val="accent1"/>
+          </a:lnRef>
+          <a:fillRef idx="0">
+            <a:schemeClr val="accent1"/>
+          </a:fillRef>
+          <a:effectRef idx="0">
+            <a:schemeClr val="accent1"/>
+          </a:effectRef>
+          <a:fontRef idx="minor">
+            <a:schemeClr val="tx1"/>
+          </a:fontRef>
+        </p:style>
+      </p:cxnSp>
+      <p:sp>
+        <p:nvSpPr>
+          <p:cNvPr id="2" name="Slide Number Placeholder 1"/>
+          <p:cNvSpPr>
+            <a:spLocks noGrp="1"/>
+          </p:cNvSpPr>
+          <p:nvPr>
+            <p:ph type="sldNum" sz="quarter" idx="12"/>
+          </p:nvPr>
+        </p:nvSpPr>
+        <p:spPr/>
+        <p:txBody>
+          <a:bodyPr/>
+          <a:lstStyle/>
+          <a:p>
+            <a:fld id="{B6F15528-21DE-4FAA-801E-634DDDAF4B2B}" type="slidenum">
+              <a:rPr lang="en-US" smtClean="0"/>
+              <a:pPr/>
+              <a:t>14</a:t>
+            </a:fld>
+            <a:endParaRPr lang="en-US" dirty="0"/>
+          </a:p>
+        </p:txBody>
+      </p:sp>
+      <p:pic>
+        <p:nvPicPr>
+          <p:cNvPr id="14" name="Picture 2" descr="C:\Users\Mesut\Desktop\aselsan sunum\aselsan sunum 10 ekim\aselsan sunum\cezmi bey\ODTU.png"/>
+          <p:cNvPicPr>
+            <a:picLocks noChangeAspect="1" noChangeArrowheads="1"/>
+          </p:cNvPicPr>
+          <p:nvPr/>
+        </p:nvPicPr>
+        <p:blipFill>
+          <a:blip r:embed="rId2" cstate="print">
+            <a:extLst>
+              <a:ext uri="{28A0092B-C50C-407E-A947-70E740481C1C}">
+                <a14:useLocalDpi xmlns:a14="http://schemas.microsoft.com/office/drawing/2010/main" val="0"/>
+              </a:ext>
+            </a:extLst>
+          </a:blip>
+          <a:srcRect/>
+          <a:stretch>
+            <a:fillRect/>
+          </a:stretch>
+        </p:blipFill>
+        <p:spPr bwMode="auto">
+          <a:xfrm>
+            <a:off x="163507" y="266700"/>
+            <a:ext cx="684927" cy="571500"/>
+          </a:xfrm>
+          <a:prstGeom prst="rect">
+            <a:avLst/>
+          </a:prstGeom>
+          <a:noFill/>
+          <a:extLst>
+            <a:ext uri="{909E8E84-426E-40DD-AFC4-6F175D3DCCD1}">
+              <a14:hiddenFill xmlns:a14="http://schemas.microsoft.com/office/drawing/2010/main">
+                <a:solidFill>
+                  <a:srgbClr val="FFFFFF"/>
+                </a:solidFill>
+              </a14:hiddenFill>
+            </a:ext>
+          </a:extLst>
+        </p:spPr>
+      </p:pic>
+    </p:spTree>
+    <p:extLst>
+      <p:ext uri="{BB962C8B-B14F-4D97-AF65-F5344CB8AC3E}">
+        <p14:creationId xmlns:p14="http://schemas.microsoft.com/office/powerpoint/2010/main" val="471846561"/>
+      </p:ext>
+    </p:extLst>
+  </p:cSld>
+  <p:clrMapOvr>
+    <a:masterClrMapping/>
+  </p:clrMapOvr>
+  <p:timing>
+    <p:tnLst>
+      <p:par>
+        <p:cTn id="1" dur="indefinite" restart="never" nodeType="tmRoot"/>
+      </p:par>
+    </p:tnLst>
+  </p:timing>
+</p:sld>
+</file>
+
+<file path=ppt/slides/slide15.xml><?xml version="1.0" encoding="utf-8"?>
+<p:sld xmlns:a="http://schemas.openxmlformats.org/drawingml/2006/main" xmlns:r="http://schemas.openxmlformats.org/officeDocument/2006/relationships" xmlns:p="http://schemas.openxmlformats.org/presentationml/2006/main">
+  <p:cSld>
+    <p:spTree>
+      <p:nvGrpSpPr>
+        <p:cNvPr id="1" name=""/>
+        <p:cNvGrpSpPr/>
+        <p:nvPr/>
+      </p:nvGrpSpPr>
+      <p:grpSpPr>
+        <a:xfrm>
+          <a:off x="0" y="0"/>
+          <a:ext cx="0" cy="0"/>
+          <a:chOff x="0" y="0"/>
+          <a:chExt cx="0" cy="0"/>
+        </a:xfrm>
+      </p:grpSpPr>
+      <p:sp>
+        <p:nvSpPr>
+          <p:cNvPr id="10" name="Rectangle 9"/>
+          <p:cNvSpPr/>
+          <p:nvPr/>
+        </p:nvSpPr>
+        <p:spPr>
+          <a:xfrm>
+            <a:off x="0" y="12106"/>
+            <a:ext cx="1011942" cy="6854083"/>
+          </a:xfrm>
+          <a:prstGeom prst="rect">
+            <a:avLst/>
+          </a:prstGeom>
+          <a:gradFill flip="none" rotWithShape="1">
+            <a:gsLst>
+              <a:gs pos="50000">
+                <a:srgbClr val="D00000"/>
+              </a:gs>
+              <a:gs pos="0">
+                <a:srgbClr val="FF0000">
+                  <a:shade val="30000"/>
+                  <a:satMod val="115000"/>
+                </a:srgbClr>
+              </a:gs>
+              <a:gs pos="100000">
+                <a:schemeClr val="accent2">
+                  <a:lumMod val="60000"/>
+                  <a:lumOff val="40000"/>
+                </a:schemeClr>
+              </a:gs>
+            </a:gsLst>
+            <a:lin ang="5400000" scaled="1"/>
+            <a:tileRect/>
+          </a:gradFill>
+          <a:ln>
+            <a:noFill/>
+          </a:ln>
+        </p:spPr>
+        <p:style>
+          <a:lnRef idx="2">
+            <a:schemeClr val="accent1">
+              <a:shade val="50000"/>
+            </a:schemeClr>
+          </a:lnRef>
+          <a:fillRef idx="1">
+            <a:schemeClr val="accent1"/>
+          </a:fillRef>
+          <a:effectRef idx="0">
+            <a:schemeClr val="accent1"/>
+          </a:effectRef>
+          <a:fontRef idx="minor">
+            <a:schemeClr val="lt1"/>
+          </a:fontRef>
+        </p:style>
+        <p:txBody>
+          <a:bodyPr rtlCol="0" anchor="ctr"/>
+          <a:lstStyle/>
+          <a:p>
+            <a:pPr algn="ctr"/>
+            <a:endParaRPr lang="tr-TR"/>
+          </a:p>
+        </p:txBody>
+      </p:sp>
+      <p:cxnSp>
+        <p:nvCxnSpPr>
+          <p:cNvPr id="11" name="Straight Connector 10"/>
+          <p:cNvCxnSpPr/>
+          <p:nvPr/>
+        </p:nvCxnSpPr>
+        <p:spPr>
+          <a:xfrm>
+            <a:off x="1189918" y="838200"/>
+            <a:ext cx="7649282" cy="0"/>
+          </a:xfrm>
+          <a:prstGeom prst="line">
+            <a:avLst/>
+          </a:prstGeom>
+          <a:ln w="50800">
+            <a:solidFill>
+              <a:srgbClr val="F20000"/>
+            </a:solidFill>
+          </a:ln>
+        </p:spPr>
+        <p:style>
+          <a:lnRef idx="1">
+            <a:schemeClr val="accent1"/>
+          </a:lnRef>
+          <a:fillRef idx="0">
+            <a:schemeClr val="accent1"/>
+          </a:fillRef>
+          <a:effectRef idx="0">
+            <a:schemeClr val="accent1"/>
+          </a:effectRef>
+          <a:fontRef idx="minor">
+            <a:schemeClr val="tx1"/>
+          </a:fontRef>
+        </p:style>
+      </p:cxnSp>
+      <p:cxnSp>
+        <p:nvCxnSpPr>
+          <p:cNvPr id="15" name="Straight Connector 14"/>
+          <p:cNvCxnSpPr/>
+          <p:nvPr/>
+        </p:nvCxnSpPr>
+        <p:spPr>
+          <a:xfrm>
+            <a:off x="1189918" y="914400"/>
+            <a:ext cx="7649282" cy="0"/>
+          </a:xfrm>
+          <a:prstGeom prst="line">
+            <a:avLst/>
+          </a:prstGeom>
+          <a:ln w="19050">
+            <a:solidFill>
+              <a:srgbClr val="F20000"/>
+            </a:solidFill>
+          </a:ln>
+        </p:spPr>
+        <p:style>
+          <a:lnRef idx="1">
+            <a:schemeClr val="accent1"/>
+          </a:lnRef>
+          <a:fillRef idx="0">
+            <a:schemeClr val="accent1"/>
+          </a:fillRef>
+          <a:effectRef idx="0">
+            <a:schemeClr val="accent1"/>
+          </a:effectRef>
+          <a:fontRef idx="minor">
+            <a:schemeClr val="tx1"/>
+          </a:fontRef>
+        </p:style>
+      </p:cxnSp>
+      <p:sp>
+        <p:nvSpPr>
+          <p:cNvPr id="2" name="Slide Number Placeholder 1"/>
+          <p:cNvSpPr>
+            <a:spLocks noGrp="1"/>
+          </p:cNvSpPr>
+          <p:nvPr>
+            <p:ph type="sldNum" sz="quarter" idx="12"/>
+          </p:nvPr>
+        </p:nvSpPr>
+        <p:spPr/>
+        <p:txBody>
+          <a:bodyPr/>
+          <a:lstStyle/>
+          <a:p>
+            <a:fld id="{B6F15528-21DE-4FAA-801E-634DDDAF4B2B}" type="slidenum">
+              <a:rPr lang="en-US" smtClean="0"/>
+              <a:pPr/>
+              <a:t>15</a:t>
+            </a:fld>
+            <a:endParaRPr lang="en-US" dirty="0"/>
+          </a:p>
+        </p:txBody>
+      </p:sp>
+      <p:pic>
+        <p:nvPicPr>
+          <p:cNvPr id="14" name="Picture 2" descr="C:\Users\Mesut\Desktop\aselsan sunum\aselsan sunum 10 ekim\aselsan sunum\cezmi bey\ODTU.png"/>
+          <p:cNvPicPr>
+            <a:picLocks noChangeAspect="1" noChangeArrowheads="1"/>
+          </p:cNvPicPr>
+          <p:nvPr/>
+        </p:nvPicPr>
+        <p:blipFill>
+          <a:blip r:embed="rId2" cstate="print">
+            <a:extLst>
+              <a:ext uri="{28A0092B-C50C-407E-A947-70E740481C1C}">
+                <a14:useLocalDpi xmlns:a14="http://schemas.microsoft.com/office/drawing/2010/main" val="0"/>
+              </a:ext>
+            </a:extLst>
+          </a:blip>
+          <a:srcRect/>
+          <a:stretch>
+            <a:fillRect/>
+          </a:stretch>
+        </p:blipFill>
+        <p:spPr bwMode="auto">
+          <a:xfrm>
+            <a:off x="163507" y="266700"/>
+            <a:ext cx="684927" cy="571500"/>
+          </a:xfrm>
+          <a:prstGeom prst="rect">
+            <a:avLst/>
+          </a:prstGeom>
+          <a:noFill/>
+          <a:extLst>
+            <a:ext uri="{909E8E84-426E-40DD-AFC4-6F175D3DCCD1}">
+              <a14:hiddenFill xmlns:a14="http://schemas.microsoft.com/office/drawing/2010/main">
+                <a:solidFill>
+                  <a:srgbClr val="FFFFFF"/>
+                </a:solidFill>
+              </a14:hiddenFill>
+            </a:ext>
+          </a:extLst>
+        </p:spPr>
+      </p:pic>
+      <p:sp>
+        <p:nvSpPr>
+          <p:cNvPr id="3" name="Rectangle 2"/>
+          <p:cNvSpPr>
+            <a:spLocks noChangeArrowheads="1"/>
+          </p:cNvSpPr>
+          <p:nvPr/>
+        </p:nvSpPr>
+        <p:spPr bwMode="auto">
+          <a:xfrm>
+            <a:off x="2057400" y="2438400"/>
+            <a:ext cx="9144000" cy="0"/>
+          </a:xfrm>
+          <a:prstGeom prst="rect">
+            <a:avLst/>
+          </a:prstGeom>
+          <a:noFill/>
+          <a:ln>
+            <a:noFill/>
+          </a:ln>
+          <a:effectLst/>
+          <a:extLst>
+            <a:ext uri="{909E8E84-426E-40DD-AFC4-6F175D3DCCD1}">
+              <a14:hiddenFill xmlns:a14="http://schemas.microsoft.com/office/drawing/2010/main">
+                <a:solidFill>
+                  <a:schemeClr val="accent1"/>
+                </a:solidFill>
+              </a14:hiddenFill>
+            </a:ext>
+            <a:ext uri="{91240B29-F687-4F45-9708-019B960494DF}">
+              <a14:hiddenLine xmlns:a14="http://schemas.microsoft.com/office/drawing/2010/main" w="9525">
+                <a:solidFill>
+                  <a:schemeClr val="tx1"/>
+                </a:solidFill>
+                <a:miter lim="800000"/>
+                <a:headEnd/>
+                <a:tailEnd/>
+              </a14:hiddenLine>
+            </a:ext>
+            <a:ext uri="{AF507438-7753-43E0-B8FC-AC1667EBCBE1}">
+              <a14:hiddenEffects xmlns:a14="http://schemas.microsoft.com/office/drawing/2010/main">
+                <a:effectLst>
+                  <a:outerShdw dist="35921" dir="2700000" algn="ctr" rotWithShape="0">
+                    <a:schemeClr val="bg2"/>
+                  </a:outerShdw>
+                </a:effectLst>
+              </a14:hiddenEffects>
+            </a:ext>
+          </a:extLst>
+        </p:spPr>
+        <p:txBody>
+          <a:bodyPr vert="horz" wrap="none" lIns="91440" tIns="45720" rIns="91440" bIns="45720" numCol="1" anchor="ctr" anchorCtr="0" compatLnSpc="1">
+            <a:prstTxWarp prst="textNoShape">
+              <a:avLst/>
+            </a:prstTxWarp>
+            <a:spAutoFit/>
+          </a:bodyPr>
+          <a:lstStyle/>
+          <a:p>
+            <a:endParaRPr lang="en-US"/>
+          </a:p>
+        </p:txBody>
+      </p:sp>
+      <p:sp>
+        <p:nvSpPr>
+          <p:cNvPr id="7" name="Rectangle 4"/>
+          <p:cNvSpPr>
+            <a:spLocks noChangeArrowheads="1"/>
+          </p:cNvSpPr>
+          <p:nvPr/>
+        </p:nvSpPr>
+        <p:spPr bwMode="auto">
+          <a:xfrm flipV="1">
+            <a:off x="2743200" y="3700094"/>
+            <a:ext cx="6941431" cy="45719"/>
+          </a:xfrm>
+          <a:prstGeom prst="rect">
+            <a:avLst/>
+          </a:prstGeom>
+          <a:noFill/>
+          <a:ln>
+            <a:noFill/>
+          </a:ln>
+          <a:effectLst/>
+          <a:extLst>
+            <a:ext uri="{909E8E84-426E-40DD-AFC4-6F175D3DCCD1}">
+              <a14:hiddenFill xmlns:a14="http://schemas.microsoft.com/office/drawing/2010/main">
+                <a:solidFill>
+                  <a:schemeClr val="accent1"/>
+                </a:solidFill>
+              </a14:hiddenFill>
+            </a:ext>
+            <a:ext uri="{91240B29-F687-4F45-9708-019B960494DF}">
+              <a14:hiddenLine xmlns:a14="http://schemas.microsoft.com/office/drawing/2010/main" w="9525">
+                <a:solidFill>
+                  <a:schemeClr val="tx1"/>
+                </a:solidFill>
+                <a:miter lim="800000"/>
+                <a:headEnd/>
+                <a:tailEnd/>
+              </a14:hiddenLine>
+            </a:ext>
+            <a:ext uri="{AF507438-7753-43E0-B8FC-AC1667EBCBE1}">
+              <a14:hiddenEffects xmlns:a14="http://schemas.microsoft.com/office/drawing/2010/main">
+                <a:effectLst>
+                  <a:outerShdw dist="35921" dir="2700000" algn="ctr" rotWithShape="0">
+                    <a:schemeClr val="bg2"/>
+                  </a:outerShdw>
+                </a:effectLst>
+              </a14:hiddenEffects>
+            </a:ext>
+          </a:extLst>
+        </p:spPr>
+        <p:txBody>
+          <a:bodyPr vert="horz" wrap="square" lIns="91440" tIns="45720" rIns="91440" bIns="45720" numCol="1" anchor="ctr" anchorCtr="0" compatLnSpc="1">
+            <a:prstTxWarp prst="textNoShape">
+              <a:avLst/>
+            </a:prstTxWarp>
+            <a:spAutoFit/>
+          </a:bodyPr>
+          <a:lstStyle/>
+          <a:p>
+            <a:endParaRPr lang="en-US"/>
+          </a:p>
+        </p:txBody>
+      </p:sp>
+      <p:sp>
+        <p:nvSpPr>
+          <p:cNvPr id="12" name="TextBox 11"/>
+          <p:cNvSpPr txBox="1"/>
+          <p:nvPr/>
+        </p:nvSpPr>
+        <p:spPr>
+          <a:xfrm>
+            <a:off x="1414235" y="150600"/>
+            <a:ext cx="7282263" cy="553998"/>
+          </a:xfrm>
+          <a:prstGeom prst="rect">
+            <a:avLst/>
+          </a:prstGeom>
+          <a:noFill/>
+        </p:spPr>
+        <p:txBody>
+          <a:bodyPr wrap="square" rtlCol="0">
+            <a:spAutoFit/>
+          </a:bodyPr>
+          <a:lstStyle/>
+          <a:p>
+            <a:r>
+              <a:rPr lang="tr-TR" sz="3000" dirty="0" smtClean="0">
+                <a:latin typeface="Times New Roman" panose="02020603050405020304" pitchFamily="18" charset="0"/>
+                <a:cs typeface="Times New Roman" panose="02020603050405020304" pitchFamily="18" charset="0"/>
+              </a:rPr>
+              <a:t> </a:t>
+            </a:r>
+            <a:endParaRPr lang="en-US" sz="3000" dirty="0" smtClean="0">
+              <a:latin typeface="Times New Roman" panose="02020603050405020304" pitchFamily="18" charset="0"/>
+              <a:cs typeface="Times New Roman" panose="02020603050405020304" pitchFamily="18" charset="0"/>
+            </a:endParaRPr>
+          </a:p>
+        </p:txBody>
+      </p:sp>
+      <p:pic>
+        <p:nvPicPr>
+          <p:cNvPr id="4" name="Picture 3"/>
+          <p:cNvPicPr>
+            <a:picLocks noChangeAspect="1"/>
+          </p:cNvPicPr>
+          <p:nvPr/>
+        </p:nvPicPr>
+        <p:blipFill>
+          <a:blip r:embed="rId3"/>
+          <a:stretch>
+            <a:fillRect/>
+          </a:stretch>
+        </p:blipFill>
+        <p:spPr>
+          <a:xfrm>
+            <a:off x="1614487" y="2071687"/>
+            <a:ext cx="5915025" cy="2714625"/>
+          </a:xfrm>
+          <a:prstGeom prst="rect">
+            <a:avLst/>
+          </a:prstGeom>
+        </p:spPr>
+      </p:pic>
+    </p:spTree>
+    <p:extLst>
+      <p:ext uri="{BB962C8B-B14F-4D97-AF65-F5344CB8AC3E}">
+        <p14:creationId xmlns:p14="http://schemas.microsoft.com/office/powerpoint/2010/main" val="229237755"/>
+      </p:ext>
+    </p:extLst>
+  </p:cSld>
+  <p:clrMapOvr>
+    <a:masterClrMapping/>
+  </p:clrMapOvr>
+  <p:timing>
+    <p:tnLst>
+      <p:par>
+        <p:cTn id="1" dur="indefinite" restart="never" nodeType="tmRoot"/>
+      </p:par>
+    </p:tnLst>
+  </p:timing>
+</p:sld>
+</file>
+
+<file path=ppt/slides/slide2.xml><?xml version="1.0" encoding="utf-8"?>
+<p:sld xmlns:a="http://schemas.openxmlformats.org/drawingml/2006/main" xmlns:r="http://schemas.openxmlformats.org/officeDocument/2006/relationships" xmlns:p="http://schemas.openxmlformats.org/presentationml/2006/main">
+  <p:cSld>
+    <p:spTree>
+      <p:nvGrpSpPr>
+        <p:cNvPr id="1" name=""/>
+        <p:cNvGrpSpPr/>
+        <p:nvPr/>
+      </p:nvGrpSpPr>
+      <p:grpSpPr>
+        <a:xfrm>
+          <a:off x="0" y="0"/>
+          <a:ext cx="0" cy="0"/>
+          <a:chOff x="0" y="0"/>
+          <a:chExt cx="0" cy="0"/>
+        </a:xfrm>
+      </p:grpSpPr>
+      <p:sp>
+        <p:nvSpPr>
+          <p:cNvPr id="10" name="Rectangle 9"/>
+          <p:cNvSpPr/>
+          <p:nvPr/>
+        </p:nvSpPr>
+        <p:spPr>
+          <a:xfrm>
+            <a:off x="0" y="12106"/>
+            <a:ext cx="1011942" cy="6854083"/>
+          </a:xfrm>
+          <a:prstGeom prst="rect">
+            <a:avLst/>
+          </a:prstGeom>
+          <a:gradFill flip="none" rotWithShape="1">
+            <a:gsLst>
+              <a:gs pos="50000">
+                <a:srgbClr val="D00000"/>
+              </a:gs>
+              <a:gs pos="0">
+                <a:srgbClr val="FF0000">
+                  <a:shade val="30000"/>
+                  <a:satMod val="115000"/>
+                </a:srgbClr>
+              </a:gs>
+              <a:gs pos="100000">
+                <a:schemeClr val="accent2">
+                  <a:lumMod val="60000"/>
+                  <a:lumOff val="40000"/>
+                </a:schemeClr>
+              </a:gs>
+            </a:gsLst>
+            <a:lin ang="5400000" scaled="1"/>
+            <a:tileRect/>
+          </a:gradFill>
+          <a:ln>
+            <a:noFill/>
+          </a:ln>
+        </p:spPr>
+        <p:style>
+          <a:lnRef idx="2">
+            <a:schemeClr val="accent1">
+              <a:shade val="50000"/>
+            </a:schemeClr>
+          </a:lnRef>
+          <a:fillRef idx="1">
+            <a:schemeClr val="accent1"/>
+          </a:fillRef>
+          <a:effectRef idx="0">
+            <a:schemeClr val="accent1"/>
+          </a:effectRef>
+          <a:fontRef idx="minor">
+            <a:schemeClr val="lt1"/>
+          </a:fontRef>
+        </p:style>
+        <p:txBody>
+          <a:bodyPr rtlCol="0" anchor="ctr"/>
+          <a:lstStyle/>
+          <a:p>
+            <a:pPr algn="ctr"/>
+            <a:endParaRPr lang="tr-TR" dirty="0"/>
+          </a:p>
+        </p:txBody>
+      </p:sp>
+      <p:cxnSp>
+        <p:nvCxnSpPr>
+          <p:cNvPr id="11" name="Straight Connector 10"/>
+          <p:cNvCxnSpPr/>
+          <p:nvPr/>
+        </p:nvCxnSpPr>
+        <p:spPr>
+          <a:xfrm>
+            <a:off x="1189918" y="838200"/>
+            <a:ext cx="7649282" cy="0"/>
+          </a:xfrm>
+          <a:prstGeom prst="line">
+            <a:avLst/>
+          </a:prstGeom>
+          <a:ln w="50800">
+            <a:solidFill>
+              <a:srgbClr val="F20000"/>
+            </a:solidFill>
+          </a:ln>
+        </p:spPr>
+        <p:style>
+          <a:lnRef idx="1">
+            <a:schemeClr val="accent1"/>
+          </a:lnRef>
+          <a:fillRef idx="0">
+            <a:schemeClr val="accent1"/>
+          </a:fillRef>
+          <a:effectRef idx="0">
+            <a:schemeClr val="accent1"/>
+          </a:effectRef>
+          <a:fontRef idx="minor">
+            <a:schemeClr val="tx1"/>
+          </a:fontRef>
+        </p:style>
+      </p:cxnSp>
+      <p:sp>
+        <p:nvSpPr>
+          <p:cNvPr id="13" name="TextBox 12"/>
+          <p:cNvSpPr txBox="1"/>
+          <p:nvPr/>
+        </p:nvSpPr>
+        <p:spPr>
+          <a:xfrm>
+            <a:off x="1386291" y="224135"/>
+            <a:ext cx="7315200" cy="553998"/>
+          </a:xfrm>
+          <a:prstGeom prst="rect">
+            <a:avLst/>
+          </a:prstGeom>
+          <a:noFill/>
+        </p:spPr>
+        <p:txBody>
+          <a:bodyPr wrap="square" rtlCol="0">
+            <a:spAutoFit/>
+          </a:bodyPr>
+          <a:lstStyle/>
+          <a:p>
+            <a:pPr algn="ctr"/>
+            <a:r>
+              <a:rPr lang="en-US" sz="3000" dirty="0" smtClean="0">
+                <a:latin typeface="Times New Roman" panose="02020603050405020304" pitchFamily="18" charset="0"/>
+                <a:cs typeface="Times New Roman" panose="02020603050405020304" pitchFamily="18" charset="0"/>
+              </a:rPr>
+              <a:t>Research Group</a:t>
+            </a:r>
+            <a:endParaRPr lang="en-US" sz="3000" dirty="0">
+              <a:latin typeface="Times New Roman" panose="02020603050405020304" pitchFamily="18" charset="0"/>
+              <a:cs typeface="Times New Roman" panose="02020603050405020304" pitchFamily="18" charset="0"/>
+            </a:endParaRPr>
+          </a:p>
+        </p:txBody>
+      </p:sp>
+      <p:cxnSp>
+        <p:nvCxnSpPr>
+          <p:cNvPr id="15" name="Straight Connector 14"/>
+          <p:cNvCxnSpPr/>
+          <p:nvPr/>
+        </p:nvCxnSpPr>
+        <p:spPr>
+          <a:xfrm>
+            <a:off x="1189918" y="914400"/>
+            <a:ext cx="7649282" cy="0"/>
+          </a:xfrm>
+          <a:prstGeom prst="line">
+            <a:avLst/>
+          </a:prstGeom>
+          <a:ln w="19050">
+            <a:solidFill>
+              <a:srgbClr val="F20000"/>
+            </a:solidFill>
+          </a:ln>
+        </p:spPr>
+        <p:style>
+          <a:lnRef idx="1">
+            <a:schemeClr val="accent1"/>
+          </a:lnRef>
+          <a:fillRef idx="0">
+            <a:schemeClr val="accent1"/>
+          </a:fillRef>
+          <a:effectRef idx="0">
+            <a:schemeClr val="accent1"/>
+          </a:effectRef>
+          <a:fontRef idx="minor">
+            <a:schemeClr val="tx1"/>
+          </a:fontRef>
+        </p:style>
+      </p:cxnSp>
+      <p:sp>
+        <p:nvSpPr>
+          <p:cNvPr id="2" name="Slide Number Placeholder 1"/>
+          <p:cNvSpPr>
+            <a:spLocks noGrp="1"/>
+          </p:cNvSpPr>
+          <p:nvPr>
+            <p:ph type="sldNum" sz="quarter" idx="12"/>
+          </p:nvPr>
+        </p:nvSpPr>
+        <p:spPr/>
+        <p:txBody>
+          <a:bodyPr/>
+          <a:lstStyle/>
+          <a:p>
+            <a:fld id="{B6F15528-21DE-4FAA-801E-634DDDAF4B2B}" type="slidenum">
+              <a:rPr lang="en-US" smtClean="0"/>
+              <a:pPr/>
+              <a:t>2</a:t>
+            </a:fld>
+            <a:endParaRPr lang="en-US" dirty="0"/>
+          </a:p>
+        </p:txBody>
+      </p:sp>
+      <p:pic>
+        <p:nvPicPr>
+          <p:cNvPr id="14" name="Picture 2" descr="C:\Users\Mesut\Desktop\aselsan sunum\aselsan sunum 10 ekim\aselsan sunum\cezmi bey\ODTU.png"/>
+          <p:cNvPicPr>
+            <a:picLocks noChangeAspect="1" noChangeArrowheads="1"/>
+          </p:cNvPicPr>
+          <p:nvPr/>
+        </p:nvPicPr>
+        <p:blipFill>
+          <a:blip r:embed="rId2" cstate="print">
+            <a:extLst>
+              <a:ext uri="{28A0092B-C50C-407E-A947-70E740481C1C}">
+                <a14:useLocalDpi xmlns:a14="http://schemas.microsoft.com/office/drawing/2010/main" val="0"/>
+              </a:ext>
+            </a:extLst>
+          </a:blip>
+          <a:srcRect/>
+          <a:stretch>
+            <a:fillRect/>
+          </a:stretch>
+        </p:blipFill>
+        <p:spPr bwMode="auto">
+          <a:xfrm>
+            <a:off x="163507" y="266700"/>
+            <a:ext cx="684927" cy="571500"/>
+          </a:xfrm>
+          <a:prstGeom prst="rect">
+            <a:avLst/>
+          </a:prstGeom>
+          <a:noFill/>
+          <a:extLst>
+            <a:ext uri="{909E8E84-426E-40DD-AFC4-6F175D3DCCD1}">
+              <a14:hiddenFill xmlns:a14="http://schemas.microsoft.com/office/drawing/2010/main">
+                <a:solidFill>
+                  <a:srgbClr val="FFFFFF"/>
+                </a:solidFill>
+              </a14:hiddenFill>
+            </a:ext>
+          </a:extLst>
+        </p:spPr>
+      </p:pic>
       <p:pic>
         <p:nvPicPr>
           <p:cNvPr id="17" name="Picture 16" descr="C:\Users\ugurm\Desktop\gitthub\IMMD\GRW2017\Metu5.png"/>
@@ -4296,23 +7169,19 @@
             </a:r>
           </a:p>
           <a:p>
-            <a:endParaRPr lang="tr-TR" sz="2400" dirty="0" smtClean="0">
+            <a:endParaRPr lang="en-US" sz="2400" dirty="0" smtClean="0">
               <a:latin typeface="Times New Roman" panose="02020603050405020304" pitchFamily="18" charset="0"/>
               <a:cs typeface="Times New Roman" panose="02020603050405020304" pitchFamily="18" charset="0"/>
             </a:endParaRPr>
           </a:p>
           <a:p>
             <a:r>
-              <a:rPr lang="tr-TR" sz="2400" b="1" dirty="0" err="1" smtClean="0">
+              <a:rPr lang="en-US" sz="2400" b="1" dirty="0" smtClean="0">
                 <a:latin typeface="Times New Roman" panose="02020603050405020304" pitchFamily="18" charset="0"/>
                 <a:cs typeface="Times New Roman" panose="02020603050405020304" pitchFamily="18" charset="0"/>
               </a:rPr>
               <a:t>Events</a:t>
             </a:r>
-            <a:endParaRPr lang="tr-TR" sz="2400" b="1" dirty="0" smtClean="0">
-              <a:latin typeface="Times New Roman" panose="02020603050405020304" pitchFamily="18" charset="0"/>
-              <a:cs typeface="Times New Roman" panose="02020603050405020304" pitchFamily="18" charset="0"/>
-            </a:endParaRPr>
           </a:p>
           <a:p>
             <a:pPr marL="342900" indent="-342900">
@@ -4320,30 +7189,12 @@
               <a:buChar char="v"/>
             </a:pPr>
             <a:r>
-              <a:rPr lang="tr-TR" sz="2400" dirty="0" err="1" smtClean="0">
-                <a:latin typeface="Times New Roman" panose="02020603050405020304" pitchFamily="18" charset="0"/>
-                <a:cs typeface="Times New Roman" panose="02020603050405020304" pitchFamily="18" charset="0"/>
-              </a:rPr>
-              <a:t>Weekly</a:t>
-            </a:r>
-            <a:r>
-              <a:rPr lang="tr-TR" sz="2400" dirty="0" smtClean="0">
-                <a:latin typeface="Times New Roman" panose="02020603050405020304" pitchFamily="18" charset="0"/>
-                <a:cs typeface="Times New Roman" panose="02020603050405020304" pitchFamily="18" charset="0"/>
-              </a:rPr>
-              <a:t> </a:t>
-            </a:r>
-            <a:r>
-              <a:rPr lang="tr-TR" sz="2400" dirty="0" err="1" smtClean="0">
-                <a:latin typeface="Times New Roman" panose="02020603050405020304" pitchFamily="18" charset="0"/>
-                <a:cs typeface="Times New Roman" panose="02020603050405020304" pitchFamily="18" charset="0"/>
-              </a:rPr>
-              <a:t>seminars</a:t>
-            </a:r>
-            <a:endParaRPr lang="tr-TR" sz="2400" dirty="0">
-              <a:latin typeface="Times New Roman" panose="02020603050405020304" pitchFamily="18" charset="0"/>
-              <a:cs typeface="Times New Roman" panose="02020603050405020304" pitchFamily="18" charset="0"/>
-            </a:endParaRPr>
+              <a:rPr lang="en-US" sz="2400" dirty="0" smtClean="0">
+                <a:latin typeface="Times New Roman" panose="02020603050405020304" pitchFamily="18" charset="0"/>
+                <a:cs typeface="Times New Roman" panose="02020603050405020304" pitchFamily="18" charset="0"/>
+              </a:rPr>
+              <a:t>Weekly seminars</a:t>
+            </a:r>
           </a:p>
           <a:p>
             <a:pPr marL="342900" indent="-342900">
@@ -4351,18 +7202,11 @@
               <a:buChar char="v"/>
             </a:pPr>
             <a:r>
-              <a:rPr lang="tr-TR" sz="2400" dirty="0" err="1" smtClean="0">
-                <a:latin typeface="Times New Roman" panose="02020603050405020304" pitchFamily="18" charset="0"/>
-                <a:cs typeface="Times New Roman" panose="02020603050405020304" pitchFamily="18" charset="0"/>
-              </a:rPr>
-              <a:t>Journal</a:t>
-            </a:r>
-            <a:r>
-              <a:rPr lang="tr-TR" sz="2400" dirty="0" smtClean="0">
-                <a:latin typeface="Times New Roman" panose="02020603050405020304" pitchFamily="18" charset="0"/>
-                <a:cs typeface="Times New Roman" panose="02020603050405020304" pitchFamily="18" charset="0"/>
-              </a:rPr>
-              <a:t> Club</a:t>
+              <a:rPr lang="en-US" sz="2400" dirty="0" smtClean="0">
+                <a:latin typeface="Times New Roman" panose="02020603050405020304" pitchFamily="18" charset="0"/>
+                <a:cs typeface="Times New Roman" panose="02020603050405020304" pitchFamily="18" charset="0"/>
+              </a:rPr>
+              <a:t>Journal Club</a:t>
             </a:r>
           </a:p>
           <a:p>
@@ -4379,10 +7223,6 @@
               </a:rPr>
               <a:t>Research League</a:t>
             </a:r>
-            <a:endParaRPr lang="tr-TR" sz="2400" b="1" dirty="0" smtClean="0">
-              <a:latin typeface="Times New Roman" panose="02020603050405020304" pitchFamily="18" charset="0"/>
-              <a:cs typeface="Times New Roman" panose="02020603050405020304" pitchFamily="18" charset="0"/>
-            </a:endParaRPr>
           </a:p>
           <a:p>
             <a:pPr marL="342900" indent="-342900">
@@ -4390,20 +7230,27 @@
               <a:buChar char="v"/>
             </a:pPr>
             <a:r>
+              <a:rPr lang="en-US" sz="2400" dirty="0" smtClean="0">
+                <a:latin typeface="Times New Roman" panose="02020603050405020304" pitchFamily="18" charset="0"/>
+                <a:cs typeface="Times New Roman" panose="02020603050405020304" pitchFamily="18" charset="0"/>
+              </a:rPr>
+              <a:t>Multi-disciplinary</a:t>
+            </a:r>
+            <a:r>
               <a:rPr lang="tr-TR" sz="2400" dirty="0" smtClean="0">
                 <a:latin typeface="Times New Roman" panose="02020603050405020304" pitchFamily="18" charset="0"/>
                 <a:cs typeface="Times New Roman" panose="02020603050405020304" pitchFamily="18" charset="0"/>
               </a:rPr>
-              <a:t>Multi-</a:t>
+              <a:t> </a:t>
             </a:r>
             <a:r>
               <a:rPr lang="tr-TR" sz="2400" dirty="0" err="1" smtClean="0">
                 <a:latin typeface="Times New Roman" panose="02020603050405020304" pitchFamily="18" charset="0"/>
                 <a:cs typeface="Times New Roman" panose="02020603050405020304" pitchFamily="18" charset="0"/>
               </a:rPr>
-              <a:t>disciplinary</a:t>
-            </a:r>
-            <a:endParaRPr lang="tr-TR" sz="2400" dirty="0" smtClean="0">
+              <a:t>project</a:t>
+            </a:r>
+            <a:endParaRPr lang="en-US" sz="2400" dirty="0" smtClean="0">
               <a:latin typeface="Times New Roman" panose="02020603050405020304" pitchFamily="18" charset="0"/>
               <a:cs typeface="Times New Roman" panose="02020603050405020304" pitchFamily="18" charset="0"/>
             </a:endParaRPr>
@@ -4414,30 +7261,12 @@
               <a:buChar char="v"/>
             </a:pPr>
             <a:r>
-              <a:rPr lang="tr-TR" sz="2400" dirty="0" err="1" smtClean="0">
-                <a:latin typeface="Times New Roman" panose="02020603050405020304" pitchFamily="18" charset="0"/>
-                <a:cs typeface="Times New Roman" panose="02020603050405020304" pitchFamily="18" charset="0"/>
-              </a:rPr>
-              <a:t>Undergraduate</a:t>
-            </a:r>
-            <a:r>
-              <a:rPr lang="tr-TR" sz="2400" dirty="0" smtClean="0">
-                <a:latin typeface="Times New Roman" panose="02020603050405020304" pitchFamily="18" charset="0"/>
-                <a:cs typeface="Times New Roman" panose="02020603050405020304" pitchFamily="18" charset="0"/>
-              </a:rPr>
-              <a:t> </a:t>
-            </a:r>
-            <a:r>
-              <a:rPr lang="tr-TR" sz="2400" dirty="0" err="1" smtClean="0">
-                <a:latin typeface="Times New Roman" panose="02020603050405020304" pitchFamily="18" charset="0"/>
-                <a:cs typeface="Times New Roman" panose="02020603050405020304" pitchFamily="18" charset="0"/>
-              </a:rPr>
-              <a:t>students</a:t>
-            </a:r>
-            <a:endParaRPr lang="tr-TR" sz="2400" dirty="0" smtClean="0">
-              <a:latin typeface="Times New Roman" panose="02020603050405020304" pitchFamily="18" charset="0"/>
-              <a:cs typeface="Times New Roman" panose="02020603050405020304" pitchFamily="18" charset="0"/>
-            </a:endParaRPr>
+              <a:rPr lang="en-US" sz="2400" dirty="0" smtClean="0">
+                <a:latin typeface="Times New Roman" panose="02020603050405020304" pitchFamily="18" charset="0"/>
+                <a:cs typeface="Times New Roman" panose="02020603050405020304" pitchFamily="18" charset="0"/>
+              </a:rPr>
+              <a:t>Undergraduate students</a:t>
+            </a:r>
           </a:p>
           <a:p>
             <a:pPr marL="342900" indent="-342900">
@@ -4785,7 +7614,7 @@
         </p:nvSpPr>
         <p:spPr>
           <a:xfrm>
-            <a:off x="1227325" y="1219200"/>
+            <a:off x="1358937" y="1828800"/>
             <a:ext cx="7282263" cy="3077766"/>
           </a:xfrm>
           <a:prstGeom prst="rect">
@@ -5056,27 +7885,13 @@
           <a:p>
             <a:pPr algn="ctr"/>
             <a:r>
-              <a:rPr lang="tr-TR" sz="3000" dirty="0" err="1" smtClean="0">
-                <a:latin typeface="Times New Roman" panose="02020603050405020304" pitchFamily="18" charset="0"/>
-                <a:cs typeface="Times New Roman" panose="02020603050405020304" pitchFamily="18" charset="0"/>
-              </a:rPr>
-              <a:t>Conventional</a:t>
-            </a:r>
-            <a:r>
-              <a:rPr lang="tr-TR" sz="3000" dirty="0" smtClean="0">
-                <a:latin typeface="Times New Roman" panose="02020603050405020304" pitchFamily="18" charset="0"/>
-                <a:cs typeface="Times New Roman" panose="02020603050405020304" pitchFamily="18" charset="0"/>
-              </a:rPr>
-              <a:t> motor </a:t>
-            </a:r>
-            <a:r>
-              <a:rPr lang="tr-TR" sz="3000" dirty="0" err="1" smtClean="0">
-                <a:latin typeface="Times New Roman" panose="02020603050405020304" pitchFamily="18" charset="0"/>
-                <a:cs typeface="Times New Roman" panose="02020603050405020304" pitchFamily="18" charset="0"/>
-              </a:rPr>
-              <a:t>drives</a:t>
-            </a:r>
-            <a:endParaRPr lang="tr-TR" sz="3000" dirty="0">
+              <a:rPr lang="en-US" sz="3000" dirty="0" smtClean="0">
+                <a:latin typeface="Times New Roman" panose="02020603050405020304" pitchFamily="18" charset="0"/>
+                <a:cs typeface="Times New Roman" panose="02020603050405020304" pitchFamily="18" charset="0"/>
+              </a:rPr>
+              <a:t>Conventional Motor Drives</a:t>
+            </a:r>
+            <a:endParaRPr lang="en-US" sz="3000" dirty="0">
               <a:latin typeface="Times New Roman" panose="02020603050405020304" pitchFamily="18" charset="0"/>
               <a:cs typeface="Times New Roman" panose="02020603050405020304" pitchFamily="18" charset="0"/>
             </a:endParaRPr>
@@ -5227,75 +8042,8 @@
                 <a:latin typeface="Times New Roman" panose="02020603050405020304" pitchFamily="18" charset="0"/>
                 <a:cs typeface="Times New Roman" panose="02020603050405020304" pitchFamily="18" charset="0"/>
               </a:rPr>
-              <a:t>Increased </a:t>
-            </a:r>
-            <a:r>
-              <a:rPr lang="en-US" sz="2400" dirty="0" err="1" smtClean="0">
-                <a:latin typeface="Times New Roman" panose="02020603050405020304" pitchFamily="18" charset="0"/>
-                <a:cs typeface="Times New Roman" panose="02020603050405020304" pitchFamily="18" charset="0"/>
-              </a:rPr>
-              <a:t>vol</a:t>
-            </a:r>
-            <a:r>
-              <a:rPr lang="tr-TR" sz="2400" dirty="0" smtClean="0">
-                <a:latin typeface="Times New Roman" panose="02020603050405020304" pitchFamily="18" charset="0"/>
-                <a:cs typeface="Times New Roman" panose="02020603050405020304" pitchFamily="18" charset="0"/>
-              </a:rPr>
-              <a:t>u</a:t>
-            </a:r>
-            <a:r>
-              <a:rPr lang="en-US" sz="2400" dirty="0" smtClean="0">
-                <a:latin typeface="Times New Roman" panose="02020603050405020304" pitchFamily="18" charset="0"/>
-                <a:cs typeface="Times New Roman" panose="02020603050405020304" pitchFamily="18" charset="0"/>
-              </a:rPr>
-              <a:t>me</a:t>
-            </a:r>
-            <a:r>
-              <a:rPr lang="tr-TR" sz="2400" dirty="0" smtClean="0">
-                <a:latin typeface="Times New Roman" panose="02020603050405020304" pitchFamily="18" charset="0"/>
-                <a:cs typeface="Times New Roman" panose="02020603050405020304" pitchFamily="18" charset="0"/>
-              </a:rPr>
-              <a:t>,</a:t>
-            </a:r>
-            <a:r>
-              <a:rPr lang="en-US" sz="2400" dirty="0" smtClean="0">
-                <a:latin typeface="Times New Roman" panose="02020603050405020304" pitchFamily="18" charset="0"/>
-                <a:cs typeface="Times New Roman" panose="02020603050405020304" pitchFamily="18" charset="0"/>
-              </a:rPr>
-              <a:t> weight</a:t>
-            </a:r>
-            <a:r>
-              <a:rPr lang="tr-TR" sz="2400" dirty="0" smtClean="0">
-                <a:latin typeface="Times New Roman" panose="02020603050405020304" pitchFamily="18" charset="0"/>
-                <a:cs typeface="Times New Roman" panose="02020603050405020304" pitchFamily="18" charset="0"/>
-              </a:rPr>
-              <a:t> </a:t>
-            </a:r>
-            <a:r>
-              <a:rPr lang="tr-TR" sz="2400" dirty="0" err="1" smtClean="0">
-                <a:latin typeface="Times New Roman" panose="02020603050405020304" pitchFamily="18" charset="0"/>
-                <a:cs typeface="Times New Roman" panose="02020603050405020304" pitchFamily="18" charset="0"/>
-              </a:rPr>
-              <a:t>and</a:t>
-            </a:r>
-            <a:r>
-              <a:rPr lang="tr-TR" sz="2400" dirty="0" smtClean="0">
-                <a:latin typeface="Times New Roman" panose="02020603050405020304" pitchFamily="18" charset="0"/>
-                <a:cs typeface="Times New Roman" panose="02020603050405020304" pitchFamily="18" charset="0"/>
-              </a:rPr>
-              <a:t> </a:t>
-            </a:r>
-            <a:r>
-              <a:rPr lang="tr-TR" sz="2400" dirty="0" err="1" smtClean="0">
-                <a:latin typeface="Times New Roman" panose="02020603050405020304" pitchFamily="18" charset="0"/>
-                <a:cs typeface="Times New Roman" panose="02020603050405020304" pitchFamily="18" charset="0"/>
-              </a:rPr>
-              <a:t>cost</a:t>
-            </a:r>
-            <a:endParaRPr lang="tr-TR" sz="2400" dirty="0" smtClean="0">
-              <a:latin typeface="Times New Roman" panose="02020603050405020304" pitchFamily="18" charset="0"/>
-              <a:cs typeface="Times New Roman" panose="02020603050405020304" pitchFamily="18" charset="0"/>
-            </a:endParaRPr>
+              <a:t>Increased volume, weight and cost</a:t>
+            </a:r>
           </a:p>
           <a:p>
             <a:pPr lvl="1"/>
@@ -5323,53 +8071,11 @@
               <a:buChar char="o"/>
             </a:pPr>
             <a:r>
-              <a:rPr lang="tr-TR" sz="2400" dirty="0" err="1" smtClean="0">
-                <a:latin typeface="Times New Roman" panose="02020603050405020304" pitchFamily="18" charset="0"/>
-                <a:cs typeface="Times New Roman" panose="02020603050405020304" pitchFamily="18" charset="0"/>
-              </a:rPr>
-              <a:t>Long</a:t>
-            </a:r>
-            <a:r>
-              <a:rPr lang="tr-TR" sz="2400" dirty="0" smtClean="0">
-                <a:latin typeface="Times New Roman" panose="02020603050405020304" pitchFamily="18" charset="0"/>
-                <a:cs typeface="Times New Roman" panose="02020603050405020304" pitchFamily="18" charset="0"/>
-              </a:rPr>
-              <a:t> </a:t>
-            </a:r>
-            <a:r>
-              <a:rPr lang="tr-TR" sz="2400" dirty="0" err="1" smtClean="0">
-                <a:latin typeface="Times New Roman" panose="02020603050405020304" pitchFamily="18" charset="0"/>
-                <a:cs typeface="Times New Roman" panose="02020603050405020304" pitchFamily="18" charset="0"/>
-              </a:rPr>
-              <a:t>cable</a:t>
-            </a:r>
-            <a:r>
-              <a:rPr lang="tr-TR" sz="2400" dirty="0" smtClean="0">
-                <a:latin typeface="Times New Roman" panose="02020603050405020304" pitchFamily="18" charset="0"/>
-                <a:cs typeface="Times New Roman" panose="02020603050405020304" pitchFamily="18" charset="0"/>
-              </a:rPr>
-              <a:t> </a:t>
-            </a:r>
-            <a:r>
-              <a:rPr lang="tr-TR" sz="2400" dirty="0" err="1" smtClean="0">
-                <a:latin typeface="Times New Roman" panose="02020603050405020304" pitchFamily="18" charset="0"/>
-                <a:cs typeface="Times New Roman" panose="02020603050405020304" pitchFamily="18" charset="0"/>
-              </a:rPr>
-              <a:t>effect</a:t>
-            </a:r>
-            <a:r>
-              <a:rPr lang="tr-TR" sz="2400" dirty="0" smtClean="0">
-                <a:latin typeface="Times New Roman" panose="02020603050405020304" pitchFamily="18" charset="0"/>
-                <a:cs typeface="Times New Roman" panose="02020603050405020304" pitchFamily="18" charset="0"/>
-              </a:rPr>
-              <a:t>, EMI </a:t>
-            </a:r>
-            <a:r>
-              <a:rPr lang="tr-TR" sz="2400" dirty="0" err="1" smtClean="0">
-                <a:latin typeface="Times New Roman" panose="02020603050405020304" pitchFamily="18" charset="0"/>
-                <a:cs typeface="Times New Roman" panose="02020603050405020304" pitchFamily="18" charset="0"/>
-              </a:rPr>
-              <a:t>problems</a:t>
+              <a:rPr lang="en-US" sz="2400" dirty="0" smtClean="0">
+                <a:latin typeface="Times New Roman" panose="02020603050405020304" pitchFamily="18" charset="0"/>
+                <a:cs typeface="Times New Roman" panose="02020603050405020304" pitchFamily="18" charset="0"/>
+              </a:rPr>
+              <a:t>Long cable effect, EMI problems</a:t>
             </a:r>
             <a:endParaRPr lang="en-US" sz="2400" dirty="0" smtClean="0">
               <a:latin typeface="Times New Roman" panose="02020603050405020304" pitchFamily="18" charset="0"/>
@@ -5400,8 +8106,8 @@
         </p:blipFill>
         <p:spPr>
           <a:xfrm>
-            <a:off x="5410200" y="1792237"/>
-            <a:ext cx="1976292" cy="1646910"/>
+            <a:off x="5867400" y="1676400"/>
+            <a:ext cx="2061622" cy="1718019"/>
           </a:xfrm>
           <a:prstGeom prst="rect">
             <a:avLst/>
@@ -5430,7 +8136,7 @@
         </p:blipFill>
         <p:spPr>
           <a:xfrm>
-            <a:off x="2286000" y="1606657"/>
+            <a:off x="2438400" y="1560957"/>
             <a:ext cx="1600200" cy="2228850"/>
           </a:xfrm>
           <a:prstGeom prst="rect">
@@ -5747,7 +8453,7 @@
         </p:nvSpPr>
         <p:spPr>
           <a:xfrm>
-            <a:off x="1828800" y="4368512"/>
+            <a:off x="1828800" y="4528346"/>
             <a:ext cx="6703822" cy="1200329"/>
           </a:xfrm>
           <a:prstGeom prst="rect">
@@ -5799,18 +8505,11 @@
               <a:t>Both the motor and the drive are </a:t>
             </a:r>
             <a:r>
-              <a:rPr lang="en-US" sz="2400" b="1" dirty="0" err="1" smtClean="0">
-                <a:latin typeface="Times New Roman" panose="02020603050405020304" pitchFamily="18" charset="0"/>
-                <a:cs typeface="Times New Roman" panose="02020603050405020304" pitchFamily="18" charset="0"/>
-              </a:rPr>
-              <a:t>modular</a:t>
-            </a:r>
-            <a:r>
-              <a:rPr lang="en-US" sz="2400" dirty="0" err="1" smtClean="0">
-                <a:latin typeface="Times New Roman" panose="02020603050405020304" pitchFamily="18" charset="0"/>
-                <a:cs typeface="Times New Roman" panose="02020603050405020304" pitchFamily="18" charset="0"/>
-              </a:rPr>
-              <a:t>ised</a:t>
+              <a:rPr lang="en-US" sz="2400" b="1" dirty="0" smtClean="0">
+                <a:latin typeface="Times New Roman" panose="02020603050405020304" pitchFamily="18" charset="0"/>
+                <a:cs typeface="Times New Roman" panose="02020603050405020304" pitchFamily="18" charset="0"/>
+              </a:rPr>
+              <a:t>modularized</a:t>
             </a:r>
             <a:endParaRPr lang="en-US" sz="2400" dirty="0" smtClean="0">
               <a:latin typeface="Times New Roman" panose="02020603050405020304" pitchFamily="18" charset="0"/>
@@ -5834,7 +8533,7 @@
         </p:blipFill>
         <p:spPr>
           <a:xfrm>
-            <a:off x="1189918" y="1109706"/>
+            <a:off x="1329530" y="1109326"/>
             <a:ext cx="3305882" cy="2826895"/>
           </a:xfrm>
           <a:prstGeom prst="rect">
@@ -6032,6 +8731,13 @@
               </a:rPr>
               <a:t>Motivation</a:t>
             </a:r>
+            <a:r>
+              <a:rPr lang="tr-TR" sz="3000" dirty="0" smtClean="0">
+                <a:latin typeface="Times New Roman" panose="02020603050405020304" pitchFamily="18" charset="0"/>
+                <a:cs typeface="Times New Roman" panose="02020603050405020304" pitchFamily="18" charset="0"/>
+              </a:rPr>
+              <a:t> - Integration</a:t>
+            </a:r>
             <a:endParaRPr lang="tr-TR" sz="3000" dirty="0">
               <a:latin typeface="Times New Roman" panose="02020603050405020304" pitchFamily="18" charset="0"/>
               <a:cs typeface="Times New Roman" panose="02020603050405020304" pitchFamily="18" charset="0"/>
@@ -6139,30 +8845,103 @@
           </a:extLst>
         </p:spPr>
       </p:pic>
-      <p:sp>
-        <p:nvSpPr>
-          <p:cNvPr id="17" name="Text Box 9"/>
-          <p:cNvSpPr txBox="1">
-            <a:spLocks noChangeArrowheads="1"/>
-          </p:cNvSpPr>
-          <p:nvPr/>
-        </p:nvSpPr>
-        <p:spPr bwMode="auto">
-          <a:xfrm>
-            <a:off x="1386291" y="1068844"/>
-            <a:ext cx="7672691" cy="1200329"/>
+      <p:pic>
+        <p:nvPicPr>
+          <p:cNvPr id="16" name="Picture 15"/>
+          <p:cNvPicPr>
+            <a:picLocks noChangeAspect="1"/>
+          </p:cNvPicPr>
+          <p:nvPr/>
+        </p:nvPicPr>
+        <p:blipFill>
+          <a:blip r:embed="rId3">
+            <a:extLst>
+              <a:ext uri="{28A0092B-C50C-407E-A947-70E740481C1C}">
+                <a14:useLocalDpi xmlns:a14="http://schemas.microsoft.com/office/drawing/2010/main" val="0"/>
+              </a:ext>
+            </a:extLst>
+          </a:blip>
+          <a:stretch>
+            <a:fillRect/>
+          </a:stretch>
+        </p:blipFill>
+        <p:spPr>
+          <a:xfrm>
+            <a:off x="1600200" y="2133600"/>
+            <a:ext cx="2866245" cy="3818096"/>
           </a:xfrm>
           <a:prstGeom prst="rect">
             <a:avLst/>
           </a:prstGeom>
-          <a:noFill/>
-          <a:ln w="9525">
-            <a:noFill/>
-            <a:miter lim="800000"/>
-            <a:headEnd/>
-            <a:tailEnd/>
-          </a:ln>
-          <a:effectLst/>
+        </p:spPr>
+      </p:pic>
+      <p:pic>
+        <p:nvPicPr>
+          <p:cNvPr id="18" name="Picture 17"/>
+          <p:cNvPicPr>
+            <a:picLocks noChangeAspect="1"/>
+          </p:cNvPicPr>
+          <p:nvPr/>
+        </p:nvPicPr>
+        <p:blipFill>
+          <a:blip r:embed="rId4"/>
+          <a:stretch>
+            <a:fillRect/>
+          </a:stretch>
+        </p:blipFill>
+        <p:spPr>
+          <a:xfrm>
+            <a:off x="5267188" y="1844583"/>
+            <a:ext cx="3691487" cy="1314089"/>
+          </a:xfrm>
+          <a:prstGeom prst="rect">
+            <a:avLst/>
+          </a:prstGeom>
+        </p:spPr>
+      </p:pic>
+      <p:pic>
+        <p:nvPicPr>
+          <p:cNvPr id="3" name="Picture 2"/>
+          <p:cNvPicPr>
+            <a:picLocks noChangeAspect="1"/>
+          </p:cNvPicPr>
+          <p:nvPr/>
+        </p:nvPicPr>
+        <p:blipFill rotWithShape="1">
+          <a:blip r:embed="rId5" cstate="print">
+            <a:extLst>
+              <a:ext uri="{28A0092B-C50C-407E-A947-70E740481C1C}">
+                <a14:useLocalDpi xmlns:a14="http://schemas.microsoft.com/office/drawing/2010/main" val="0"/>
+              </a:ext>
+            </a:extLst>
+          </a:blip>
+          <a:srcRect l="6969" t="14966" r="20531" b="23333"/>
+          <a:stretch/>
+        </p:blipFill>
+        <p:spPr>
+          <a:xfrm>
+            <a:off x="5805891" y="3973645"/>
+            <a:ext cx="2895600" cy="1848206"/>
+          </a:xfrm>
+          <a:prstGeom prst="rect">
+            <a:avLst/>
+          </a:prstGeom>
+        </p:spPr>
+      </p:pic>
+      <p:sp>
+        <p:nvSpPr>
+          <p:cNvPr id="4" name="Rectangle 3"/>
+          <p:cNvSpPr/>
+          <p:nvPr/>
+        </p:nvSpPr>
+        <p:spPr>
+          <a:xfrm>
+            <a:off x="1656702" y="1500923"/>
+            <a:ext cx="2590800" cy="400110"/>
+          </a:xfrm>
+          <a:prstGeom prst="rect">
+            <a:avLst/>
+          </a:prstGeom>
         </p:spPr>
         <p:txBody>
           <a:bodyPr wrap="square">
@@ -6170,93 +8949,31 @@
           </a:bodyPr>
           <a:lstStyle/>
           <a:p>
-            <a:r>
-              <a:rPr lang="tr-TR" sz="2400" b="1" dirty="0" smtClean="0">
-                <a:latin typeface="Footlight MT Light" panose="0204060206030A020304" pitchFamily="18" charset="0"/>
-              </a:rPr>
-              <a:t>Integration</a:t>
-            </a:r>
-            <a:endParaRPr lang="en-US" sz="2400" dirty="0" smtClean="0">
-              <a:latin typeface="Footlight MT Light" panose="0204060206030A020304" pitchFamily="18" charset="0"/>
-            </a:endParaRPr>
-          </a:p>
-          <a:p>
-            <a:pPr marL="571500" indent="-571500" algn="l">
-              <a:buFont typeface="Wingdings" panose="05000000000000000000" pitchFamily="2" charset="2"/>
-              <a:buChar char="ü"/>
-            </a:pPr>
-            <a:r>
-              <a:rPr lang="en-US" sz="2400" b="1" dirty="0" smtClean="0">
-                <a:latin typeface="Footlight MT Light" panose="0204060206030A020304" pitchFamily="18" charset="0"/>
-              </a:rPr>
-              <a:t>Power density </a:t>
-            </a:r>
-            <a:r>
-              <a:rPr lang="en-US" sz="2400" dirty="0" smtClean="0">
-                <a:latin typeface="Footlight MT Light" panose="0204060206030A020304" pitchFamily="18" charset="0"/>
-              </a:rPr>
-              <a:t>of the overall system is </a:t>
-            </a:r>
-            <a:r>
-              <a:rPr lang="en-US" sz="2400" dirty="0" smtClean="0">
-                <a:latin typeface="Footlight MT Light" panose="0204060206030A020304" pitchFamily="18" charset="0"/>
-              </a:rPr>
-              <a:t>enhanced</a:t>
-            </a:r>
-            <a:r>
-              <a:rPr lang="tr-TR" sz="2400" dirty="0" smtClean="0">
-                <a:latin typeface="Footlight MT Light" panose="0204060206030A020304" pitchFamily="18" charset="0"/>
-              </a:rPr>
-              <a:t>.</a:t>
-            </a:r>
-            <a:endParaRPr lang="en-US" sz="2400" dirty="0" smtClean="0">
-              <a:latin typeface="Footlight MT Light" panose="0204060206030A020304" pitchFamily="18" charset="0"/>
-            </a:endParaRPr>
-          </a:p>
-          <a:p>
-            <a:pPr marL="571500" indent="-571500" algn="l">
-              <a:buFont typeface="Wingdings" panose="05000000000000000000" pitchFamily="2" charset="2"/>
-              <a:buChar char="ü"/>
-            </a:pPr>
-            <a:r>
-              <a:rPr lang="en-US" sz="2400" b="1" dirty="0" smtClean="0">
-                <a:latin typeface="Footlight MT Light" panose="0204060206030A020304" pitchFamily="18" charset="0"/>
-              </a:rPr>
-              <a:t>Voltage overshoots </a:t>
-            </a:r>
-            <a:r>
-              <a:rPr lang="en-US" sz="2400" dirty="0" smtClean="0">
-                <a:latin typeface="Footlight MT Light" panose="0204060206030A020304" pitchFamily="18" charset="0"/>
-              </a:rPr>
-              <a:t>due to cabling effect is eliminated. </a:t>
-            </a:r>
-          </a:p>
-        </p:txBody>
-      </p:sp>
-      <p:sp>
-        <p:nvSpPr>
-          <p:cNvPr id="19" name="Text Box 9"/>
-          <p:cNvSpPr txBox="1">
-            <a:spLocks noChangeArrowheads="1"/>
-          </p:cNvSpPr>
-          <p:nvPr/>
-        </p:nvSpPr>
-        <p:spPr bwMode="auto">
-          <a:xfrm>
-            <a:off x="1386291" y="2743101"/>
-            <a:ext cx="6672197" cy="1569660"/>
+            <a:pPr algn="ctr"/>
+            <a:r>
+              <a:rPr lang="en-US" sz="2000" dirty="0">
+                <a:latin typeface="Times New Roman" panose="02020603050405020304" pitchFamily="18" charset="0"/>
+                <a:cs typeface="Times New Roman" panose="02020603050405020304" pitchFamily="18" charset="0"/>
+              </a:rPr>
+              <a:t>Power density</a:t>
+            </a:r>
+          </a:p>
+        </p:txBody>
+      </p:sp>
+      <p:sp>
+        <p:nvSpPr>
+          <p:cNvPr id="20" name="Rectangle 19"/>
+          <p:cNvSpPr/>
+          <p:nvPr/>
+        </p:nvSpPr>
+        <p:spPr>
+          <a:xfrm>
+            <a:off x="5958291" y="1378561"/>
+            <a:ext cx="2590800" cy="400110"/>
           </a:xfrm>
           <a:prstGeom prst="rect">
             <a:avLst/>
           </a:prstGeom>
-          <a:noFill/>
-          <a:ln w="9525">
-            <a:noFill/>
-            <a:miter lim="800000"/>
-            <a:headEnd/>
-            <a:tailEnd/>
-          </a:ln>
-          <a:effectLst/>
         </p:spPr>
         <p:txBody>
           <a:bodyPr wrap="square">
@@ -6264,95 +8981,74 @@
           </a:bodyPr>
           <a:lstStyle/>
           <a:p>
-            <a:r>
-              <a:rPr lang="en-US" sz="2400" b="1" dirty="0" smtClean="0">
-                <a:latin typeface="Footlight MT Light" panose="0204060206030A020304" pitchFamily="18" charset="0"/>
-              </a:rPr>
-              <a:t>Modularization</a:t>
-            </a:r>
-            <a:endParaRPr lang="en-US" sz="2400" dirty="0" smtClean="0">
-              <a:latin typeface="Footlight MT Light" panose="0204060206030A020304" pitchFamily="18" charset="0"/>
+            <a:pPr algn="ctr"/>
+            <a:r>
+              <a:rPr lang="tr-TR" sz="2000" dirty="0" err="1" smtClean="0">
+                <a:latin typeface="Times New Roman" panose="02020603050405020304" pitchFamily="18" charset="0"/>
+                <a:cs typeface="Times New Roman" panose="02020603050405020304" pitchFamily="18" charset="0"/>
+              </a:rPr>
+              <a:t>Voltage</a:t>
+            </a:r>
+            <a:r>
+              <a:rPr lang="tr-TR" sz="2000" dirty="0" smtClean="0">
+                <a:latin typeface="Times New Roman" panose="02020603050405020304" pitchFamily="18" charset="0"/>
+                <a:cs typeface="Times New Roman" panose="02020603050405020304" pitchFamily="18" charset="0"/>
+              </a:rPr>
+              <a:t> </a:t>
+            </a:r>
+            <a:r>
+              <a:rPr lang="tr-TR" sz="2000" dirty="0" err="1" smtClean="0">
+                <a:latin typeface="Times New Roman" panose="02020603050405020304" pitchFamily="18" charset="0"/>
+                <a:cs typeface="Times New Roman" panose="02020603050405020304" pitchFamily="18" charset="0"/>
+              </a:rPr>
+              <a:t>overshoots</a:t>
+            </a:r>
+            <a:endParaRPr lang="en-US" sz="2000" dirty="0">
+              <a:latin typeface="Times New Roman" panose="02020603050405020304" pitchFamily="18" charset="0"/>
+              <a:cs typeface="Times New Roman" panose="02020603050405020304" pitchFamily="18" charset="0"/>
             </a:endParaRPr>
           </a:p>
-          <a:p>
-            <a:pPr marL="571500" indent="-571500" algn="l">
-              <a:buFont typeface="Wingdings" panose="05000000000000000000" pitchFamily="2" charset="2"/>
-              <a:buChar char="ü"/>
-            </a:pPr>
-            <a:r>
-              <a:rPr lang="en-US" sz="2400" b="1" dirty="0" smtClean="0">
-                <a:latin typeface="Footlight MT Light" panose="0204060206030A020304" pitchFamily="18" charset="0"/>
-              </a:rPr>
-              <a:t>Fault tolerance </a:t>
-            </a:r>
-            <a:r>
-              <a:rPr lang="en-US" sz="2400" dirty="0" smtClean="0">
-                <a:latin typeface="Footlight MT Light" panose="0204060206030A020304" pitchFamily="18" charset="0"/>
-              </a:rPr>
-              <a:t>is increased</a:t>
-            </a:r>
-            <a:r>
-              <a:rPr lang="tr-TR" sz="2400" dirty="0" smtClean="0">
-                <a:latin typeface="Footlight MT Light" panose="0204060206030A020304" pitchFamily="18" charset="0"/>
-              </a:rPr>
-              <a:t>.</a:t>
-            </a:r>
-            <a:endParaRPr lang="en-US" sz="2400" dirty="0" smtClean="0">
-              <a:latin typeface="Footlight MT Light" panose="0204060206030A020304" pitchFamily="18" charset="0"/>
-            </a:endParaRPr>
-          </a:p>
-          <a:p>
-            <a:pPr marL="571500" indent="-571500" algn="l">
-              <a:buFont typeface="Wingdings" panose="05000000000000000000" pitchFamily="2" charset="2"/>
-              <a:buChar char="ü"/>
-            </a:pPr>
-            <a:r>
-              <a:rPr lang="en-US" sz="2400" b="1" dirty="0" smtClean="0">
-                <a:latin typeface="Footlight MT Light" panose="0204060206030A020304" pitchFamily="18" charset="0"/>
-              </a:rPr>
-              <a:t>Voltage stress </a:t>
-            </a:r>
-            <a:r>
-              <a:rPr lang="en-US" sz="2400" dirty="0" smtClean="0">
-                <a:latin typeface="Footlight MT Light" panose="0204060206030A020304" pitchFamily="18" charset="0"/>
-              </a:rPr>
-              <a:t>on modules is reduced</a:t>
-            </a:r>
-            <a:r>
-              <a:rPr lang="tr-TR" sz="2400" dirty="0" smtClean="0">
-                <a:latin typeface="Footlight MT Light" panose="0204060206030A020304" pitchFamily="18" charset="0"/>
-              </a:rPr>
-              <a:t>.</a:t>
-            </a:r>
-            <a:endParaRPr lang="en-US" sz="2400" dirty="0" smtClean="0">
-              <a:latin typeface="Footlight MT Light" panose="0204060206030A020304" pitchFamily="18" charset="0"/>
-            </a:endParaRPr>
-          </a:p>
-          <a:p>
-            <a:pPr marL="571500" indent="-571500" algn="l">
-              <a:buFont typeface="Wingdings" panose="05000000000000000000" pitchFamily="2" charset="2"/>
-              <a:buChar char="ü"/>
-            </a:pPr>
-            <a:r>
-              <a:rPr lang="en-US" sz="2400" b="1" dirty="0" smtClean="0">
-                <a:latin typeface="Footlight MT Light" panose="0204060206030A020304" pitchFamily="18" charset="0"/>
-              </a:rPr>
-              <a:t>Heat dissipation </a:t>
-            </a:r>
-            <a:r>
-              <a:rPr lang="en-US" sz="2400" dirty="0" smtClean="0">
-                <a:latin typeface="Footlight MT Light" panose="0204060206030A020304" pitchFamily="18" charset="0"/>
-              </a:rPr>
-              <a:t>is distributed to a wider area</a:t>
-            </a:r>
-            <a:r>
-              <a:rPr lang="tr-TR" sz="2400" dirty="0" smtClean="0">
-                <a:latin typeface="Footlight MT Light" panose="0204060206030A020304" pitchFamily="18" charset="0"/>
-              </a:rPr>
-              <a:t>.</a:t>
-            </a:r>
-            <a:endParaRPr lang="en-US" sz="2400" dirty="0" smtClean="0">
-              <a:latin typeface="Footlight MT Light" panose="0204060206030A020304" pitchFamily="18" charset="0"/>
+        </p:txBody>
+      </p:sp>
+      <p:sp>
+        <p:nvSpPr>
+          <p:cNvPr id="21" name="Rectangle 20"/>
+          <p:cNvSpPr/>
+          <p:nvPr/>
+        </p:nvSpPr>
+        <p:spPr>
+          <a:xfrm>
+            <a:off x="5901174" y="3479450"/>
+            <a:ext cx="2590800" cy="400110"/>
+          </a:xfrm>
+          <a:prstGeom prst="rect">
+            <a:avLst/>
+          </a:prstGeom>
+        </p:spPr>
+        <p:txBody>
+          <a:bodyPr wrap="square">
+            <a:spAutoFit/>
+          </a:bodyPr>
+          <a:lstStyle/>
+          <a:p>
+            <a:pPr algn="ctr"/>
+            <a:r>
+              <a:rPr lang="tr-TR" sz="2000" dirty="0" smtClean="0">
+                <a:latin typeface="Times New Roman" panose="02020603050405020304" pitchFamily="18" charset="0"/>
+                <a:cs typeface="Times New Roman" panose="02020603050405020304" pitchFamily="18" charset="0"/>
+              </a:rPr>
+              <a:t>Motor </a:t>
+            </a:r>
+            <a:r>
+              <a:rPr lang="tr-TR" sz="2000" dirty="0" err="1" smtClean="0">
+                <a:latin typeface="Times New Roman" panose="02020603050405020304" pitchFamily="18" charset="0"/>
+                <a:cs typeface="Times New Roman" panose="02020603050405020304" pitchFamily="18" charset="0"/>
+              </a:rPr>
+              <a:t>lifetime</a:t>
+            </a:r>
+            <a:endParaRPr lang="en-US" sz="2000" dirty="0">
+              <a:latin typeface="Times New Roman" panose="02020603050405020304" pitchFamily="18" charset="0"/>
+              <a:cs typeface="Times New Roman" panose="02020603050405020304" pitchFamily="18" charset="0"/>
             </a:endParaRPr>
           </a:p>
         </p:txBody>
@@ -6517,11 +9213,25 @@
           <a:p>
             <a:pPr algn="ctr"/>
             <a:r>
+              <a:rPr lang="tr-TR" sz="3000" dirty="0" err="1" smtClean="0">
+                <a:latin typeface="Times New Roman" panose="02020603050405020304" pitchFamily="18" charset="0"/>
+                <a:cs typeface="Times New Roman" panose="02020603050405020304" pitchFamily="18" charset="0"/>
+              </a:rPr>
+              <a:t>Motivation</a:t>
+            </a:r>
+            <a:r>
               <a:rPr lang="tr-TR" sz="3000" dirty="0" smtClean="0">
                 <a:latin typeface="Times New Roman" panose="02020603050405020304" pitchFamily="18" charset="0"/>
                 <a:cs typeface="Times New Roman" panose="02020603050405020304" pitchFamily="18" charset="0"/>
               </a:rPr>
-              <a:t>Critical Applications</a:t>
+              <a:t> - </a:t>
+            </a:r>
+            <a:r>
+              <a:rPr lang="tr-TR" sz="3000" dirty="0" err="1" smtClean="0">
+                <a:latin typeface="Times New Roman" panose="02020603050405020304" pitchFamily="18" charset="0"/>
+                <a:cs typeface="Times New Roman" panose="02020603050405020304" pitchFamily="18" charset="0"/>
+              </a:rPr>
+              <a:t>Modularization</a:t>
             </a:r>
             <a:endParaRPr lang="tr-TR" sz="3000" dirty="0">
               <a:latin typeface="Times New Roman" panose="02020603050405020304" pitchFamily="18" charset="0"/>
@@ -6632,7 +9342,7 @@
       </p:pic>
       <p:sp>
         <p:nvSpPr>
-          <p:cNvPr id="17" name="Text Box 9"/>
+          <p:cNvPr id="19" name="Text Box 9"/>
           <p:cNvSpPr txBox="1">
             <a:spLocks noChangeArrowheads="1"/>
           </p:cNvSpPr>
@@ -6640,8 +9350,8 @@
         </p:nvSpPr>
         <p:spPr bwMode="auto">
           <a:xfrm>
-            <a:off x="1386291" y="1068844"/>
-            <a:ext cx="7672691" cy="1200329"/>
+            <a:off x="1386291" y="1371600"/>
+            <a:ext cx="3109510" cy="400110"/>
           </a:xfrm>
           <a:prstGeom prst="rect">
             <a:avLst/>
@@ -6661,56 +9371,203 @@
           </a:bodyPr>
           <a:lstStyle/>
           <a:p>
-            <a:r>
-              <a:rPr lang="en-US" sz="2400" dirty="0" smtClean="0">
-                <a:latin typeface="Footlight MT Light" panose="0204060206030A020304" pitchFamily="18" charset="0"/>
-              </a:rPr>
-              <a:t>Electric </a:t>
-            </a:r>
-            <a:r>
-              <a:rPr lang="en-US" sz="2400" dirty="0">
-                <a:latin typeface="Footlight MT Light" panose="0204060206030A020304" pitchFamily="18" charset="0"/>
-              </a:rPr>
-              <a:t>traction</a:t>
-            </a:r>
-            <a:r>
-              <a:rPr lang="tr-TR" sz="2400" dirty="0">
-                <a:latin typeface="Footlight MT Light" panose="0204060206030A020304" pitchFamily="18" charset="0"/>
-              </a:rPr>
-              <a:t>:</a:t>
-            </a:r>
-            <a:r>
-              <a:rPr lang="en-US" sz="2400" dirty="0">
-                <a:latin typeface="Footlight MT Light" panose="0204060206030A020304" pitchFamily="18" charset="0"/>
-              </a:rPr>
-              <a:t> electric vehicles, trains</a:t>
-            </a:r>
-            <a:endParaRPr lang="tr-TR" sz="2400" dirty="0">
-              <a:latin typeface="Footlight MT Light" panose="0204060206030A020304" pitchFamily="18" charset="0"/>
+            <a:pPr algn="ctr"/>
+            <a:r>
+              <a:rPr lang="tr-TR" sz="2000" dirty="0" err="1" smtClean="0">
+                <a:latin typeface="Times New Roman" panose="02020603050405020304" pitchFamily="18" charset="0"/>
+                <a:cs typeface="Times New Roman" panose="02020603050405020304" pitchFamily="18" charset="0"/>
+              </a:rPr>
+              <a:t>Increased</a:t>
+            </a:r>
+            <a:r>
+              <a:rPr lang="tr-TR" sz="2000" dirty="0" smtClean="0">
+                <a:latin typeface="Times New Roman" panose="02020603050405020304" pitchFamily="18" charset="0"/>
+                <a:cs typeface="Times New Roman" panose="02020603050405020304" pitchFamily="18" charset="0"/>
+              </a:rPr>
+              <a:t> f</a:t>
+            </a:r>
+            <a:r>
+              <a:rPr lang="en-US" sz="2000" dirty="0" err="1" smtClean="0">
+                <a:latin typeface="Times New Roman" panose="02020603050405020304" pitchFamily="18" charset="0"/>
+                <a:cs typeface="Times New Roman" panose="02020603050405020304" pitchFamily="18" charset="0"/>
+              </a:rPr>
+              <a:t>ault</a:t>
+            </a:r>
+            <a:r>
+              <a:rPr lang="en-US" sz="2000" dirty="0" smtClean="0">
+                <a:latin typeface="Times New Roman" panose="02020603050405020304" pitchFamily="18" charset="0"/>
+                <a:cs typeface="Times New Roman" panose="02020603050405020304" pitchFamily="18" charset="0"/>
+              </a:rPr>
+              <a:t> tolerance</a:t>
+            </a:r>
+            <a:endParaRPr lang="tr-TR" sz="2000" dirty="0" smtClean="0">
+              <a:latin typeface="Times New Roman" panose="02020603050405020304" pitchFamily="18" charset="0"/>
+              <a:cs typeface="Times New Roman" panose="02020603050405020304" pitchFamily="18" charset="0"/>
             </a:endParaRPr>
           </a:p>
-          <a:p>
-            <a:r>
-              <a:rPr lang="en-US" sz="2400" dirty="0">
-                <a:latin typeface="Footlight MT Light" panose="0204060206030A020304" pitchFamily="18" charset="0"/>
-              </a:rPr>
-              <a:t>Aerospace: aircrafts, space crafts</a:t>
-            </a:r>
-          </a:p>
-          <a:p>
-            <a:pPr algn="l"/>
-            <a:r>
-              <a:rPr lang="en-US" sz="2400" dirty="0" smtClean="0">
-                <a:latin typeface="Footlight MT Light" panose="0204060206030A020304" pitchFamily="18" charset="0"/>
-              </a:rPr>
-              <a:t> </a:t>
-            </a:r>
+        </p:txBody>
+      </p:sp>
+      <p:sp>
+        <p:nvSpPr>
+          <p:cNvPr id="16" name="Text Box 9"/>
+          <p:cNvSpPr txBox="1">
+            <a:spLocks noChangeArrowheads="1"/>
+          </p:cNvSpPr>
+          <p:nvPr/>
+        </p:nvSpPr>
+        <p:spPr bwMode="auto">
+          <a:xfrm>
+            <a:off x="5089769" y="3894325"/>
+            <a:ext cx="3109510" cy="400110"/>
+          </a:xfrm>
+          <a:prstGeom prst="rect">
+            <a:avLst/>
+          </a:prstGeom>
+          <a:noFill/>
+          <a:ln w="9525">
+            <a:noFill/>
+            <a:miter lim="800000"/>
+            <a:headEnd/>
+            <a:tailEnd/>
+          </a:ln>
+          <a:effectLst/>
+        </p:spPr>
+        <p:txBody>
+          <a:bodyPr wrap="square">
+            <a:spAutoFit/>
+          </a:bodyPr>
+          <a:lstStyle/>
+          <a:p>
+            <a:pPr algn="ctr"/>
+            <a:r>
+              <a:rPr lang="tr-TR" sz="2000" dirty="0" err="1" smtClean="0">
+                <a:latin typeface="Times New Roman" panose="02020603050405020304" pitchFamily="18" charset="0"/>
+                <a:cs typeface="Times New Roman" panose="02020603050405020304" pitchFamily="18" charset="0"/>
+              </a:rPr>
+              <a:t>Reduced</a:t>
+            </a:r>
+            <a:r>
+              <a:rPr lang="tr-TR" sz="2000" dirty="0" smtClean="0">
+                <a:latin typeface="Times New Roman" panose="02020603050405020304" pitchFamily="18" charset="0"/>
+                <a:cs typeface="Times New Roman" panose="02020603050405020304" pitchFamily="18" charset="0"/>
+              </a:rPr>
+              <a:t> v</a:t>
+            </a:r>
+            <a:r>
+              <a:rPr lang="en-US" sz="2000" dirty="0" err="1" smtClean="0">
+                <a:latin typeface="Times New Roman" panose="02020603050405020304" pitchFamily="18" charset="0"/>
+                <a:cs typeface="Times New Roman" panose="02020603050405020304" pitchFamily="18" charset="0"/>
+              </a:rPr>
+              <a:t>oltage</a:t>
+            </a:r>
+            <a:r>
+              <a:rPr lang="en-US" sz="2000" dirty="0" smtClean="0">
+                <a:latin typeface="Times New Roman" panose="02020603050405020304" pitchFamily="18" charset="0"/>
+                <a:cs typeface="Times New Roman" panose="02020603050405020304" pitchFamily="18" charset="0"/>
+              </a:rPr>
+              <a:t> </a:t>
+            </a:r>
+            <a:r>
+              <a:rPr lang="en-US" sz="2000" dirty="0" err="1" smtClean="0">
+                <a:latin typeface="Times New Roman" panose="02020603050405020304" pitchFamily="18" charset="0"/>
+                <a:cs typeface="Times New Roman" panose="02020603050405020304" pitchFamily="18" charset="0"/>
+              </a:rPr>
+              <a:t>stres</a:t>
+            </a:r>
+            <a:r>
+              <a:rPr lang="tr-TR" sz="2000" dirty="0" smtClean="0">
+                <a:latin typeface="Times New Roman" panose="02020603050405020304" pitchFamily="18" charset="0"/>
+                <a:cs typeface="Times New Roman" panose="02020603050405020304" pitchFamily="18" charset="0"/>
+              </a:rPr>
+              <a:t>s</a:t>
+            </a:r>
+          </a:p>
+        </p:txBody>
+      </p:sp>
+      <p:sp>
+        <p:nvSpPr>
+          <p:cNvPr id="18" name="Text Box 9"/>
+          <p:cNvSpPr txBox="1">
+            <a:spLocks noChangeArrowheads="1"/>
+          </p:cNvSpPr>
+          <p:nvPr/>
+        </p:nvSpPr>
+        <p:spPr bwMode="auto">
+          <a:xfrm>
+            <a:off x="5257800" y="1419141"/>
+            <a:ext cx="3109510" cy="400110"/>
+          </a:xfrm>
+          <a:prstGeom prst="rect">
+            <a:avLst/>
+          </a:prstGeom>
+          <a:noFill/>
+          <a:ln w="9525">
+            <a:noFill/>
+            <a:miter lim="800000"/>
+            <a:headEnd/>
+            <a:tailEnd/>
+          </a:ln>
+          <a:effectLst/>
+        </p:spPr>
+        <p:txBody>
+          <a:bodyPr wrap="square">
+            <a:spAutoFit/>
+          </a:bodyPr>
+          <a:lstStyle/>
+          <a:p>
+            <a:pPr algn="ctr"/>
+            <a:r>
+              <a:rPr lang="tr-TR" sz="2000" dirty="0" smtClean="0">
+                <a:latin typeface="Times New Roman" panose="02020603050405020304" pitchFamily="18" charset="0"/>
+                <a:cs typeface="Times New Roman" panose="02020603050405020304" pitchFamily="18" charset="0"/>
+              </a:rPr>
+              <a:t>D</a:t>
+            </a:r>
+            <a:r>
+              <a:rPr lang="en-US" sz="2000" dirty="0" err="1" smtClean="0">
+                <a:latin typeface="Times New Roman" panose="02020603050405020304" pitchFamily="18" charset="0"/>
+                <a:cs typeface="Times New Roman" panose="02020603050405020304" pitchFamily="18" charset="0"/>
+              </a:rPr>
+              <a:t>istribute</a:t>
+            </a:r>
+            <a:r>
+              <a:rPr lang="tr-TR" sz="2000" dirty="0" smtClean="0">
+                <a:latin typeface="Times New Roman" panose="02020603050405020304" pitchFamily="18" charset="0"/>
+                <a:cs typeface="Times New Roman" panose="02020603050405020304" pitchFamily="18" charset="0"/>
+              </a:rPr>
+              <a:t>d </a:t>
+            </a:r>
+            <a:r>
+              <a:rPr lang="tr-TR" sz="2000" dirty="0" err="1" smtClean="0">
+                <a:latin typeface="Times New Roman" panose="02020603050405020304" pitchFamily="18" charset="0"/>
+                <a:cs typeface="Times New Roman" panose="02020603050405020304" pitchFamily="18" charset="0"/>
+              </a:rPr>
+              <a:t>heat</a:t>
+            </a:r>
+            <a:r>
+              <a:rPr lang="tr-TR" sz="2000" dirty="0" smtClean="0">
+                <a:latin typeface="Times New Roman" panose="02020603050405020304" pitchFamily="18" charset="0"/>
+                <a:cs typeface="Times New Roman" panose="02020603050405020304" pitchFamily="18" charset="0"/>
+              </a:rPr>
+              <a:t> </a:t>
+            </a:r>
+            <a:r>
+              <a:rPr lang="tr-TR" sz="2000" dirty="0" err="1" smtClean="0">
+                <a:latin typeface="Times New Roman" panose="02020603050405020304" pitchFamily="18" charset="0"/>
+                <a:cs typeface="Times New Roman" panose="02020603050405020304" pitchFamily="18" charset="0"/>
+              </a:rPr>
+              <a:t>dissipation</a:t>
+            </a:r>
+            <a:endParaRPr lang="en-US" sz="2000" dirty="0" smtClean="0">
+              <a:latin typeface="Times New Roman" panose="02020603050405020304" pitchFamily="18" charset="0"/>
+              <a:cs typeface="Times New Roman" panose="02020603050405020304" pitchFamily="18" charset="0"/>
+            </a:endParaRPr>
           </a:p>
         </p:txBody>
       </p:sp>
       <p:pic>
         <p:nvPicPr>
-          <p:cNvPr id="16" name="Picture 15"/>
+          <p:cNvPr id="5" name="Picture 4"/>
           <p:cNvPicPr>
             <a:picLocks noChangeAspect="1"/>
           </p:cNvPicPr>
@@ -6724,8 +9581,56 @@
         </p:blipFill>
         <p:spPr>
           <a:xfrm>
-            <a:off x="1752600" y="2256858"/>
-            <a:ext cx="4267200" cy="2943383"/>
+            <a:off x="4616763" y="4370635"/>
+            <a:ext cx="2069596" cy="1519115"/>
+          </a:xfrm>
+          <a:prstGeom prst="rect">
+            <a:avLst/>
+          </a:prstGeom>
+        </p:spPr>
+      </p:pic>
+      <p:pic>
+        <p:nvPicPr>
+          <p:cNvPr id="6" name="Picture 5"/>
+          <p:cNvPicPr>
+            <a:picLocks noChangeAspect="1"/>
+          </p:cNvPicPr>
+          <p:nvPr/>
+        </p:nvPicPr>
+        <p:blipFill>
+          <a:blip r:embed="rId4"/>
+          <a:stretch>
+            <a:fillRect/>
+          </a:stretch>
+        </p:blipFill>
+        <p:spPr>
+          <a:xfrm>
+            <a:off x="7056944" y="4370635"/>
+            <a:ext cx="1624503" cy="1588302"/>
+          </a:xfrm>
+          <a:prstGeom prst="rect">
+            <a:avLst/>
+          </a:prstGeom>
+        </p:spPr>
+      </p:pic>
+      <p:pic>
+        <p:nvPicPr>
+          <p:cNvPr id="7" name="Picture 6"/>
+          <p:cNvPicPr>
+            <a:picLocks noChangeAspect="1"/>
+          </p:cNvPicPr>
+          <p:nvPr/>
+        </p:nvPicPr>
+        <p:blipFill>
+          <a:blip r:embed="rId5"/>
+          <a:stretch>
+            <a:fillRect/>
+          </a:stretch>
+        </p:blipFill>
+        <p:spPr>
+          <a:xfrm>
+            <a:off x="1650993" y="1896066"/>
+            <a:ext cx="2580106" cy="3557528"/>
           </a:xfrm>
           <a:prstGeom prst="rect">
             <a:avLst/>
@@ -6735,7 +9640,7 @@
     </p:spTree>
     <p:extLst>
       <p:ext uri="{BB962C8B-B14F-4D97-AF65-F5344CB8AC3E}">
-        <p14:creationId xmlns:p14="http://schemas.microsoft.com/office/powerpoint/2010/main" val="1828716564"/>
+        <p14:creationId xmlns:p14="http://schemas.microsoft.com/office/powerpoint/2010/main" val="4145003531"/>
       </p:ext>
     </p:extLst>
   </p:cSld>
@@ -6892,11 +9797,11 @@
           <a:p>
             <a:pPr algn="ctr"/>
             <a:r>
-              <a:rPr lang="tr-TR" sz="3000" dirty="0" err="1" smtClean="0">
-                <a:latin typeface="Times New Roman" panose="02020603050405020304" pitchFamily="18" charset="0"/>
-                <a:cs typeface="Times New Roman" panose="02020603050405020304" pitchFamily="18" charset="0"/>
-              </a:rPr>
-              <a:t>Challenges</a:t>
+              <a:rPr lang="tr-TR" sz="3000" dirty="0" smtClean="0">
+                <a:latin typeface="Times New Roman" panose="02020603050405020304" pitchFamily="18" charset="0"/>
+                <a:cs typeface="Times New Roman" panose="02020603050405020304" pitchFamily="18" charset="0"/>
+              </a:rPr>
+              <a:t>Critical Applications</a:t>
             </a:r>
             <a:endParaRPr lang="tr-TR" sz="3000" dirty="0">
               <a:latin typeface="Times New Roman" panose="02020603050405020304" pitchFamily="18" charset="0"/>
@@ -7015,8 +9920,8 @@
         </p:nvSpPr>
         <p:spPr bwMode="auto">
           <a:xfrm>
-            <a:off x="1386291" y="1068844"/>
-            <a:ext cx="7672691" cy="1938992"/>
+            <a:off x="1213407" y="1069400"/>
+            <a:ext cx="7672691" cy="400110"/>
           </a:xfrm>
           <a:prstGeom prst="rect">
             <a:avLst/>
@@ -7036,56 +9941,235 @@
           </a:bodyPr>
           <a:lstStyle/>
           <a:p>
-            <a:r>
-              <a:rPr lang="en-US" sz="2400" dirty="0">
-                <a:latin typeface="Footlight MT Light" panose="0204060206030A020304" pitchFamily="18" charset="0"/>
-              </a:rPr>
-              <a:t>Fitting into a small volume requires size reduction and optimum placement of components.</a:t>
-            </a:r>
-          </a:p>
-          <a:p>
-            <a:r>
-              <a:rPr lang="en-US" sz="2400" dirty="0">
-                <a:latin typeface="Footlight MT Light" panose="0204060206030A020304" pitchFamily="18" charset="0"/>
-              </a:rPr>
-              <a:t>Cooling of both units should be achieved simultaneously</a:t>
-            </a:r>
-            <a:r>
-              <a:rPr lang="tr-TR" sz="2400" dirty="0">
-                <a:latin typeface="Footlight MT Light" panose="0204060206030A020304" pitchFamily="18" charset="0"/>
-              </a:rPr>
-              <a:t>.</a:t>
-            </a:r>
-            <a:endParaRPr lang="en-US" sz="2400" dirty="0">
-              <a:latin typeface="Footlight MT Light" panose="0204060206030A020304" pitchFamily="18" charset="0"/>
+            <a:pPr algn="ctr"/>
+            <a:r>
+              <a:rPr lang="en-US" sz="2000" b="1" dirty="0" smtClean="0">
+                <a:latin typeface="Times New Roman" panose="02020603050405020304" pitchFamily="18" charset="0"/>
+                <a:cs typeface="Times New Roman" panose="02020603050405020304" pitchFamily="18" charset="0"/>
+              </a:rPr>
+              <a:t>Electric </a:t>
+            </a:r>
+            <a:r>
+              <a:rPr lang="en-US" sz="2000" b="1" dirty="0">
+                <a:latin typeface="Times New Roman" panose="02020603050405020304" pitchFamily="18" charset="0"/>
+                <a:cs typeface="Times New Roman" panose="02020603050405020304" pitchFamily="18" charset="0"/>
+              </a:rPr>
+              <a:t>traction</a:t>
+            </a:r>
+            <a:r>
+              <a:rPr lang="tr-TR" sz="2000" dirty="0">
+                <a:latin typeface="Times New Roman" panose="02020603050405020304" pitchFamily="18" charset="0"/>
+                <a:cs typeface="Times New Roman" panose="02020603050405020304" pitchFamily="18" charset="0"/>
+              </a:rPr>
+              <a:t>:</a:t>
+            </a:r>
+            <a:r>
+              <a:rPr lang="en-US" sz="2000" dirty="0">
+                <a:latin typeface="Times New Roman" panose="02020603050405020304" pitchFamily="18" charset="0"/>
+                <a:cs typeface="Times New Roman" panose="02020603050405020304" pitchFamily="18" charset="0"/>
+              </a:rPr>
+              <a:t> </a:t>
+            </a:r>
+            <a:r>
+              <a:rPr lang="tr-TR" sz="2000" dirty="0" smtClean="0">
+                <a:latin typeface="Times New Roman" panose="02020603050405020304" pitchFamily="18" charset="0"/>
+                <a:cs typeface="Times New Roman" panose="02020603050405020304" pitchFamily="18" charset="0"/>
+              </a:rPr>
+              <a:t>EVs</a:t>
+            </a:r>
+            <a:r>
+              <a:rPr lang="en-US" sz="2000" dirty="0" smtClean="0">
+                <a:latin typeface="Times New Roman" panose="02020603050405020304" pitchFamily="18" charset="0"/>
+                <a:cs typeface="Times New Roman" panose="02020603050405020304" pitchFamily="18" charset="0"/>
+              </a:rPr>
+              <a:t>,</a:t>
+            </a:r>
+            <a:r>
+              <a:rPr lang="tr-TR" sz="2000" dirty="0" smtClean="0">
+                <a:latin typeface="Times New Roman" panose="02020603050405020304" pitchFamily="18" charset="0"/>
+                <a:cs typeface="Times New Roman" panose="02020603050405020304" pitchFamily="18" charset="0"/>
+              </a:rPr>
+              <a:t> HEVs,</a:t>
+            </a:r>
+            <a:r>
+              <a:rPr lang="en-US" sz="2000" dirty="0" smtClean="0">
+                <a:latin typeface="Times New Roman" panose="02020603050405020304" pitchFamily="18" charset="0"/>
+                <a:cs typeface="Times New Roman" panose="02020603050405020304" pitchFamily="18" charset="0"/>
+              </a:rPr>
+              <a:t> </a:t>
+            </a:r>
+            <a:r>
+              <a:rPr lang="tr-TR" sz="2000" dirty="0" smtClean="0">
+                <a:latin typeface="Times New Roman" panose="02020603050405020304" pitchFamily="18" charset="0"/>
+                <a:cs typeface="Times New Roman" panose="02020603050405020304" pitchFamily="18" charset="0"/>
+              </a:rPr>
+              <a:t>T</a:t>
+            </a:r>
+            <a:r>
+              <a:rPr lang="en-US" sz="2000" dirty="0" smtClean="0">
+                <a:latin typeface="Times New Roman" panose="02020603050405020304" pitchFamily="18" charset="0"/>
+                <a:cs typeface="Times New Roman" panose="02020603050405020304" pitchFamily="18" charset="0"/>
+              </a:rPr>
+              <a:t>rain</a:t>
+            </a:r>
+            <a:r>
+              <a:rPr lang="tr-TR" sz="2000" dirty="0" smtClean="0">
+                <a:latin typeface="Times New Roman" panose="02020603050405020304" pitchFamily="18" charset="0"/>
+                <a:cs typeface="Times New Roman" panose="02020603050405020304" pitchFamily="18" charset="0"/>
+              </a:rPr>
+              <a:t>s</a:t>
+            </a:r>
+          </a:p>
+        </p:txBody>
+      </p:sp>
+      <p:pic>
+        <p:nvPicPr>
+          <p:cNvPr id="3" name="Picture 2"/>
+          <p:cNvPicPr>
+            <a:picLocks noChangeAspect="1"/>
+          </p:cNvPicPr>
+          <p:nvPr/>
+        </p:nvPicPr>
+        <p:blipFill>
+          <a:blip r:embed="rId3"/>
+          <a:stretch>
+            <a:fillRect/>
+          </a:stretch>
+        </p:blipFill>
+        <p:spPr>
+          <a:xfrm>
+            <a:off x="2971800" y="4797047"/>
+            <a:ext cx="3867150" cy="1910827"/>
+          </a:xfrm>
+          <a:prstGeom prst="rect">
+            <a:avLst/>
+          </a:prstGeom>
+        </p:spPr>
+      </p:pic>
+      <p:sp>
+        <p:nvSpPr>
+          <p:cNvPr id="12" name="Text Box 9"/>
+          <p:cNvSpPr txBox="1">
+            <a:spLocks noChangeArrowheads="1"/>
+          </p:cNvSpPr>
+          <p:nvPr/>
+        </p:nvSpPr>
+        <p:spPr bwMode="auto">
+          <a:xfrm>
+            <a:off x="1207545" y="4169646"/>
+            <a:ext cx="7672691" cy="400110"/>
+          </a:xfrm>
+          <a:prstGeom prst="rect">
+            <a:avLst/>
+          </a:prstGeom>
+          <a:noFill/>
+          <a:ln w="9525">
+            <a:noFill/>
+            <a:miter lim="800000"/>
+            <a:headEnd/>
+            <a:tailEnd/>
+          </a:ln>
+          <a:effectLst/>
+        </p:spPr>
+        <p:txBody>
+          <a:bodyPr wrap="square">
+            <a:spAutoFit/>
+          </a:bodyPr>
+          <a:lstStyle/>
+          <a:p>
+            <a:pPr algn="ctr"/>
+            <a:r>
+              <a:rPr lang="en-US" sz="2000" b="1" dirty="0" smtClean="0">
+                <a:latin typeface="Times New Roman" panose="02020603050405020304" pitchFamily="18" charset="0"/>
+                <a:cs typeface="Times New Roman" panose="02020603050405020304" pitchFamily="18" charset="0"/>
+              </a:rPr>
+              <a:t>Aerospace: </a:t>
+            </a:r>
+            <a:r>
+              <a:rPr lang="en-US" sz="2000" dirty="0" smtClean="0">
+                <a:latin typeface="Times New Roman" panose="02020603050405020304" pitchFamily="18" charset="0"/>
+                <a:cs typeface="Times New Roman" panose="02020603050405020304" pitchFamily="18" charset="0"/>
+              </a:rPr>
+              <a:t>Aircrafts, Space</a:t>
+            </a:r>
+            <a:r>
+              <a:rPr lang="tr-TR" sz="2000" dirty="0" smtClean="0">
+                <a:latin typeface="Times New Roman" panose="02020603050405020304" pitchFamily="18" charset="0"/>
+                <a:cs typeface="Times New Roman" panose="02020603050405020304" pitchFamily="18" charset="0"/>
+              </a:rPr>
+              <a:t> </a:t>
+            </a:r>
+            <a:r>
+              <a:rPr lang="en-US" sz="2000" dirty="0" smtClean="0">
+                <a:latin typeface="Times New Roman" panose="02020603050405020304" pitchFamily="18" charset="0"/>
+                <a:cs typeface="Times New Roman" panose="02020603050405020304" pitchFamily="18" charset="0"/>
+              </a:rPr>
+              <a:t>crafts</a:t>
+            </a:r>
+            <a:endParaRPr lang="en-US" sz="2000" dirty="0">
+              <a:latin typeface="Times New Roman" panose="02020603050405020304" pitchFamily="18" charset="0"/>
+              <a:cs typeface="Times New Roman" panose="02020603050405020304" pitchFamily="18" charset="0"/>
             </a:endParaRPr>
           </a:p>
-          <a:p>
-            <a:r>
-              <a:rPr lang="en-US" sz="2400" dirty="0">
-                <a:latin typeface="Footlight MT Light" panose="0204060206030A020304" pitchFamily="18" charset="0"/>
-              </a:rPr>
-              <a:t>Power and control electronics components are subjected to high temperature and vibration</a:t>
-            </a:r>
-            <a:r>
-              <a:rPr lang="tr-TR" sz="2400" dirty="0">
-                <a:latin typeface="Footlight MT Light" panose="0204060206030A020304" pitchFamily="18" charset="0"/>
-              </a:rPr>
-              <a:t> </a:t>
-            </a:r>
-            <a:r>
-              <a:rPr lang="en-US" sz="2400" dirty="0" smtClean="0">
-                <a:latin typeface="Footlight MT Light" panose="0204060206030A020304" pitchFamily="18" charset="0"/>
-              </a:rPr>
-              <a:t> </a:t>
-            </a:r>
-          </a:p>
-        </p:txBody>
-      </p:sp>
+        </p:txBody>
+      </p:sp>
+      <p:pic>
+        <p:nvPicPr>
+          <p:cNvPr id="4" name="Picture 3"/>
+          <p:cNvPicPr>
+            <a:picLocks noChangeAspect="1"/>
+          </p:cNvPicPr>
+          <p:nvPr/>
+        </p:nvPicPr>
+        <p:blipFill rotWithShape="1">
+          <a:blip r:embed="rId4">
+            <a:extLst>
+              <a:ext uri="{28A0092B-C50C-407E-A947-70E740481C1C}">
+                <a14:useLocalDpi xmlns:a14="http://schemas.microsoft.com/office/drawing/2010/main" val="0"/>
+              </a:ext>
+            </a:extLst>
+          </a:blip>
+          <a:srcRect l="12500" t="9091" r="9091" b="2273"/>
+          <a:stretch/>
+        </p:blipFill>
+        <p:spPr>
+          <a:xfrm>
+            <a:off x="5562600" y="1556486"/>
+            <a:ext cx="2691068" cy="2281558"/>
+          </a:xfrm>
+          <a:prstGeom prst="rect">
+            <a:avLst/>
+          </a:prstGeom>
+        </p:spPr>
+      </p:pic>
+      <p:pic>
+        <p:nvPicPr>
+          <p:cNvPr id="18" name="Picture 17"/>
+          <p:cNvPicPr>
+            <a:picLocks noChangeAspect="1"/>
+          </p:cNvPicPr>
+          <p:nvPr/>
+        </p:nvPicPr>
+        <p:blipFill>
+          <a:blip r:embed="rId5"/>
+          <a:stretch>
+            <a:fillRect/>
+          </a:stretch>
+        </p:blipFill>
+        <p:spPr>
+          <a:xfrm>
+            <a:off x="1600200" y="1516440"/>
+            <a:ext cx="3365770" cy="2321604"/>
+          </a:xfrm>
+          <a:prstGeom prst="rect">
+            <a:avLst/>
+          </a:prstGeom>
+        </p:spPr>
+      </p:pic>
     </p:spTree>
     <p:extLst>
       <p:ext uri="{BB962C8B-B14F-4D97-AF65-F5344CB8AC3E}">
-        <p14:creationId xmlns:p14="http://schemas.microsoft.com/office/powerpoint/2010/main" val="822431857"/>
+        <p14:creationId xmlns:p14="http://schemas.microsoft.com/office/powerpoint/2010/main" val="1828716564"/>
       </p:ext>
     </p:extLst>
   </p:cSld>
@@ -7218,6 +10302,43 @@
           </a:fontRef>
         </p:style>
       </p:cxnSp>
+      <p:sp>
+        <p:nvSpPr>
+          <p:cNvPr id="13" name="TextBox 12"/>
+          <p:cNvSpPr txBox="1"/>
+          <p:nvPr/>
+        </p:nvSpPr>
+        <p:spPr>
+          <a:xfrm>
+            <a:off x="1386291" y="224135"/>
+            <a:ext cx="7315200" cy="553998"/>
+          </a:xfrm>
+          <a:prstGeom prst="rect">
+            <a:avLst/>
+          </a:prstGeom>
+          <a:noFill/>
+        </p:spPr>
+        <p:txBody>
+          <a:bodyPr wrap="square" rtlCol="0">
+            <a:spAutoFit/>
+          </a:bodyPr>
+          <a:lstStyle/>
+          <a:p>
+            <a:pPr algn="ctr"/>
+            <a:r>
+              <a:rPr lang="tr-TR" sz="3000" dirty="0" err="1" smtClean="0">
+                <a:latin typeface="Times New Roman" panose="02020603050405020304" pitchFamily="18" charset="0"/>
+                <a:cs typeface="Times New Roman" panose="02020603050405020304" pitchFamily="18" charset="0"/>
+              </a:rPr>
+              <a:t>Challenges</a:t>
+            </a:r>
+            <a:endParaRPr lang="tr-TR" sz="3000" dirty="0">
+              <a:latin typeface="Times New Roman" panose="02020603050405020304" pitchFamily="18" charset="0"/>
+              <a:cs typeface="Times New Roman" panose="02020603050405020304" pitchFamily="18" charset="0"/>
+            </a:endParaRPr>
+          </a:p>
+        </p:txBody>
+      </p:sp>
       <p:cxnSp>
         <p:nvCxnSpPr>
           <p:cNvPr id="15" name="Straight Connector 14"/>
@@ -7320,170 +10441,231 @@
       </p:pic>
       <p:sp>
         <p:nvSpPr>
-          <p:cNvPr id="3" name="Rectangle 2"/>
-          <p:cNvSpPr>
+          <p:cNvPr id="17" name="Text Box 9"/>
+          <p:cNvSpPr txBox="1">
             <a:spLocks noChangeArrowheads="1"/>
           </p:cNvSpPr>
           <p:nvPr/>
         </p:nvSpPr>
         <p:spPr bwMode="auto">
           <a:xfrm>
-            <a:off x="2057400" y="2438400"/>
-            <a:ext cx="9144000" cy="0"/>
+            <a:off x="1295399" y="1084656"/>
+            <a:ext cx="7672691" cy="5016758"/>
           </a:xfrm>
           <a:prstGeom prst="rect">
             <a:avLst/>
           </a:prstGeom>
           <a:noFill/>
-          <a:ln>
+          <a:ln w="9525">
             <a:noFill/>
+            <a:miter lim="800000"/>
+            <a:headEnd/>
+            <a:tailEnd/>
           </a:ln>
           <a:effectLst/>
-          <a:extLst>
-            <a:ext uri="{909E8E84-426E-40DD-AFC4-6F175D3DCCD1}">
-              <a14:hiddenFill xmlns:a14="http://schemas.microsoft.com/office/drawing/2010/main">
-                <a:solidFill>
-                  <a:schemeClr val="accent1"/>
-                </a:solidFill>
-              </a14:hiddenFill>
-            </a:ext>
-            <a:ext uri="{91240B29-F687-4F45-9708-019B960494DF}">
-              <a14:hiddenLine xmlns:a14="http://schemas.microsoft.com/office/drawing/2010/main" w="9525">
-                <a:solidFill>
-                  <a:schemeClr val="tx1"/>
-                </a:solidFill>
-                <a:miter lim="800000"/>
-                <a:headEnd/>
-                <a:tailEnd/>
-              </a14:hiddenLine>
-            </a:ext>
-            <a:ext uri="{AF507438-7753-43E0-B8FC-AC1667EBCBE1}">
-              <a14:hiddenEffects xmlns:a14="http://schemas.microsoft.com/office/drawing/2010/main">
-                <a:effectLst>
-                  <a:outerShdw dist="35921" dir="2700000" algn="ctr" rotWithShape="0">
-                    <a:schemeClr val="bg2"/>
-                  </a:outerShdw>
-                </a:effectLst>
-              </a14:hiddenEffects>
-            </a:ext>
-          </a:extLst>
-        </p:spPr>
-        <p:txBody>
-          <a:bodyPr vert="horz" wrap="none" lIns="91440" tIns="45720" rIns="91440" bIns="45720" numCol="1" anchor="ctr" anchorCtr="0" compatLnSpc="1">
-            <a:prstTxWarp prst="textNoShape">
-              <a:avLst/>
-            </a:prstTxWarp>
+        </p:spPr>
+        <p:txBody>
+          <a:bodyPr wrap="square">
             <a:spAutoFit/>
           </a:bodyPr>
           <a:lstStyle/>
           <a:p>
-            <a:endParaRPr lang="en-US"/>
-          </a:p>
-        </p:txBody>
-      </p:sp>
-      <p:sp>
-        <p:nvSpPr>
-          <p:cNvPr id="7" name="Rectangle 4"/>
-          <p:cNvSpPr>
-            <a:spLocks noChangeArrowheads="1"/>
-          </p:cNvSpPr>
-          <p:nvPr/>
-        </p:nvSpPr>
-        <p:spPr bwMode="auto">
-          <a:xfrm flipV="1">
-            <a:off x="2743200" y="3700094"/>
-            <a:ext cx="6941431" cy="45719"/>
-          </a:xfrm>
-          <a:prstGeom prst="rect">
-            <a:avLst/>
-          </a:prstGeom>
-          <a:noFill/>
-          <a:ln>
-            <a:noFill/>
-          </a:ln>
-          <a:effectLst/>
-          <a:extLst>
-            <a:ext uri="{909E8E84-426E-40DD-AFC4-6F175D3DCCD1}">
-              <a14:hiddenFill xmlns:a14="http://schemas.microsoft.com/office/drawing/2010/main">
-                <a:solidFill>
-                  <a:schemeClr val="accent1"/>
-                </a:solidFill>
-              </a14:hiddenFill>
-            </a:ext>
-            <a:ext uri="{91240B29-F687-4F45-9708-019B960494DF}">
-              <a14:hiddenLine xmlns:a14="http://schemas.microsoft.com/office/drawing/2010/main" w="9525">
-                <a:solidFill>
-                  <a:schemeClr val="tx1"/>
-                </a:solidFill>
-                <a:miter lim="800000"/>
-                <a:headEnd/>
-                <a:tailEnd/>
-              </a14:hiddenLine>
-            </a:ext>
-            <a:ext uri="{AF507438-7753-43E0-B8FC-AC1667EBCBE1}">
-              <a14:hiddenEffects xmlns:a14="http://schemas.microsoft.com/office/drawing/2010/main">
-                <a:effectLst>
-                  <a:outerShdw dist="35921" dir="2700000" algn="ctr" rotWithShape="0">
-                    <a:schemeClr val="bg2"/>
-                  </a:outerShdw>
-                </a:effectLst>
-              </a14:hiddenEffects>
-            </a:ext>
-          </a:extLst>
-        </p:spPr>
-        <p:txBody>
-          <a:bodyPr vert="horz" wrap="square" lIns="91440" tIns="45720" rIns="91440" bIns="45720" numCol="1" anchor="ctr" anchorCtr="0" compatLnSpc="1">
-            <a:prstTxWarp prst="textNoShape">
-              <a:avLst/>
-            </a:prstTxWarp>
-            <a:spAutoFit/>
-          </a:bodyPr>
-          <a:lstStyle/>
-          <a:p>
-            <a:endParaRPr lang="en-US"/>
-          </a:p>
-        </p:txBody>
-      </p:sp>
-      <p:sp>
-        <p:nvSpPr>
-          <p:cNvPr id="12" name="TextBox 11"/>
-          <p:cNvSpPr txBox="1"/>
-          <p:nvPr/>
-        </p:nvSpPr>
-        <p:spPr>
-          <a:xfrm>
-            <a:off x="1414235" y="150600"/>
-            <a:ext cx="7282263" cy="553998"/>
-          </a:xfrm>
-          <a:prstGeom prst="rect">
-            <a:avLst/>
-          </a:prstGeom>
-          <a:noFill/>
-        </p:spPr>
-        <p:txBody>
-          <a:bodyPr wrap="square" rtlCol="0">
-            <a:spAutoFit/>
-          </a:bodyPr>
-          <a:lstStyle/>
-          <a:p>
-            <a:r>
-              <a:rPr lang="tr-TR" sz="3000" dirty="0" smtClean="0">
-                <a:latin typeface="Times New Roman" panose="02020603050405020304" pitchFamily="18" charset="0"/>
-                <a:cs typeface="Times New Roman" panose="02020603050405020304" pitchFamily="18" charset="0"/>
-              </a:rPr>
-              <a:t> </a:t>
-            </a:r>
-            <a:endParaRPr lang="en-US" sz="3000" dirty="0" smtClean="0">
+            <a:r>
+              <a:rPr lang="en-US" sz="2000" dirty="0" smtClean="0">
+                <a:latin typeface="Times New Roman" panose="02020603050405020304" pitchFamily="18" charset="0"/>
+                <a:cs typeface="Times New Roman" panose="02020603050405020304" pitchFamily="18" charset="0"/>
+              </a:rPr>
+              <a:t>Fitting into a </a:t>
+            </a:r>
+            <a:r>
+              <a:rPr lang="en-US" sz="2000" b="1" dirty="0" smtClean="0">
+                <a:latin typeface="Times New Roman" panose="02020603050405020304" pitchFamily="18" charset="0"/>
+                <a:cs typeface="Times New Roman" panose="02020603050405020304" pitchFamily="18" charset="0"/>
+              </a:rPr>
+              <a:t>small volume </a:t>
+            </a:r>
+            <a:r>
+              <a:rPr lang="en-US" sz="2000" dirty="0" smtClean="0">
+                <a:latin typeface="Times New Roman" panose="02020603050405020304" pitchFamily="18" charset="0"/>
+                <a:cs typeface="Times New Roman" panose="02020603050405020304" pitchFamily="18" charset="0"/>
+              </a:rPr>
+              <a:t>requires size reduction and optimum placement of components</a:t>
+            </a:r>
+            <a:r>
+              <a:rPr lang="tr-TR" sz="2000" dirty="0" smtClean="0">
+                <a:latin typeface="Times New Roman" panose="02020603050405020304" pitchFamily="18" charset="0"/>
+                <a:cs typeface="Times New Roman" panose="02020603050405020304" pitchFamily="18" charset="0"/>
+              </a:rPr>
+              <a:t>.</a:t>
+            </a:r>
+            <a:endParaRPr lang="en-US" sz="2000" dirty="0" smtClean="0">
               <a:latin typeface="Times New Roman" panose="02020603050405020304" pitchFamily="18" charset="0"/>
               <a:cs typeface="Times New Roman" panose="02020603050405020304" pitchFamily="18" charset="0"/>
             </a:endParaRPr>
           </a:p>
-        </p:txBody>
-      </p:sp>
+          <a:p>
+            <a:pPr marL="800100" lvl="1" indent="-342900">
+              <a:buFont typeface="Wingdings" panose="05000000000000000000" pitchFamily="2" charset="2"/>
+              <a:buChar char="ü"/>
+            </a:pPr>
+            <a:r>
+              <a:rPr lang="en-US" sz="2000" dirty="0" smtClean="0">
+                <a:latin typeface="Times New Roman" panose="02020603050405020304" pitchFamily="18" charset="0"/>
+                <a:cs typeface="Times New Roman" panose="02020603050405020304" pitchFamily="18" charset="0"/>
+              </a:rPr>
+              <a:t>Passive component size reduction</a:t>
+            </a:r>
+          </a:p>
+          <a:p>
+            <a:pPr marL="800100" lvl="1" indent="-342900">
+              <a:buFont typeface="Wingdings" panose="05000000000000000000" pitchFamily="2" charset="2"/>
+              <a:buChar char="ü"/>
+            </a:pPr>
+            <a:r>
+              <a:rPr lang="en-US" sz="2000" dirty="0" smtClean="0">
+                <a:latin typeface="Times New Roman" panose="02020603050405020304" pitchFamily="18" charset="0"/>
+                <a:cs typeface="Times New Roman" panose="02020603050405020304" pitchFamily="18" charset="0"/>
+              </a:rPr>
+              <a:t>Heat sink size reduction</a:t>
+            </a:r>
+          </a:p>
+          <a:p>
+            <a:endParaRPr lang="tr-TR" sz="2000" dirty="0">
+              <a:latin typeface="Times New Roman" panose="02020603050405020304" pitchFamily="18" charset="0"/>
+              <a:cs typeface="Times New Roman" panose="02020603050405020304" pitchFamily="18" charset="0"/>
+            </a:endParaRPr>
+          </a:p>
+          <a:p>
+            <a:endParaRPr lang="tr-TR" sz="2000" dirty="0" smtClean="0">
+              <a:latin typeface="Times New Roman" panose="02020603050405020304" pitchFamily="18" charset="0"/>
+              <a:cs typeface="Times New Roman" panose="02020603050405020304" pitchFamily="18" charset="0"/>
+            </a:endParaRPr>
+          </a:p>
+          <a:p>
+            <a:endParaRPr lang="tr-TR" sz="2000" dirty="0">
+              <a:latin typeface="Times New Roman" panose="02020603050405020304" pitchFamily="18" charset="0"/>
+              <a:cs typeface="Times New Roman" panose="02020603050405020304" pitchFamily="18" charset="0"/>
+            </a:endParaRPr>
+          </a:p>
+          <a:p>
+            <a:endParaRPr lang="tr-TR" sz="2000" dirty="0" smtClean="0">
+              <a:latin typeface="Times New Roman" panose="02020603050405020304" pitchFamily="18" charset="0"/>
+              <a:cs typeface="Times New Roman" panose="02020603050405020304" pitchFamily="18" charset="0"/>
+            </a:endParaRPr>
+          </a:p>
+          <a:p>
+            <a:endParaRPr lang="tr-TR" sz="2000" dirty="0">
+              <a:latin typeface="Times New Roman" panose="02020603050405020304" pitchFamily="18" charset="0"/>
+              <a:cs typeface="Times New Roman" panose="02020603050405020304" pitchFamily="18" charset="0"/>
+            </a:endParaRPr>
+          </a:p>
+          <a:p>
+            <a:endParaRPr lang="tr-TR" sz="2000" dirty="0" smtClean="0">
+              <a:latin typeface="Times New Roman" panose="02020603050405020304" pitchFamily="18" charset="0"/>
+              <a:cs typeface="Times New Roman" panose="02020603050405020304" pitchFamily="18" charset="0"/>
+            </a:endParaRPr>
+          </a:p>
+          <a:p>
+            <a:endParaRPr lang="tr-TR" sz="2000" dirty="0">
+              <a:latin typeface="Times New Roman" panose="02020603050405020304" pitchFamily="18" charset="0"/>
+              <a:cs typeface="Times New Roman" panose="02020603050405020304" pitchFamily="18" charset="0"/>
+            </a:endParaRPr>
+          </a:p>
+          <a:p>
+            <a:endParaRPr lang="tr-TR" sz="2000" dirty="0" smtClean="0">
+              <a:latin typeface="Times New Roman" panose="02020603050405020304" pitchFamily="18" charset="0"/>
+              <a:cs typeface="Times New Roman" panose="02020603050405020304" pitchFamily="18" charset="0"/>
+            </a:endParaRPr>
+          </a:p>
+          <a:p>
+            <a:endParaRPr lang="en-US" sz="2000" dirty="0">
+              <a:latin typeface="Times New Roman" panose="02020603050405020304" pitchFamily="18" charset="0"/>
+              <a:cs typeface="Times New Roman" panose="02020603050405020304" pitchFamily="18" charset="0"/>
+            </a:endParaRPr>
+          </a:p>
+          <a:p>
+            <a:r>
+              <a:rPr lang="en-US" sz="2000" b="1" dirty="0">
+                <a:latin typeface="Times New Roman" panose="02020603050405020304" pitchFamily="18" charset="0"/>
+                <a:cs typeface="Times New Roman" panose="02020603050405020304" pitchFamily="18" charset="0"/>
+              </a:rPr>
+              <a:t>Cooling</a:t>
+            </a:r>
+            <a:r>
+              <a:rPr lang="en-US" sz="2000" dirty="0">
+                <a:latin typeface="Times New Roman" panose="02020603050405020304" pitchFamily="18" charset="0"/>
+                <a:cs typeface="Times New Roman" panose="02020603050405020304" pitchFamily="18" charset="0"/>
+              </a:rPr>
+              <a:t> of both units should be achieved simultaneously</a:t>
+            </a:r>
+            <a:r>
+              <a:rPr lang="tr-TR" sz="2000" dirty="0" smtClean="0">
+                <a:latin typeface="Times New Roman" panose="02020603050405020304" pitchFamily="18" charset="0"/>
+                <a:cs typeface="Times New Roman" panose="02020603050405020304" pitchFamily="18" charset="0"/>
+              </a:rPr>
+              <a:t>.</a:t>
+            </a:r>
+          </a:p>
+          <a:p>
+            <a:pPr marL="800100" lvl="1" indent="-342900">
+              <a:buFont typeface="Wingdings" panose="05000000000000000000" pitchFamily="2" charset="2"/>
+              <a:buChar char="ü"/>
+            </a:pPr>
+            <a:r>
+              <a:rPr lang="en-US" sz="2000" dirty="0" smtClean="0">
+                <a:latin typeface="Times New Roman" panose="02020603050405020304" pitchFamily="18" charset="0"/>
+                <a:cs typeface="Times New Roman" panose="02020603050405020304" pitchFamily="18" charset="0"/>
+              </a:rPr>
+              <a:t>Achieve superior drive efficiency</a:t>
+            </a:r>
+            <a:endParaRPr lang="tr-TR" sz="2000" dirty="0" smtClean="0">
+              <a:latin typeface="Times New Roman" panose="02020603050405020304" pitchFamily="18" charset="0"/>
+              <a:cs typeface="Times New Roman" panose="02020603050405020304" pitchFamily="18" charset="0"/>
+            </a:endParaRPr>
+          </a:p>
+          <a:p>
+            <a:pPr marL="800100" lvl="1" indent="-342900">
+              <a:buFont typeface="Wingdings" panose="05000000000000000000" pitchFamily="2" charset="2"/>
+              <a:buChar char="ü"/>
+            </a:pPr>
+            <a:r>
+              <a:rPr lang="en-US" sz="2000" dirty="0" smtClean="0">
+                <a:latin typeface="Times New Roman" panose="02020603050405020304" pitchFamily="18" charset="0"/>
+                <a:cs typeface="Times New Roman" panose="02020603050405020304" pitchFamily="18" charset="0"/>
+              </a:rPr>
+              <a:t>Heat distribution</a:t>
+            </a:r>
+          </a:p>
+        </p:txBody>
+      </p:sp>
+      <p:pic>
+        <p:nvPicPr>
+          <p:cNvPr id="9" name="Picture 8"/>
+          <p:cNvPicPr>
+            <a:picLocks noChangeAspect="1"/>
+          </p:cNvPicPr>
+          <p:nvPr/>
+        </p:nvPicPr>
+        <p:blipFill>
+          <a:blip r:embed="rId3"/>
+          <a:stretch>
+            <a:fillRect/>
+          </a:stretch>
+        </p:blipFill>
+        <p:spPr>
+          <a:xfrm>
+            <a:off x="2565068" y="2590800"/>
+            <a:ext cx="5133352" cy="2057400"/>
+          </a:xfrm>
+          <a:prstGeom prst="rect">
+            <a:avLst/>
+          </a:prstGeom>
+        </p:spPr>
+      </p:pic>
     </p:spTree>
     <p:extLst>
       <p:ext uri="{BB962C8B-B14F-4D97-AF65-F5344CB8AC3E}">
-        <p14:creationId xmlns:p14="http://schemas.microsoft.com/office/powerpoint/2010/main" val="229237755"/>
+        <p14:creationId xmlns:p14="http://schemas.microsoft.com/office/powerpoint/2010/main" val="863978329"/>
       </p:ext>
     </p:extLst>
   </p:cSld>

</xml_diff>